<commit_message>
Continued working on the slide deck
</commit_message>
<xml_diff>
--- a/Getting Started with F# Web Development.pptx
+++ b/Getting Started with F# Web Development.pptx
@@ -9,18 +9,19 @@
     <p:sldId id="257" r:id="rId3"/>
     <p:sldId id="258" r:id="rId4"/>
     <p:sldId id="259" r:id="rId5"/>
-    <p:sldId id="260" r:id="rId6"/>
-    <p:sldId id="261" r:id="rId7"/>
-    <p:sldId id="273" r:id="rId8"/>
-    <p:sldId id="274" r:id="rId9"/>
-    <p:sldId id="275" r:id="rId10"/>
-    <p:sldId id="266" r:id="rId11"/>
-    <p:sldId id="267" r:id="rId12"/>
-    <p:sldId id="276" r:id="rId13"/>
-    <p:sldId id="277" r:id="rId14"/>
-    <p:sldId id="270" r:id="rId15"/>
-    <p:sldId id="271" r:id="rId16"/>
-    <p:sldId id="272" r:id="rId17"/>
+    <p:sldId id="278" r:id="rId6"/>
+    <p:sldId id="260" r:id="rId7"/>
+    <p:sldId id="261" r:id="rId8"/>
+    <p:sldId id="273" r:id="rId9"/>
+    <p:sldId id="274" r:id="rId10"/>
+    <p:sldId id="275" r:id="rId11"/>
+    <p:sldId id="266" r:id="rId12"/>
+    <p:sldId id="267" r:id="rId13"/>
+    <p:sldId id="276" r:id="rId14"/>
+    <p:sldId id="277" r:id="rId15"/>
+    <p:sldId id="270" r:id="rId16"/>
+    <p:sldId id="271" r:id="rId17"/>
+    <p:sldId id="272" r:id="rId18"/>
   </p:sldIdLst>
   <p:sldSz cx="9144000" cy="6858000" type="screen4x3"/>
   <p:notesSz cx="6858000" cy="9144000"/>
@@ -2880,7 +2881,7 @@
             <a:fld id="{0A98AF03-7270-45C2-A683-C5E353EF01A5}" type="datetime4">
               <a:rPr lang="en-US" smtClean="0"/>
               <a:pPr/>
-              <a:t>October 14, 2010</a:t>
+              <a:t>October 16, 2010</a:t>
             </a:fld>
             <a:endParaRPr lang="en-US" dirty="0"/>
           </a:p>
@@ -3167,7 +3168,7 @@
             <a:fld id="{A2FB5AFD-D735-4504-A039-ADEBB6448D55}" type="datetime4">
               <a:rPr lang="en-US" smtClean="0"/>
               <a:pPr/>
-              <a:t>October 14, 2010</a:t>
+              <a:t>October 16, 2010</a:t>
             </a:fld>
             <a:endParaRPr lang="en-US"/>
           </a:p>
@@ -3344,7 +3345,7 @@
             <a:fld id="{AB5C8118-FB93-4E87-B380-0175F2FE2167}" type="datetime4">
               <a:rPr lang="en-US" smtClean="0"/>
               <a:pPr/>
-              <a:t>October 14, 2010</a:t>
+              <a:t>October 16, 2010</a:t>
             </a:fld>
             <a:endParaRPr lang="en-US"/>
           </a:p>
@@ -3511,7 +3512,7 @@
             <a:fld id="{05A93482-8E69-40F7-BCAD-5662A6CADB27}" type="datetime4">
               <a:rPr lang="en-US" smtClean="0"/>
               <a:pPr/>
-              <a:t>October 14, 2010</a:t>
+              <a:t>October 16, 2010</a:t>
             </a:fld>
             <a:endParaRPr lang="en-US"/>
           </a:p>
@@ -3754,7 +3755,7 @@
             <a:fld id="{FBB7EAE1-CAAC-4AEF-919E-158692B1E55E}" type="datetime4">
               <a:rPr lang="en-US" smtClean="0"/>
               <a:pPr/>
-              <a:t>October 14, 2010</a:t>
+              <a:t>October 16, 2010</a:t>
             </a:fld>
             <a:endParaRPr lang="en-US"/>
           </a:p>
@@ -3869,7 +3870,7 @@
             <a:fld id="{9525A706-D8F2-4D1A-855A-CADC92600C26}" type="datetime4">
               <a:rPr lang="en-US" smtClean="0"/>
               <a:pPr/>
-              <a:t>October 14, 2010</a:t>
+              <a:t>October 16, 2010</a:t>
             </a:fld>
             <a:endParaRPr lang="en-US"/>
           </a:p>
@@ -4410,7 +4411,7 @@
             <a:fld id="{99B4F123-1704-49AC-9D15-C4B1462B8014}" type="datetime4">
               <a:rPr lang="en-US" smtClean="0"/>
               <a:pPr/>
-              <a:t>October 14, 2010</a:t>
+              <a:t>October 16, 2010</a:t>
             </a:fld>
             <a:endParaRPr lang="en-US"/>
           </a:p>
@@ -4525,7 +4526,7 @@
             <a:fld id="{E3127EC2-47FB-48A1-8644-C8A81DDAA119}" type="datetime4">
               <a:rPr lang="en-US" smtClean="0"/>
               <a:pPr/>
-              <a:t>October 14, 2010</a:t>
+              <a:t>October 16, 2010</a:t>
             </a:fld>
             <a:endParaRPr lang="en-US"/>
           </a:p>
@@ -4617,7 +4618,7 @@
             <a:fld id="{AE3EC3ED-7435-49F9-84C8-03CCA2F8DEDB}" type="datetime4">
               <a:rPr lang="en-US" smtClean="0"/>
               <a:pPr/>
-              <a:t>October 14, 2010</a:t>
+              <a:t>October 16, 2010</a:t>
             </a:fld>
             <a:endParaRPr lang="en-US"/>
           </a:p>
@@ -7270,7 +7271,7 @@
             <a:fld id="{3FC49BF1-FCD3-4395-8FF6-0047AF66228E}" type="datetime4">
               <a:rPr lang="en-US" smtClean="0"/>
               <a:pPr/>
-              <a:t>October 14, 2010</a:t>
+              <a:t>October 16, 2010</a:t>
             </a:fld>
             <a:endParaRPr lang="en-US"/>
           </a:p>
@@ -10484,7 +10485,7 @@
             <a:fld id="{CA861222-2C8B-4501-BE87-6797EC025925}" type="datetime4">
               <a:rPr lang="en-US" smtClean="0"/>
               <a:pPr/>
-              <a:t>October 14, 2010</a:t>
+              <a:t>October 16, 2010</a:t>
             </a:fld>
             <a:endParaRPr lang="en-US"/>
           </a:p>
@@ -13308,7 +13309,7 @@
             <a:fld id="{16C01193-8287-4834-A286-6B880643E934}" type="datetime4">
               <a:rPr lang="en-US" smtClean="0"/>
               <a:pPr/>
-              <a:t>October 14, 2010</a:t>
+              <a:t>October 16, 2010</a:t>
             </a:fld>
             <a:endParaRPr lang="en-US"/>
           </a:p>
@@ -13791,11 +13792,7 @@
             </a:r>
             <a:r>
               <a:rPr lang="en-US" smtClean="0"/>
-              <a:t>F# Web </a:t>
-            </a:r>
-            <a:r>
-              <a:rPr lang="en-US" smtClean="0"/>
-              <a:t>Development </a:t>
+              <a:t>F# Web Development </a:t>
             </a:r>
             <a:endParaRPr lang="en-US" dirty="0"/>
           </a:p>
@@ -13838,7 +13835,7 @@
             <a:fld id="{0A98AF03-7270-45C2-A683-C5E353EF01A5}" type="datetime4">
               <a:rPr lang="en-US" smtClean="0"/>
               <a:pPr/>
-              <a:t>October 14, 2010</a:t>
+              <a:t>October 16, 2010</a:t>
             </a:fld>
             <a:endParaRPr lang="en-US" dirty="0"/>
           </a:p>
@@ -13927,7 +13924,12 @@
             <p:ph type="title"/>
           </p:nvPr>
         </p:nvSpPr>
-        <p:spPr/>
+        <p:spPr>
+          <a:xfrm>
+            <a:off x="1043490" y="1027664"/>
+            <a:ext cx="7024744" cy="724936"/>
+          </a:xfrm>
+        </p:spPr>
         <p:txBody>
           <a:bodyPr>
             <a:normAutofit/>
@@ -13942,39 +13944,9 @@
                   </a:schemeClr>
                 </a:solidFill>
               </a:rPr>
-              <a:t>F#/C# Silverlight Example</a:t>
+              <a:t>Pattern Matching</a:t>
             </a:r>
             <a:endParaRPr lang="en-US" dirty="0"/>
-          </a:p>
-        </p:txBody>
-      </p:sp>
-      <p:sp>
-        <p:nvSpPr>
-          <p:cNvPr id="3" name="Content Placeholder 2"/>
-          <p:cNvSpPr>
-            <a:spLocks noGrp="1"/>
-          </p:cNvSpPr>
-          <p:nvPr>
-            <p:ph idx="1"/>
-          </p:nvPr>
-        </p:nvSpPr>
-        <p:spPr/>
-        <p:txBody>
-          <a:bodyPr>
-            <a:normAutofit/>
-          </a:bodyPr>
-          <a:lstStyle/>
-          <a:p>
-            <a:pPr marL="68580" indent="0">
-              <a:buNone/>
-            </a:pPr>
-            <a:r>
-              <a:rPr lang="en-US" dirty="0">
-                <a:hlinkClick r:id="rId2"/>
-              </a:rPr>
-              <a:t>http://visualstudiogallery.msdn.microsoft.com/en-us/64f3d710-04c1-42d2-9e5d-4e20a19a7666</a:t>
-            </a:r>
-            <a:endParaRPr lang="en-US" dirty="0" smtClean="0"/>
           </a:p>
         </p:txBody>
       </p:sp>
@@ -13996,27 +13968,8 @@
             <a:fld id="{05A93482-8E69-40F7-BCAD-5662A6CADB27}" type="datetime4">
               <a:rPr lang="en-US" smtClean="0"/>
               <a:pPr/>
-              <a:t>October 14, 2010</a:t>
+              <a:t>October 16, 2010</a:t>
             </a:fld>
-            <a:endParaRPr lang="en-US"/>
-          </a:p>
-        </p:txBody>
-      </p:sp>
-      <p:sp>
-        <p:nvSpPr>
-          <p:cNvPr id="5" name="Footer Placeholder 4"/>
-          <p:cNvSpPr>
-            <a:spLocks noGrp="1"/>
-          </p:cNvSpPr>
-          <p:nvPr>
-            <p:ph type="ftr" sz="quarter" idx="11"/>
-          </p:nvPr>
-        </p:nvSpPr>
-        <p:spPr/>
-        <p:txBody>
-          <a:bodyPr/>
-          <a:lstStyle/>
-          <a:p>
             <a:endParaRPr lang="en-US"/>
           </a:p>
         </p:txBody>
@@ -14045,10 +13998,42 @@
           </a:p>
         </p:txBody>
       </p:sp>
+      <p:sp>
+        <p:nvSpPr>
+          <p:cNvPr id="9" name="Content Placeholder 2"/>
+          <p:cNvSpPr>
+            <a:spLocks noGrp="1"/>
+          </p:cNvSpPr>
+          <p:nvPr>
+            <p:ph idx="1"/>
+          </p:nvPr>
+        </p:nvSpPr>
+        <p:spPr>
+          <a:xfrm>
+            <a:off x="1043492" y="2323652"/>
+            <a:ext cx="6777317" cy="3508977"/>
+          </a:xfrm>
+        </p:spPr>
+        <p:txBody>
+          <a:bodyPr>
+            <a:normAutofit/>
+          </a:bodyPr>
+          <a:lstStyle/>
+          <a:p>
+            <a:pPr marL="68580" indent="0">
+              <a:buNone/>
+            </a:pPr>
+            <a:r>
+              <a:rPr lang="en-US" dirty="0" smtClean="0"/>
+              <a:t>Kind of like a switch/case statement, but so much more!</a:t>
+            </a:r>
+          </a:p>
+        </p:txBody>
+      </p:sp>
     </p:spTree>
     <p:extLst>
       <p:ext uri="{BB962C8B-B14F-4D97-AF65-F5344CB8AC3E}">
-        <p14:creationId xmlns:p14="http://schemas.microsoft.com/office/powerpoint/2010/main" val="1898667400"/>
+        <p14:creationId xmlns:p14="http://schemas.microsoft.com/office/powerpoint/2010/main" val="3850705532"/>
       </p:ext>
     </p:extLst>
   </p:cSld>
@@ -14087,7 +14072,9 @@
         </p:nvSpPr>
         <p:spPr/>
         <p:txBody>
-          <a:bodyPr/>
+          <a:bodyPr>
+            <a:normAutofit/>
+          </a:bodyPr>
           <a:lstStyle/>
           <a:p>
             <a:r>
@@ -14098,7 +14085,7 @@
                   </a:schemeClr>
                 </a:solidFill>
               </a:rPr>
-              <a:t>F# Silverlight Example</a:t>
+              <a:t>F#/C# Silverlight Example</a:t>
             </a:r>
             <a:endParaRPr lang="en-US" dirty="0"/>
           </a:p>
@@ -14128,7 +14115,7 @@
               <a:rPr lang="en-US" dirty="0">
                 <a:hlinkClick r:id="rId2"/>
               </a:rPr>
-              <a:t>http://visualstudiogallery.msdn.microsoft.com/en-us/f0e9a557-3fd6-41d9-8518-c1735b382c73</a:t>
+              <a:t>http://visualstudiogallery.msdn.microsoft.com/en-us/64f3d710-04c1-42d2-9e5d-4e20a19a7666</a:t>
             </a:r>
             <a:endParaRPr lang="en-US" dirty="0" smtClean="0"/>
           </a:p>
@@ -14152,7 +14139,7 @@
             <a:fld id="{05A93482-8E69-40F7-BCAD-5662A6CADB27}" type="datetime4">
               <a:rPr lang="en-US" smtClean="0"/>
               <a:pPr/>
-              <a:t>October 14, 2010</a:t>
+              <a:t>October 16, 2010</a:t>
             </a:fld>
             <a:endParaRPr lang="en-US"/>
           </a:p>
@@ -14204,7 +14191,7 @@
     </p:spTree>
     <p:extLst>
       <p:ext uri="{BB962C8B-B14F-4D97-AF65-F5344CB8AC3E}">
-        <p14:creationId xmlns:p14="http://schemas.microsoft.com/office/powerpoint/2010/main" val="1638638283"/>
+        <p14:creationId xmlns:p14="http://schemas.microsoft.com/office/powerpoint/2010/main" val="1898667400"/>
       </p:ext>
     </p:extLst>
   </p:cSld>
@@ -14243,9 +14230,7 @@
         </p:nvSpPr>
         <p:spPr/>
         <p:txBody>
-          <a:bodyPr>
-            <a:normAutofit fontScale="90000"/>
-          </a:bodyPr>
+          <a:bodyPr/>
           <a:lstStyle/>
           <a:p>
             <a:r>
@@ -14256,7 +14241,7 @@
                   </a:schemeClr>
                 </a:solidFill>
               </a:rPr>
-              <a:t>F#/C# ASP.NET MVC2 Example</a:t>
+              <a:t>F# Silverlight Example</a:t>
             </a:r>
             <a:endParaRPr lang="en-US" dirty="0"/>
           </a:p>
@@ -14286,7 +14271,7 @@
               <a:rPr lang="en-US" dirty="0">
                 <a:hlinkClick r:id="rId2"/>
               </a:rPr>
-              <a:t>http://visualstudiogallery.msdn.microsoft.com/en-us/c36619e5-0d4a-4067-8ced-decd18e834c9</a:t>
+              <a:t>http://visualstudiogallery.msdn.microsoft.com/en-us/f0e9a557-3fd6-41d9-8518-c1735b382c73</a:t>
             </a:r>
             <a:endParaRPr lang="en-US" dirty="0" smtClean="0"/>
           </a:p>
@@ -14310,7 +14295,7 @@
             <a:fld id="{05A93482-8E69-40F7-BCAD-5662A6CADB27}" type="datetime4">
               <a:rPr lang="en-US" smtClean="0"/>
               <a:pPr/>
-              <a:t>October 14, 2010</a:t>
+              <a:t>October 16, 2010</a:t>
             </a:fld>
             <a:endParaRPr lang="en-US"/>
           </a:p>
@@ -14362,7 +14347,7 @@
     </p:spTree>
     <p:extLst>
       <p:ext uri="{BB962C8B-B14F-4D97-AF65-F5344CB8AC3E}">
-        <p14:creationId xmlns:p14="http://schemas.microsoft.com/office/powerpoint/2010/main" val="867532369"/>
+        <p14:creationId xmlns:p14="http://schemas.microsoft.com/office/powerpoint/2010/main" val="1638638283"/>
       </p:ext>
     </p:extLst>
   </p:cSld>
@@ -14402,29 +14387,19 @@
         <p:spPr/>
         <p:txBody>
           <a:bodyPr>
-            <a:normAutofit/>
+            <a:normAutofit fontScale="90000"/>
           </a:bodyPr>
           <a:lstStyle/>
           <a:p>
             <a:r>
-              <a:rPr lang="en-US" dirty="0" err="1" smtClean="0">
+              <a:rPr lang="en-US" dirty="0" smtClean="0">
                 <a:solidFill>
                   <a:schemeClr val="accent5">
                     <a:lumMod val="50000"/>
                   </a:schemeClr>
                 </a:solidFill>
               </a:rPr>
-              <a:t>WebSharper</a:t>
-            </a:r>
-            <a:r>
-              <a:rPr lang="en-US" dirty="0" smtClean="0">
-                <a:solidFill>
-                  <a:schemeClr val="accent5">
-                    <a:lumMod val="50000"/>
-                  </a:schemeClr>
-                </a:solidFill>
-              </a:rPr>
-              <a:t> Example</a:t>
+              <a:t>F#/C# ASP.NET MVC2 Example</a:t>
             </a:r>
             <a:endParaRPr lang="en-US" dirty="0"/>
           </a:p>
@@ -14454,7 +14429,7 @@
               <a:rPr lang="en-US" dirty="0">
                 <a:hlinkClick r:id="rId2"/>
               </a:rPr>
-              <a:t>http://visualstudiogallery.msdn.microsoft.com/en-us/288b94ea-0ea7-4dde-8906-f72eb22fbe1b</a:t>
+              <a:t>http://visualstudiogallery.msdn.microsoft.com/en-us/c36619e5-0d4a-4067-8ced-decd18e834c9</a:t>
             </a:r>
             <a:endParaRPr lang="en-US" dirty="0" smtClean="0"/>
           </a:p>
@@ -14478,7 +14453,7 @@
             <a:fld id="{05A93482-8E69-40F7-BCAD-5662A6CADB27}" type="datetime4">
               <a:rPr lang="en-US" smtClean="0"/>
               <a:pPr/>
-              <a:t>October 14, 2010</a:t>
+              <a:t>October 16, 2010</a:t>
             </a:fld>
             <a:endParaRPr lang="en-US"/>
           </a:p>
@@ -14530,7 +14505,7 @@
     </p:spTree>
     <p:extLst>
       <p:ext uri="{BB962C8B-B14F-4D97-AF65-F5344CB8AC3E}">
-        <p14:creationId xmlns:p14="http://schemas.microsoft.com/office/powerpoint/2010/main" val="1626836029"/>
+        <p14:creationId xmlns:p14="http://schemas.microsoft.com/office/powerpoint/2010/main" val="867532369"/>
       </p:ext>
     </p:extLst>
   </p:cSld>
@@ -14575,16 +14550,56 @@
           <a:lstStyle/>
           <a:p>
             <a:r>
-              <a:rPr lang="en-US" dirty="0" smtClean="0">
+              <a:rPr lang="en-US" dirty="0" err="1" smtClean="0">
                 <a:solidFill>
                   <a:schemeClr val="accent5">
                     <a:lumMod val="50000"/>
                   </a:schemeClr>
                 </a:solidFill>
               </a:rPr>
-              <a:t>What Wasn’t Covered?</a:t>
+              <a:t>WebSharper</a:t>
+            </a:r>
+            <a:r>
+              <a:rPr lang="en-US" dirty="0" smtClean="0">
+                <a:solidFill>
+                  <a:schemeClr val="accent5">
+                    <a:lumMod val="50000"/>
+                  </a:schemeClr>
+                </a:solidFill>
+              </a:rPr>
+              <a:t> Example</a:t>
             </a:r>
             <a:endParaRPr lang="en-US" dirty="0"/>
+          </a:p>
+        </p:txBody>
+      </p:sp>
+      <p:sp>
+        <p:nvSpPr>
+          <p:cNvPr id="3" name="Content Placeholder 2"/>
+          <p:cNvSpPr>
+            <a:spLocks noGrp="1"/>
+          </p:cNvSpPr>
+          <p:nvPr>
+            <p:ph idx="1"/>
+          </p:nvPr>
+        </p:nvSpPr>
+        <p:spPr/>
+        <p:txBody>
+          <a:bodyPr>
+            <a:normAutofit/>
+          </a:bodyPr>
+          <a:lstStyle/>
+          <a:p>
+            <a:pPr marL="68580" indent="0">
+              <a:buNone/>
+            </a:pPr>
+            <a:r>
+              <a:rPr lang="en-US" dirty="0">
+                <a:hlinkClick r:id="rId2"/>
+              </a:rPr>
+              <a:t>http://visualstudiogallery.msdn.microsoft.com/en-us/288b94ea-0ea7-4dde-8906-f72eb22fbe1b</a:t>
+            </a:r>
+            <a:endParaRPr lang="en-US" dirty="0" smtClean="0"/>
           </a:p>
         </p:txBody>
       </p:sp>
@@ -14606,7 +14621,7 @@
             <a:fld id="{05A93482-8E69-40F7-BCAD-5662A6CADB27}" type="datetime4">
               <a:rPr lang="en-US" smtClean="0"/>
               <a:pPr/>
-              <a:t>October 14, 2010</a:t>
+              <a:t>October 16, 2010</a:t>
             </a:fld>
             <a:endParaRPr lang="en-US"/>
           </a:p>
@@ -14655,260 +14670,10 @@
           </a:p>
         </p:txBody>
       </p:sp>
-      <p:sp>
-        <p:nvSpPr>
-          <p:cNvPr id="7" name="Content Placeholder 2"/>
-          <p:cNvSpPr txBox="1">
-            <a:spLocks/>
-          </p:cNvSpPr>
-          <p:nvPr/>
-        </p:nvSpPr>
-        <p:spPr>
-          <a:xfrm>
-            <a:off x="1195892" y="2286000"/>
-            <a:ext cx="6777317" cy="2708429"/>
-          </a:xfrm>
-          <a:prstGeom prst="rect">
-            <a:avLst/>
-          </a:prstGeom>
-        </p:spPr>
-        <p:txBody>
-          <a:bodyPr vert="horz" lIns="91440" tIns="45720" rIns="91440" bIns="45720" rtlCol="0">
-            <a:normAutofit/>
-          </a:bodyPr>
-          <a:lstStyle>
-            <a:lvl1pPr marL="342900" indent="-274320" algn="l" defTabSz="914400" rtl="0" eaLnBrk="1" latinLnBrk="0" hangingPunct="1">
-              <a:spcBef>
-                <a:spcPct val="20000"/>
-              </a:spcBef>
-              <a:buClr>
-                <a:schemeClr val="accent1"/>
-              </a:buClr>
-              <a:buSzPct val="76000"/>
-              <a:buFont typeface="Wingdings 2" pitchFamily="18" charset="2"/>
-              <a:buChar char=""/>
-              <a:defRPr sz="2400" kern="1200">
-                <a:solidFill>
-                  <a:schemeClr val="tx2"/>
-                </a:solidFill>
-                <a:latin typeface="+mn-lt"/>
-                <a:ea typeface="+mn-ea"/>
-                <a:cs typeface="+mn-cs"/>
-              </a:defRPr>
-            </a:lvl1pPr>
-            <a:lvl2pPr marL="640080" indent="-274320" algn="l" defTabSz="914400" rtl="0" eaLnBrk="1" latinLnBrk="0" hangingPunct="1">
-              <a:spcBef>
-                <a:spcPct val="20000"/>
-              </a:spcBef>
-              <a:buClr>
-                <a:schemeClr val="accent1"/>
-              </a:buClr>
-              <a:buSzPct val="76000"/>
-              <a:buFont typeface="Wingdings 2" pitchFamily="18" charset="2"/>
-              <a:buChar char=""/>
-              <a:defRPr sz="2200" kern="1200">
-                <a:solidFill>
-                  <a:schemeClr val="tx2"/>
-                </a:solidFill>
-                <a:latin typeface="+mn-lt"/>
-                <a:ea typeface="+mn-ea"/>
-                <a:cs typeface="+mn-cs"/>
-              </a:defRPr>
-            </a:lvl2pPr>
-            <a:lvl3pPr marL="914400" indent="-228600" algn="l" defTabSz="914400" rtl="0" eaLnBrk="1" latinLnBrk="0" hangingPunct="1">
-              <a:spcBef>
-                <a:spcPct val="20000"/>
-              </a:spcBef>
-              <a:buClr>
-                <a:schemeClr val="accent1"/>
-              </a:buClr>
-              <a:buSzPct val="76000"/>
-              <a:buFont typeface="Wingdings 2" pitchFamily="18" charset="2"/>
-              <a:buChar char=""/>
-              <a:defRPr sz="2000" kern="1200">
-                <a:solidFill>
-                  <a:schemeClr val="tx2"/>
-                </a:solidFill>
-                <a:latin typeface="+mn-lt"/>
-                <a:ea typeface="+mn-ea"/>
-                <a:cs typeface="+mn-cs"/>
-              </a:defRPr>
-            </a:lvl3pPr>
-            <a:lvl4pPr marL="1124712" indent="-228600" algn="l" defTabSz="914400" rtl="0" eaLnBrk="1" latinLnBrk="0" hangingPunct="1">
-              <a:spcBef>
-                <a:spcPct val="20000"/>
-              </a:spcBef>
-              <a:buClr>
-                <a:schemeClr val="accent1"/>
-              </a:buClr>
-              <a:buSzPct val="76000"/>
-              <a:buFont typeface="Wingdings 2" pitchFamily="18" charset="2"/>
-              <a:buChar char=""/>
-              <a:defRPr sz="1800" kern="1200">
-                <a:solidFill>
-                  <a:schemeClr val="tx2"/>
-                </a:solidFill>
-                <a:latin typeface="+mn-lt"/>
-                <a:ea typeface="+mn-ea"/>
-                <a:cs typeface="+mn-cs"/>
-              </a:defRPr>
-            </a:lvl4pPr>
-            <a:lvl5pPr marL="1325880" indent="-228600" algn="l" defTabSz="914400" rtl="0" eaLnBrk="1" latinLnBrk="0" hangingPunct="1">
-              <a:spcBef>
-                <a:spcPct val="20000"/>
-              </a:spcBef>
-              <a:buClr>
-                <a:schemeClr val="accent1"/>
-              </a:buClr>
-              <a:buSzPct val="76000"/>
-              <a:buFont typeface="Wingdings 2" pitchFamily="18" charset="2"/>
-              <a:buChar char=""/>
-              <a:defRPr sz="1600" kern="1200" baseline="0">
-                <a:solidFill>
-                  <a:schemeClr val="tx2"/>
-                </a:solidFill>
-                <a:latin typeface="+mn-lt"/>
-                <a:ea typeface="+mn-ea"/>
-                <a:cs typeface="+mn-cs"/>
-              </a:defRPr>
-            </a:lvl5pPr>
-            <a:lvl6pPr marL="1517904" indent="-228600" algn="l" defTabSz="914400" rtl="0" eaLnBrk="1" latinLnBrk="0" hangingPunct="1">
-              <a:spcBef>
-                <a:spcPct val="20000"/>
-              </a:spcBef>
-              <a:buClr>
-                <a:schemeClr val="accent1"/>
-              </a:buClr>
-              <a:buSzPct val="76000"/>
-              <a:buFont typeface="Wingdings 2" pitchFamily="18" charset="2"/>
-              <a:buChar char=""/>
-              <a:defRPr sz="1400" kern="1200">
-                <a:solidFill>
-                  <a:schemeClr val="tx2"/>
-                </a:solidFill>
-                <a:latin typeface="+mn-lt"/>
-                <a:ea typeface="+mn-ea"/>
-                <a:cs typeface="+mn-cs"/>
-              </a:defRPr>
-            </a:lvl6pPr>
-            <a:lvl7pPr marL="1719072" indent="-228600" algn="l" defTabSz="914400" rtl="0" eaLnBrk="1" latinLnBrk="0" hangingPunct="1">
-              <a:spcBef>
-                <a:spcPct val="20000"/>
-              </a:spcBef>
-              <a:buClr>
-                <a:schemeClr val="accent1"/>
-              </a:buClr>
-              <a:buSzPct val="76000"/>
-              <a:buFont typeface="Wingdings 2" pitchFamily="18" charset="2"/>
-              <a:buChar char=""/>
-              <a:defRPr sz="1400" kern="1200">
-                <a:solidFill>
-                  <a:schemeClr val="tx2"/>
-                </a:solidFill>
-                <a:latin typeface="+mn-lt"/>
-                <a:ea typeface="+mn-ea"/>
-                <a:cs typeface="+mn-cs"/>
-              </a:defRPr>
-            </a:lvl7pPr>
-            <a:lvl8pPr marL="1920240" indent="-228600" algn="l" defTabSz="914400" rtl="0" eaLnBrk="1" latinLnBrk="0" hangingPunct="1">
-              <a:spcBef>
-                <a:spcPct val="20000"/>
-              </a:spcBef>
-              <a:buClr>
-                <a:schemeClr val="accent1"/>
-              </a:buClr>
-              <a:buSzPct val="76000"/>
-              <a:buFont typeface="Wingdings 2" pitchFamily="18" charset="2"/>
-              <a:buChar char=""/>
-              <a:defRPr sz="1400" kern="1200">
-                <a:solidFill>
-                  <a:schemeClr val="tx2"/>
-                </a:solidFill>
-                <a:latin typeface="+mn-lt"/>
-                <a:ea typeface="+mn-ea"/>
-                <a:cs typeface="+mn-cs"/>
-              </a:defRPr>
-            </a:lvl8pPr>
-            <a:lvl9pPr marL="2121408" indent="-228600" algn="l" defTabSz="914400" rtl="0" eaLnBrk="1" latinLnBrk="0" hangingPunct="1">
-              <a:spcBef>
-                <a:spcPct val="20000"/>
-              </a:spcBef>
-              <a:buClr>
-                <a:schemeClr val="accent1"/>
-              </a:buClr>
-              <a:buSzPct val="76000"/>
-              <a:buFont typeface="Wingdings 2" pitchFamily="18" charset="2"/>
-              <a:buChar char=""/>
-              <a:defRPr sz="1400" kern="1200">
-                <a:solidFill>
-                  <a:schemeClr val="tx2"/>
-                </a:solidFill>
-                <a:latin typeface="+mn-lt"/>
-                <a:ea typeface="+mn-ea"/>
-                <a:cs typeface="+mn-cs"/>
-              </a:defRPr>
-            </a:lvl9pPr>
-          </a:lstStyle>
-          <a:p>
-            <a:endParaRPr lang="en-US" dirty="0" smtClean="0"/>
-          </a:p>
-          <a:p>
-            <a:r>
-              <a:rPr lang="en-US" dirty="0" smtClean="0"/>
-              <a:t>Lots of F# Features</a:t>
-            </a:r>
-          </a:p>
-          <a:p>
-            <a:r>
-              <a:rPr lang="en-US" dirty="0" smtClean="0"/>
-              <a:t>Other F# Web Frameworks</a:t>
-            </a:r>
-          </a:p>
-          <a:p>
-            <a:pPr lvl="1"/>
-            <a:r>
-              <a:rPr lang="en-US" dirty="0" smtClean="0"/>
-              <a:t>Bistro</a:t>
-            </a:r>
-          </a:p>
-          <a:p>
-            <a:pPr lvl="1"/>
-            <a:r>
-              <a:rPr lang="en-US" dirty="0" smtClean="0"/>
-              <a:t>Suave</a:t>
-            </a:r>
-          </a:p>
-          <a:p>
-            <a:pPr lvl="1"/>
-            <a:r>
-              <a:rPr lang="en-US" dirty="0" smtClean="0"/>
-              <a:t>Frank and </a:t>
-            </a:r>
-            <a:r>
-              <a:rPr lang="en-US" dirty="0" err="1" smtClean="0"/>
-              <a:t>Frack</a:t>
-            </a:r>
-            <a:endParaRPr lang="en-US" dirty="0" smtClean="0"/>
-          </a:p>
-          <a:p>
-            <a:pPr marL="365760" lvl="1" indent="0">
-              <a:buNone/>
-            </a:pPr>
-            <a:endParaRPr lang="en-US" dirty="0" smtClean="0"/>
-          </a:p>
-          <a:p>
-            <a:pPr marL="68580" indent="0">
-              <a:buFont typeface="Wingdings 2" pitchFamily="18" charset="2"/>
-              <a:buNone/>
-            </a:pPr>
-            <a:endParaRPr lang="en-US" dirty="0" smtClean="0"/>
-          </a:p>
-        </p:txBody>
-      </p:sp>
     </p:spTree>
     <p:extLst>
       <p:ext uri="{BB962C8B-B14F-4D97-AF65-F5344CB8AC3E}">
-        <p14:creationId xmlns:p14="http://schemas.microsoft.com/office/powerpoint/2010/main" val="4105916061"/>
+        <p14:creationId xmlns:p14="http://schemas.microsoft.com/office/powerpoint/2010/main" val="1626836029"/>
       </p:ext>
     </p:extLst>
   </p:cSld>
@@ -14960,7 +14725,7 @@
                   </a:schemeClr>
                 </a:solidFill>
               </a:rPr>
-              <a:t>More Information</a:t>
+              <a:t>What Wasn’t Covered?</a:t>
             </a:r>
             <a:endParaRPr lang="en-US" dirty="0"/>
           </a:p>
@@ -14984,7 +14749,7 @@
             <a:fld id="{05A93482-8E69-40F7-BCAD-5662A6CADB27}" type="datetime4">
               <a:rPr lang="en-US" smtClean="0"/>
               <a:pPr/>
-              <a:t>October 14, 2010</a:t>
+              <a:t>October 16, 2010</a:t>
             </a:fld>
             <a:endParaRPr lang="en-US"/>
           </a:p>
@@ -15035,7 +14800,7 @@
       </p:sp>
       <p:sp>
         <p:nvSpPr>
-          <p:cNvPr id="8" name="Content Placeholder 2"/>
+          <p:cNvPr id="7" name="Content Placeholder 2"/>
           <p:cNvSpPr txBox="1">
             <a:spLocks/>
           </p:cNvSpPr>
@@ -15052,7 +14817,7 @@
         </p:spPr>
         <p:txBody>
           <a:bodyPr vert="horz" lIns="91440" tIns="45720" rIns="91440" bIns="45720" rtlCol="0">
-            <a:normAutofit fontScale="92500" lnSpcReduction="20000"/>
+            <a:normAutofit/>
           </a:bodyPr>
           <a:lstStyle>
             <a:lvl1pPr marL="342900" indent="-274320" algn="l" defTabSz="914400" rtl="0" eaLnBrk="1" latinLnBrk="0" hangingPunct="1">
@@ -15233,62 +14998,40 @@
           <a:p>
             <a:r>
               <a:rPr lang="en-US" dirty="0" smtClean="0"/>
-              <a:t>Books </a:t>
-            </a:r>
-            <a:r>
-              <a:rPr lang="en-US" dirty="0"/>
-              <a:t>- </a:t>
-            </a:r>
-            <a:r>
-              <a:rPr lang="en-US" dirty="0">
-                <a:hlinkClick r:id="rId2"/>
-              </a:rPr>
-              <a:t>http://</a:t>
-            </a:r>
-            <a:r>
-              <a:rPr lang="en-US" dirty="0" smtClean="0">
-                <a:hlinkClick r:id="rId2"/>
-              </a:rPr>
-              <a:t>msdn.microsoft.com/en-us/fsharp/gg262865.aspx</a:t>
+              <a:t>Lots of F# Features</a:t>
+            </a:r>
+          </a:p>
+          <a:p>
+            <a:r>
+              <a:rPr lang="en-US" dirty="0" smtClean="0"/>
+              <a:t>Other F# Web Frameworks</a:t>
+            </a:r>
+          </a:p>
+          <a:p>
+            <a:pPr lvl="1"/>
+            <a:r>
+              <a:rPr lang="en-US" dirty="0" smtClean="0"/>
+              <a:t>Bistro</a:t>
+            </a:r>
+          </a:p>
+          <a:p>
+            <a:pPr lvl="1"/>
+            <a:r>
+              <a:rPr lang="en-US" dirty="0" smtClean="0"/>
+              <a:t>Suave</a:t>
+            </a:r>
+          </a:p>
+          <a:p>
+            <a:pPr lvl="1"/>
+            <a:r>
+              <a:rPr lang="en-US" dirty="0" smtClean="0"/>
+              <a:t>Frank and </a:t>
+            </a:r>
+            <a:r>
+              <a:rPr lang="en-US" dirty="0" err="1" smtClean="0"/>
+              <a:t>Frack</a:t>
             </a:r>
             <a:endParaRPr lang="en-US" dirty="0" smtClean="0"/>
-          </a:p>
-          <a:p>
-            <a:r>
-              <a:rPr lang="en-US" dirty="0"/>
-              <a:t>F# MSDN - </a:t>
-            </a:r>
-            <a:r>
-              <a:rPr lang="en-US" dirty="0">
-                <a:hlinkClick r:id="rId2"/>
-              </a:rPr>
-              <a:t>http://</a:t>
-            </a:r>
-            <a:r>
-              <a:rPr lang="en-US" dirty="0" smtClean="0">
-                <a:hlinkClick r:id="rId2"/>
-              </a:rPr>
-              <a:t>msdn.microsoft.com/en-us/fsharp/gg262865.aspx</a:t>
-            </a:r>
-            <a:endParaRPr lang="en-US" dirty="0" smtClean="0"/>
-          </a:p>
-          <a:p>
-            <a:r>
-              <a:rPr lang="en-US" dirty="0" smtClean="0"/>
-              <a:t>Blogs</a:t>
-            </a:r>
-          </a:p>
-          <a:p>
-            <a:r>
-              <a:rPr lang="en-US" dirty="0" smtClean="0"/>
-              <a:t>Twitter</a:t>
-            </a:r>
-          </a:p>
-          <a:p>
-            <a:r>
-              <a:rPr lang="en-US" dirty="0" smtClean="0"/>
-              <a:t>Ask – F# has the greatest community around</a:t>
-            </a:r>
           </a:p>
           <a:p>
             <a:pPr marL="365760" lvl="1" indent="0">
@@ -15308,7 +15051,7 @@
     </p:spTree>
     <p:extLst>
       <p:ext uri="{BB962C8B-B14F-4D97-AF65-F5344CB8AC3E}">
-        <p14:creationId xmlns:p14="http://schemas.microsoft.com/office/powerpoint/2010/main" val="1179791007"/>
+        <p14:creationId xmlns:p14="http://schemas.microsoft.com/office/powerpoint/2010/main" val="4105916061"/>
       </p:ext>
     </p:extLst>
   </p:cSld>
@@ -15348,7 +15091,7 @@
         <p:spPr/>
         <p:txBody>
           <a:bodyPr>
-            <a:normAutofit fontScale="90000"/>
+            <a:normAutofit/>
           </a:bodyPr>
           <a:lstStyle/>
           <a:p>
@@ -15360,54 +15103,9 @@
                   </a:schemeClr>
                 </a:solidFill>
               </a:rPr>
-              <a:t>Daniel </a:t>
-            </a:r>
-            <a:r>
-              <a:rPr lang="en-US" dirty="0" err="1" smtClean="0">
-                <a:solidFill>
-                  <a:schemeClr val="accent5">
-                    <a:lumMod val="50000"/>
-                  </a:schemeClr>
-                </a:solidFill>
-              </a:rPr>
-              <a:t>Mohl</a:t>
-            </a:r>
-            <a:r>
-              <a:rPr lang="en-US" dirty="0" smtClean="0">
-                <a:solidFill>
-                  <a:schemeClr val="accent5">
-                    <a:lumMod val="50000"/>
-                  </a:schemeClr>
-                </a:solidFill>
-              </a:rPr>
-              <a:t/>
-            </a:r>
-            <a:br>
-              <a:rPr lang="en-US" dirty="0" smtClean="0">
-                <a:solidFill>
-                  <a:schemeClr val="accent5">
-                    <a:lumMod val="50000"/>
-                  </a:schemeClr>
-                </a:solidFill>
-              </a:rPr>
-            </a:br>
-            <a:r>
-              <a:rPr lang="en-US" dirty="0" smtClean="0">
-                <a:solidFill>
-                  <a:schemeClr val="accent5">
-                    <a:lumMod val="50000"/>
-                  </a:schemeClr>
-                </a:solidFill>
-              </a:rPr>
-              <a:t>C# MVP and F# Insider</a:t>
-            </a:r>
-            <a:endParaRPr lang="en-US" dirty="0">
-              <a:solidFill>
-                <a:schemeClr val="accent5">
-                  <a:lumMod val="50000"/>
-                </a:schemeClr>
-              </a:solidFill>
-            </a:endParaRPr>
+              <a:t>More Information</a:t>
+            </a:r>
+            <a:endParaRPr lang="en-US" dirty="0"/>
           </a:p>
         </p:txBody>
       </p:sp>
@@ -15429,7 +15127,7 @@
             <a:fld id="{05A93482-8E69-40F7-BCAD-5662A6CADB27}" type="datetime4">
               <a:rPr lang="en-US" smtClean="0"/>
               <a:pPr/>
-              <a:t>October 14, 2010</a:t>
+              <a:t>October 16, 2010</a:t>
             </a:fld>
             <a:endParaRPr lang="en-US"/>
           </a:p>
@@ -15473,6 +15171,451 @@
               <a:rPr lang="en-US" smtClean="0"/>
               <a:pPr/>
               <a:t>16</a:t>
+            </a:fld>
+            <a:endParaRPr lang="en-US"/>
+          </a:p>
+        </p:txBody>
+      </p:sp>
+      <p:sp>
+        <p:nvSpPr>
+          <p:cNvPr id="8" name="Content Placeholder 2"/>
+          <p:cNvSpPr txBox="1">
+            <a:spLocks/>
+          </p:cNvSpPr>
+          <p:nvPr/>
+        </p:nvSpPr>
+        <p:spPr>
+          <a:xfrm>
+            <a:off x="1195892" y="2286000"/>
+            <a:ext cx="6777317" cy="2708429"/>
+          </a:xfrm>
+          <a:prstGeom prst="rect">
+            <a:avLst/>
+          </a:prstGeom>
+        </p:spPr>
+        <p:txBody>
+          <a:bodyPr vert="horz" lIns="91440" tIns="45720" rIns="91440" bIns="45720" rtlCol="0">
+            <a:normAutofit fontScale="92500" lnSpcReduction="20000"/>
+          </a:bodyPr>
+          <a:lstStyle>
+            <a:lvl1pPr marL="342900" indent="-274320" algn="l" defTabSz="914400" rtl="0" eaLnBrk="1" latinLnBrk="0" hangingPunct="1">
+              <a:spcBef>
+                <a:spcPct val="20000"/>
+              </a:spcBef>
+              <a:buClr>
+                <a:schemeClr val="accent1"/>
+              </a:buClr>
+              <a:buSzPct val="76000"/>
+              <a:buFont typeface="Wingdings 2" pitchFamily="18" charset="2"/>
+              <a:buChar char=""/>
+              <a:defRPr sz="2400" kern="1200">
+                <a:solidFill>
+                  <a:schemeClr val="tx2"/>
+                </a:solidFill>
+                <a:latin typeface="+mn-lt"/>
+                <a:ea typeface="+mn-ea"/>
+                <a:cs typeface="+mn-cs"/>
+              </a:defRPr>
+            </a:lvl1pPr>
+            <a:lvl2pPr marL="640080" indent="-274320" algn="l" defTabSz="914400" rtl="0" eaLnBrk="1" latinLnBrk="0" hangingPunct="1">
+              <a:spcBef>
+                <a:spcPct val="20000"/>
+              </a:spcBef>
+              <a:buClr>
+                <a:schemeClr val="accent1"/>
+              </a:buClr>
+              <a:buSzPct val="76000"/>
+              <a:buFont typeface="Wingdings 2" pitchFamily="18" charset="2"/>
+              <a:buChar char=""/>
+              <a:defRPr sz="2200" kern="1200">
+                <a:solidFill>
+                  <a:schemeClr val="tx2"/>
+                </a:solidFill>
+                <a:latin typeface="+mn-lt"/>
+                <a:ea typeface="+mn-ea"/>
+                <a:cs typeface="+mn-cs"/>
+              </a:defRPr>
+            </a:lvl2pPr>
+            <a:lvl3pPr marL="914400" indent="-228600" algn="l" defTabSz="914400" rtl="0" eaLnBrk="1" latinLnBrk="0" hangingPunct="1">
+              <a:spcBef>
+                <a:spcPct val="20000"/>
+              </a:spcBef>
+              <a:buClr>
+                <a:schemeClr val="accent1"/>
+              </a:buClr>
+              <a:buSzPct val="76000"/>
+              <a:buFont typeface="Wingdings 2" pitchFamily="18" charset="2"/>
+              <a:buChar char=""/>
+              <a:defRPr sz="2000" kern="1200">
+                <a:solidFill>
+                  <a:schemeClr val="tx2"/>
+                </a:solidFill>
+                <a:latin typeface="+mn-lt"/>
+                <a:ea typeface="+mn-ea"/>
+                <a:cs typeface="+mn-cs"/>
+              </a:defRPr>
+            </a:lvl3pPr>
+            <a:lvl4pPr marL="1124712" indent="-228600" algn="l" defTabSz="914400" rtl="0" eaLnBrk="1" latinLnBrk="0" hangingPunct="1">
+              <a:spcBef>
+                <a:spcPct val="20000"/>
+              </a:spcBef>
+              <a:buClr>
+                <a:schemeClr val="accent1"/>
+              </a:buClr>
+              <a:buSzPct val="76000"/>
+              <a:buFont typeface="Wingdings 2" pitchFamily="18" charset="2"/>
+              <a:buChar char=""/>
+              <a:defRPr sz="1800" kern="1200">
+                <a:solidFill>
+                  <a:schemeClr val="tx2"/>
+                </a:solidFill>
+                <a:latin typeface="+mn-lt"/>
+                <a:ea typeface="+mn-ea"/>
+                <a:cs typeface="+mn-cs"/>
+              </a:defRPr>
+            </a:lvl4pPr>
+            <a:lvl5pPr marL="1325880" indent="-228600" algn="l" defTabSz="914400" rtl="0" eaLnBrk="1" latinLnBrk="0" hangingPunct="1">
+              <a:spcBef>
+                <a:spcPct val="20000"/>
+              </a:spcBef>
+              <a:buClr>
+                <a:schemeClr val="accent1"/>
+              </a:buClr>
+              <a:buSzPct val="76000"/>
+              <a:buFont typeface="Wingdings 2" pitchFamily="18" charset="2"/>
+              <a:buChar char=""/>
+              <a:defRPr sz="1600" kern="1200" baseline="0">
+                <a:solidFill>
+                  <a:schemeClr val="tx2"/>
+                </a:solidFill>
+                <a:latin typeface="+mn-lt"/>
+                <a:ea typeface="+mn-ea"/>
+                <a:cs typeface="+mn-cs"/>
+              </a:defRPr>
+            </a:lvl5pPr>
+            <a:lvl6pPr marL="1517904" indent="-228600" algn="l" defTabSz="914400" rtl="0" eaLnBrk="1" latinLnBrk="0" hangingPunct="1">
+              <a:spcBef>
+                <a:spcPct val="20000"/>
+              </a:spcBef>
+              <a:buClr>
+                <a:schemeClr val="accent1"/>
+              </a:buClr>
+              <a:buSzPct val="76000"/>
+              <a:buFont typeface="Wingdings 2" pitchFamily="18" charset="2"/>
+              <a:buChar char=""/>
+              <a:defRPr sz="1400" kern="1200">
+                <a:solidFill>
+                  <a:schemeClr val="tx2"/>
+                </a:solidFill>
+                <a:latin typeface="+mn-lt"/>
+                <a:ea typeface="+mn-ea"/>
+                <a:cs typeface="+mn-cs"/>
+              </a:defRPr>
+            </a:lvl6pPr>
+            <a:lvl7pPr marL="1719072" indent="-228600" algn="l" defTabSz="914400" rtl="0" eaLnBrk="1" latinLnBrk="0" hangingPunct="1">
+              <a:spcBef>
+                <a:spcPct val="20000"/>
+              </a:spcBef>
+              <a:buClr>
+                <a:schemeClr val="accent1"/>
+              </a:buClr>
+              <a:buSzPct val="76000"/>
+              <a:buFont typeface="Wingdings 2" pitchFamily="18" charset="2"/>
+              <a:buChar char=""/>
+              <a:defRPr sz="1400" kern="1200">
+                <a:solidFill>
+                  <a:schemeClr val="tx2"/>
+                </a:solidFill>
+                <a:latin typeface="+mn-lt"/>
+                <a:ea typeface="+mn-ea"/>
+                <a:cs typeface="+mn-cs"/>
+              </a:defRPr>
+            </a:lvl7pPr>
+            <a:lvl8pPr marL="1920240" indent="-228600" algn="l" defTabSz="914400" rtl="0" eaLnBrk="1" latinLnBrk="0" hangingPunct="1">
+              <a:spcBef>
+                <a:spcPct val="20000"/>
+              </a:spcBef>
+              <a:buClr>
+                <a:schemeClr val="accent1"/>
+              </a:buClr>
+              <a:buSzPct val="76000"/>
+              <a:buFont typeface="Wingdings 2" pitchFamily="18" charset="2"/>
+              <a:buChar char=""/>
+              <a:defRPr sz="1400" kern="1200">
+                <a:solidFill>
+                  <a:schemeClr val="tx2"/>
+                </a:solidFill>
+                <a:latin typeface="+mn-lt"/>
+                <a:ea typeface="+mn-ea"/>
+                <a:cs typeface="+mn-cs"/>
+              </a:defRPr>
+            </a:lvl8pPr>
+            <a:lvl9pPr marL="2121408" indent="-228600" algn="l" defTabSz="914400" rtl="0" eaLnBrk="1" latinLnBrk="0" hangingPunct="1">
+              <a:spcBef>
+                <a:spcPct val="20000"/>
+              </a:spcBef>
+              <a:buClr>
+                <a:schemeClr val="accent1"/>
+              </a:buClr>
+              <a:buSzPct val="76000"/>
+              <a:buFont typeface="Wingdings 2" pitchFamily="18" charset="2"/>
+              <a:buChar char=""/>
+              <a:defRPr sz="1400" kern="1200">
+                <a:solidFill>
+                  <a:schemeClr val="tx2"/>
+                </a:solidFill>
+                <a:latin typeface="+mn-lt"/>
+                <a:ea typeface="+mn-ea"/>
+                <a:cs typeface="+mn-cs"/>
+              </a:defRPr>
+            </a:lvl9pPr>
+          </a:lstStyle>
+          <a:p>
+            <a:endParaRPr lang="en-US" dirty="0" smtClean="0"/>
+          </a:p>
+          <a:p>
+            <a:r>
+              <a:rPr lang="en-US" dirty="0" smtClean="0"/>
+              <a:t>Books </a:t>
+            </a:r>
+            <a:r>
+              <a:rPr lang="en-US" dirty="0"/>
+              <a:t>- </a:t>
+            </a:r>
+            <a:r>
+              <a:rPr lang="en-US" dirty="0">
+                <a:hlinkClick r:id="rId2"/>
+              </a:rPr>
+              <a:t>http://</a:t>
+            </a:r>
+            <a:r>
+              <a:rPr lang="en-US" dirty="0" smtClean="0">
+                <a:hlinkClick r:id="rId2"/>
+              </a:rPr>
+              <a:t>msdn.microsoft.com/en-us/fsharp/gg262865.aspx</a:t>
+            </a:r>
+            <a:endParaRPr lang="en-US" dirty="0" smtClean="0"/>
+          </a:p>
+          <a:p>
+            <a:r>
+              <a:rPr lang="en-US" dirty="0"/>
+              <a:t>F# MSDN - </a:t>
+            </a:r>
+            <a:r>
+              <a:rPr lang="en-US" dirty="0">
+                <a:hlinkClick r:id="rId2"/>
+              </a:rPr>
+              <a:t>http://</a:t>
+            </a:r>
+            <a:r>
+              <a:rPr lang="en-US" dirty="0" smtClean="0">
+                <a:hlinkClick r:id="rId2"/>
+              </a:rPr>
+              <a:t>msdn.microsoft.com/en-us/fsharp/gg262865.aspx</a:t>
+            </a:r>
+            <a:endParaRPr lang="en-US" dirty="0" smtClean="0"/>
+          </a:p>
+          <a:p>
+            <a:r>
+              <a:rPr lang="en-US" dirty="0" smtClean="0"/>
+              <a:t>Blogs</a:t>
+            </a:r>
+          </a:p>
+          <a:p>
+            <a:r>
+              <a:rPr lang="en-US" dirty="0" smtClean="0"/>
+              <a:t>Twitter</a:t>
+            </a:r>
+          </a:p>
+          <a:p>
+            <a:r>
+              <a:rPr lang="en-US" dirty="0" smtClean="0"/>
+              <a:t>Ask – F# has the greatest community around</a:t>
+            </a:r>
+          </a:p>
+          <a:p>
+            <a:pPr marL="365760" lvl="1" indent="0">
+              <a:buNone/>
+            </a:pPr>
+            <a:endParaRPr lang="en-US" dirty="0" smtClean="0"/>
+          </a:p>
+          <a:p>
+            <a:pPr marL="68580" indent="0">
+              <a:buFont typeface="Wingdings 2" pitchFamily="18" charset="2"/>
+              <a:buNone/>
+            </a:pPr>
+            <a:endParaRPr lang="en-US" dirty="0" smtClean="0"/>
+          </a:p>
+        </p:txBody>
+      </p:sp>
+    </p:spTree>
+    <p:extLst>
+      <p:ext uri="{BB962C8B-B14F-4D97-AF65-F5344CB8AC3E}">
+        <p14:creationId xmlns:p14="http://schemas.microsoft.com/office/powerpoint/2010/main" val="1179791007"/>
+      </p:ext>
+    </p:extLst>
+  </p:cSld>
+  <p:clrMapOvr>
+    <a:masterClrMapping/>
+  </p:clrMapOvr>
+</p:sld>
+</file>
+
+<file path=ppt/slides/slide17.xml><?xml version="1.0" encoding="utf-8"?>
+<p:sld xmlns:a="http://schemas.openxmlformats.org/drawingml/2006/main" xmlns:r="http://schemas.openxmlformats.org/officeDocument/2006/relationships" xmlns:p="http://schemas.openxmlformats.org/presentationml/2006/main">
+  <p:cSld>
+    <p:spTree>
+      <p:nvGrpSpPr>
+        <p:cNvPr id="1" name=""/>
+        <p:cNvGrpSpPr/>
+        <p:nvPr/>
+      </p:nvGrpSpPr>
+      <p:grpSpPr>
+        <a:xfrm>
+          <a:off x="0" y="0"/>
+          <a:ext cx="0" cy="0"/>
+          <a:chOff x="0" y="0"/>
+          <a:chExt cx="0" cy="0"/>
+        </a:xfrm>
+      </p:grpSpPr>
+      <p:sp>
+        <p:nvSpPr>
+          <p:cNvPr id="2" name="Title 1"/>
+          <p:cNvSpPr>
+            <a:spLocks noGrp="1"/>
+          </p:cNvSpPr>
+          <p:nvPr>
+            <p:ph type="title"/>
+          </p:nvPr>
+        </p:nvSpPr>
+        <p:spPr/>
+        <p:txBody>
+          <a:bodyPr>
+            <a:normAutofit fontScale="90000"/>
+          </a:bodyPr>
+          <a:lstStyle/>
+          <a:p>
+            <a:r>
+              <a:rPr lang="en-US" dirty="0" smtClean="0">
+                <a:solidFill>
+                  <a:schemeClr val="accent5">
+                    <a:lumMod val="50000"/>
+                  </a:schemeClr>
+                </a:solidFill>
+              </a:rPr>
+              <a:t>Daniel </a:t>
+            </a:r>
+            <a:r>
+              <a:rPr lang="en-US" dirty="0" err="1" smtClean="0">
+                <a:solidFill>
+                  <a:schemeClr val="accent5">
+                    <a:lumMod val="50000"/>
+                  </a:schemeClr>
+                </a:solidFill>
+              </a:rPr>
+              <a:t>Mohl</a:t>
+            </a:r>
+            <a:r>
+              <a:rPr lang="en-US" dirty="0" smtClean="0">
+                <a:solidFill>
+                  <a:schemeClr val="accent5">
+                    <a:lumMod val="50000"/>
+                  </a:schemeClr>
+                </a:solidFill>
+              </a:rPr>
+              <a:t/>
+            </a:r>
+            <a:br>
+              <a:rPr lang="en-US" dirty="0" smtClean="0">
+                <a:solidFill>
+                  <a:schemeClr val="accent5">
+                    <a:lumMod val="50000"/>
+                  </a:schemeClr>
+                </a:solidFill>
+              </a:rPr>
+            </a:br>
+            <a:r>
+              <a:rPr lang="en-US" dirty="0" smtClean="0">
+                <a:solidFill>
+                  <a:schemeClr val="accent5">
+                    <a:lumMod val="50000"/>
+                  </a:schemeClr>
+                </a:solidFill>
+              </a:rPr>
+              <a:t>C# MVP and F# Insider</a:t>
+            </a:r>
+            <a:endParaRPr lang="en-US" dirty="0">
+              <a:solidFill>
+                <a:schemeClr val="accent5">
+                  <a:lumMod val="50000"/>
+                </a:schemeClr>
+              </a:solidFill>
+            </a:endParaRPr>
+          </a:p>
+        </p:txBody>
+      </p:sp>
+      <p:sp>
+        <p:nvSpPr>
+          <p:cNvPr id="4" name="Date Placeholder 3"/>
+          <p:cNvSpPr>
+            <a:spLocks noGrp="1"/>
+          </p:cNvSpPr>
+          <p:nvPr>
+            <p:ph type="dt" sz="half" idx="10"/>
+          </p:nvPr>
+        </p:nvSpPr>
+        <p:spPr/>
+        <p:txBody>
+          <a:bodyPr/>
+          <a:lstStyle/>
+          <a:p>
+            <a:fld id="{05A93482-8E69-40F7-BCAD-5662A6CADB27}" type="datetime4">
+              <a:rPr lang="en-US" smtClean="0"/>
+              <a:pPr/>
+              <a:t>October 16, 2010</a:t>
+            </a:fld>
+            <a:endParaRPr lang="en-US"/>
+          </a:p>
+        </p:txBody>
+      </p:sp>
+      <p:sp>
+        <p:nvSpPr>
+          <p:cNvPr id="5" name="Footer Placeholder 4"/>
+          <p:cNvSpPr>
+            <a:spLocks noGrp="1"/>
+          </p:cNvSpPr>
+          <p:nvPr>
+            <p:ph type="ftr" sz="quarter" idx="11"/>
+          </p:nvPr>
+        </p:nvSpPr>
+        <p:spPr/>
+        <p:txBody>
+          <a:bodyPr/>
+          <a:lstStyle/>
+          <a:p>
+            <a:endParaRPr lang="en-US"/>
+          </a:p>
+        </p:txBody>
+      </p:sp>
+      <p:sp>
+        <p:nvSpPr>
+          <p:cNvPr id="6" name="Slide Number Placeholder 5"/>
+          <p:cNvSpPr>
+            <a:spLocks noGrp="1"/>
+          </p:cNvSpPr>
+          <p:nvPr>
+            <p:ph type="sldNum" sz="quarter" idx="12"/>
+          </p:nvPr>
+        </p:nvSpPr>
+        <p:spPr/>
+        <p:txBody>
+          <a:bodyPr/>
+          <a:lstStyle/>
+          <a:p>
+            <a:fld id="{8B37D5FE-740C-46F5-801A-FA5477D9711F}" type="slidenum">
+              <a:rPr lang="en-US" smtClean="0"/>
+              <a:pPr/>
+              <a:t>17</a:t>
             </a:fld>
             <a:endParaRPr lang="en-US"/>
           </a:p>
@@ -16143,7 +16286,7 @@
             <a:fld id="{05A93482-8E69-40F7-BCAD-5662A6CADB27}" type="datetime4">
               <a:rPr lang="en-US" smtClean="0"/>
               <a:pPr/>
-              <a:t>October 14, 2010</a:t>
+              <a:t>October 16, 2010</a:t>
             </a:fld>
             <a:endParaRPr lang="en-US"/>
           </a:p>
@@ -16881,7 +17024,7 @@
             <a:fld id="{05A93482-8E69-40F7-BCAD-5662A6CADB27}" type="datetime4">
               <a:rPr lang="en-US" smtClean="0"/>
               <a:pPr/>
-              <a:t>October 14, 2010</a:t>
+              <a:t>October 16, 2010</a:t>
             </a:fld>
             <a:endParaRPr lang="en-US"/>
           </a:p>
@@ -17057,7 +17200,7 @@
             <a:fld id="{05A93482-8E69-40F7-BCAD-5662A6CADB27}" type="datetime4">
               <a:rPr lang="en-US" smtClean="0"/>
               <a:pPr/>
-              <a:t>October 14, 2010</a:t>
+              <a:t>October 16, 2010</a:t>
             </a:fld>
             <a:endParaRPr lang="en-US"/>
           </a:p>
@@ -17159,7 +17302,37 @@
                   </a:schemeClr>
                 </a:solidFill>
               </a:rPr>
-              <a:t>F# Primer/Review</a:t>
+              <a:t>Why F</a:t>
+            </a:r>
+            <a:r>
+              <a:rPr lang="en-US" dirty="0" smtClean="0">
+                <a:solidFill>
+                  <a:schemeClr val="accent5">
+                    <a:lumMod val="50000"/>
+                  </a:schemeClr>
+                </a:solidFill>
+              </a:rPr>
+              <a:t># for Web </a:t>
+            </a:r>
+            <a:r>
+              <a:rPr lang="en-US" dirty="0" err="1" smtClean="0">
+                <a:solidFill>
+                  <a:schemeClr val="accent5">
+                    <a:lumMod val="50000"/>
+                  </a:schemeClr>
+                </a:solidFill>
+              </a:rPr>
+              <a:t>Dev</a:t>
+            </a:r>
+            <a:r>
+              <a:rPr lang="en-US" dirty="0" smtClean="0">
+                <a:solidFill>
+                  <a:schemeClr val="accent5">
+                    <a:lumMod val="50000"/>
+                  </a:schemeClr>
+                </a:solidFill>
+              </a:rPr>
+              <a:t>?</a:t>
             </a:r>
             <a:endParaRPr lang="en-US" dirty="0"/>
           </a:p>
@@ -17182,42 +17355,50 @@
           </a:bodyPr>
           <a:lstStyle/>
           <a:p>
+            <a:r>
+              <a:rPr lang="en-US" dirty="0" smtClean="0"/>
+              <a:t>Asynchronous Workflows</a:t>
+            </a:r>
             <a:endParaRPr lang="en-US" dirty="0" smtClean="0"/>
           </a:p>
           <a:p>
             <a:r>
               <a:rPr lang="en-US" dirty="0" smtClean="0"/>
-              <a:t>Whitespace Matters</a:t>
-            </a:r>
+              <a:t>F#/</a:t>
+            </a:r>
+            <a:r>
+              <a:rPr lang="en-US" smtClean="0"/>
+              <a:t>JavaScript Commonalities</a:t>
+            </a:r>
+            <a:endParaRPr lang="en-US" dirty="0" smtClean="0"/>
           </a:p>
           <a:p>
             <a:r>
               <a:rPr lang="en-US" dirty="0" smtClean="0"/>
-              <a:t>The let Keyword</a:t>
-            </a:r>
-          </a:p>
-          <a:p>
+              <a:t>Easier to support next generation web development </a:t>
+            </a:r>
+          </a:p>
+          <a:p>
+            <a:pPr lvl="1"/>
             <a:r>
               <a:rPr lang="en-US" dirty="0" smtClean="0"/>
-              <a:t>First-Class Functions</a:t>
-            </a:r>
-          </a:p>
-          <a:p>
+              <a:t>Silverlight</a:t>
+            </a:r>
+          </a:p>
+          <a:p>
+            <a:pPr lvl="1"/>
             <a:r>
               <a:rPr lang="en-US" dirty="0" smtClean="0"/>
-              <a:t>Pattern Matching</a:t>
-            </a:r>
-          </a:p>
-          <a:p>
+              <a:t>HTML5 (</a:t>
+            </a:r>
+            <a:r>
+              <a:rPr lang="en-US" dirty="0"/>
+              <a:t>W</a:t>
+            </a:r>
             <a:r>
               <a:rPr lang="en-US" dirty="0" smtClean="0"/>
-              <a:t>More During the Demos</a:t>
-            </a:r>
-          </a:p>
-          <a:p>
-            <a:pPr marL="68580" indent="0">
-              <a:buNone/>
-            </a:pPr>
+              <a:t>eb Sockets, Canvas)</a:t>
+            </a:r>
             <a:endParaRPr lang="en-US" dirty="0" smtClean="0"/>
           </a:p>
         </p:txBody>
@@ -17240,7 +17421,7 @@
             <a:fld id="{05A93482-8E69-40F7-BCAD-5662A6CADB27}" type="datetime4">
               <a:rPr lang="en-US" smtClean="0"/>
               <a:pPr/>
-              <a:t>October 14, 2010</a:t>
+              <a:t>October 16, 2010</a:t>
             </a:fld>
             <a:endParaRPr lang="en-US"/>
           </a:p>
@@ -17292,7 +17473,7 @@
     </p:spTree>
     <p:extLst>
       <p:ext uri="{BB962C8B-B14F-4D97-AF65-F5344CB8AC3E}">
-        <p14:creationId xmlns:p14="http://schemas.microsoft.com/office/powerpoint/2010/main" val="348386992"/>
+        <p14:creationId xmlns:p14="http://schemas.microsoft.com/office/powerpoint/2010/main" val="1658424100"/>
       </p:ext>
     </p:extLst>
   </p:cSld>
@@ -17329,29 +17510,79 @@
             <p:ph type="title"/>
           </p:nvPr>
         </p:nvSpPr>
-        <p:spPr>
-          <a:xfrm>
-            <a:off x="1043490" y="1027664"/>
-            <a:ext cx="7024744" cy="724936"/>
-          </a:xfrm>
-        </p:spPr>
+        <p:spPr/>
+        <p:txBody>
+          <a:bodyPr/>
+          <a:lstStyle/>
+          <a:p>
+            <a:r>
+              <a:rPr lang="en-US" dirty="0" smtClean="0">
+                <a:solidFill>
+                  <a:schemeClr val="accent5">
+                    <a:lumMod val="50000"/>
+                  </a:schemeClr>
+                </a:solidFill>
+              </a:rPr>
+              <a:t>F# Primer/Review</a:t>
+            </a:r>
+            <a:endParaRPr lang="en-US" dirty="0"/>
+          </a:p>
+        </p:txBody>
+      </p:sp>
+      <p:sp>
+        <p:nvSpPr>
+          <p:cNvPr id="3" name="Content Placeholder 2"/>
+          <p:cNvSpPr>
+            <a:spLocks noGrp="1"/>
+          </p:cNvSpPr>
+          <p:nvPr>
+            <p:ph idx="1"/>
+          </p:nvPr>
+        </p:nvSpPr>
+        <p:spPr/>
         <p:txBody>
           <a:bodyPr>
             <a:normAutofit/>
           </a:bodyPr>
           <a:lstStyle/>
           <a:p>
-            <a:r>
-              <a:rPr lang="en-US" dirty="0" smtClean="0">
-                <a:solidFill>
-                  <a:schemeClr val="accent5">
-                    <a:lumMod val="50000"/>
-                  </a:schemeClr>
-                </a:solidFill>
-              </a:rPr>
+            <a:endParaRPr lang="en-US" dirty="0" smtClean="0"/>
+          </a:p>
+          <a:p>
+            <a:r>
+              <a:rPr lang="en-US" dirty="0" smtClean="0"/>
               <a:t>Whitespace Matters</a:t>
             </a:r>
-            <a:endParaRPr lang="en-US" dirty="0"/>
+          </a:p>
+          <a:p>
+            <a:r>
+              <a:rPr lang="en-US" dirty="0" smtClean="0"/>
+              <a:t>The let Keyword</a:t>
+            </a:r>
+          </a:p>
+          <a:p>
+            <a:r>
+              <a:rPr lang="en-US" dirty="0" smtClean="0"/>
+              <a:t>First-Class Functions</a:t>
+            </a:r>
+          </a:p>
+          <a:p>
+            <a:r>
+              <a:rPr lang="en-US" dirty="0" smtClean="0"/>
+              <a:t>Pattern Matching</a:t>
+            </a:r>
+          </a:p>
+          <a:p>
+            <a:r>
+              <a:rPr lang="en-US" dirty="0" smtClean="0"/>
+              <a:t>More During the Demos</a:t>
+            </a:r>
+          </a:p>
+          <a:p>
+            <a:pPr marL="68580" indent="0">
+              <a:buNone/>
+            </a:pPr>
+            <a:endParaRPr lang="en-US" dirty="0" smtClean="0"/>
           </a:p>
         </p:txBody>
       </p:sp>
@@ -17373,8 +17604,27 @@
             <a:fld id="{05A93482-8E69-40F7-BCAD-5662A6CADB27}" type="datetime4">
               <a:rPr lang="en-US" smtClean="0"/>
               <a:pPr/>
-              <a:t>October 14, 2010</a:t>
+              <a:t>October 16, 2010</a:t>
             </a:fld>
+            <a:endParaRPr lang="en-US"/>
+          </a:p>
+        </p:txBody>
+      </p:sp>
+      <p:sp>
+        <p:nvSpPr>
+          <p:cNvPr id="5" name="Footer Placeholder 4"/>
+          <p:cNvSpPr>
+            <a:spLocks noGrp="1"/>
+          </p:cNvSpPr>
+          <p:nvPr>
+            <p:ph type="ftr" sz="quarter" idx="11"/>
+          </p:nvPr>
+        </p:nvSpPr>
+        <p:spPr/>
+        <p:txBody>
+          <a:bodyPr/>
+          <a:lstStyle/>
+          <a:p>
             <a:endParaRPr lang="en-US"/>
           </a:p>
         </p:txBody>
@@ -17403,1320 +17653,10 @@
           </a:p>
         </p:txBody>
       </p:sp>
-      <p:sp>
-        <p:nvSpPr>
-          <p:cNvPr id="7" name="Content Placeholder 2"/>
-          <p:cNvSpPr>
-            <a:spLocks noGrp="1"/>
-          </p:cNvSpPr>
-          <p:nvPr/>
-        </p:nvSpPr>
-        <p:spPr bwMode="auto">
-          <a:xfrm>
-            <a:off x="391851" y="1633550"/>
-            <a:ext cx="3614735" cy="4978565"/>
-          </a:xfrm>
-          <a:prstGeom prst="rect">
-            <a:avLst/>
-          </a:prstGeom>
-          <a:noFill/>
-          <a:ln w="9525">
-            <a:noFill/>
-            <a:miter lim="800000"/>
-            <a:headEnd/>
-            <a:tailEnd/>
-          </a:ln>
-        </p:spPr>
-        <p:txBody>
-          <a:bodyPr vert="horz" wrap="square" lIns="91440" tIns="45720" rIns="91440" bIns="45720" numCol="1" anchor="t" anchorCtr="0" compatLnSpc="1">
-            <a:prstTxWarp prst="textNoShape">
-              <a:avLst/>
-            </a:prstTxWarp>
-            <a:normAutofit/>
-          </a:bodyPr>
-          <a:lstStyle>
-            <a:lvl1pPr marL="342900" indent="-342900" algn="l" rtl="0" eaLnBrk="0" fontAlgn="base" hangingPunct="0">
-              <a:spcBef>
-                <a:spcPct val="20000"/>
-              </a:spcBef>
-              <a:spcAft>
-                <a:spcPct val="0"/>
-              </a:spcAft>
-              <a:buClr>
-                <a:schemeClr val="accent1"/>
-              </a:buClr>
-              <a:buChar char="•"/>
-              <a:defRPr sz="2400">
-                <a:solidFill>
-                  <a:schemeClr val="bg1"/>
-                </a:solidFill>
-                <a:latin typeface="+mn-lt"/>
-                <a:ea typeface="+mn-ea"/>
-                <a:cs typeface="+mn-cs"/>
-              </a:defRPr>
-            </a:lvl1pPr>
-            <a:lvl2pPr marL="742950" indent="-285750" algn="l" rtl="0" eaLnBrk="0" fontAlgn="base" hangingPunct="0">
-              <a:spcBef>
-                <a:spcPct val="20000"/>
-              </a:spcBef>
-              <a:spcAft>
-                <a:spcPct val="0"/>
-              </a:spcAft>
-              <a:buClr>
-                <a:schemeClr val="accent1"/>
-              </a:buClr>
-              <a:buChar char="•"/>
-              <a:defRPr sz="2000">
-                <a:solidFill>
-                  <a:schemeClr val="bg1"/>
-                </a:solidFill>
-                <a:latin typeface="+mn-lt"/>
-              </a:defRPr>
-            </a:lvl2pPr>
-            <a:lvl3pPr marL="1143000" indent="-228600" algn="l" rtl="0" eaLnBrk="0" fontAlgn="base" hangingPunct="0">
-              <a:spcBef>
-                <a:spcPct val="20000"/>
-              </a:spcBef>
-              <a:spcAft>
-                <a:spcPct val="0"/>
-              </a:spcAft>
-              <a:buClr>
-                <a:schemeClr val="accent1"/>
-              </a:buClr>
-              <a:buChar char="•"/>
-              <a:defRPr sz="2400">
-                <a:solidFill>
-                  <a:schemeClr val="bg1"/>
-                </a:solidFill>
-                <a:latin typeface="+mn-lt"/>
-              </a:defRPr>
-            </a:lvl3pPr>
-            <a:lvl4pPr marL="1600200" indent="-228600" algn="l" rtl="0" eaLnBrk="0" fontAlgn="base" hangingPunct="0">
-              <a:spcBef>
-                <a:spcPct val="20000"/>
-              </a:spcBef>
-              <a:spcAft>
-                <a:spcPct val="0"/>
-              </a:spcAft>
-              <a:buClr>
-                <a:schemeClr val="accent1"/>
-              </a:buClr>
-              <a:buChar char="•"/>
-              <a:defRPr sz="2000">
-                <a:solidFill>
-                  <a:schemeClr val="bg1"/>
-                </a:solidFill>
-                <a:latin typeface="+mn-lt"/>
-              </a:defRPr>
-            </a:lvl4pPr>
-            <a:lvl5pPr marL="2057400" indent="-228600" algn="l" rtl="0" eaLnBrk="0" fontAlgn="base" hangingPunct="0">
-              <a:spcBef>
-                <a:spcPct val="20000"/>
-              </a:spcBef>
-              <a:spcAft>
-                <a:spcPct val="0"/>
-              </a:spcAft>
-              <a:buClr>
-                <a:schemeClr val="accent1"/>
-              </a:buClr>
-              <a:buChar char="•"/>
-              <a:defRPr sz="2000">
-                <a:solidFill>
-                  <a:schemeClr val="bg1"/>
-                </a:solidFill>
-                <a:latin typeface="+mn-lt"/>
-              </a:defRPr>
-            </a:lvl5pPr>
-            <a:lvl6pPr marL="2514600" indent="-228600" algn="l" rtl="0" eaLnBrk="1" fontAlgn="base" hangingPunct="1">
-              <a:spcBef>
-                <a:spcPct val="20000"/>
-              </a:spcBef>
-              <a:spcAft>
-                <a:spcPct val="0"/>
-              </a:spcAft>
-              <a:buClr>
-                <a:schemeClr val="tx2"/>
-              </a:buClr>
-              <a:buChar char="•"/>
-              <a:defRPr>
-                <a:solidFill>
-                  <a:schemeClr val="tx1"/>
-                </a:solidFill>
-                <a:latin typeface="+mn-lt"/>
-              </a:defRPr>
-            </a:lvl6pPr>
-            <a:lvl7pPr marL="2971800" indent="-228600" algn="l" rtl="0" eaLnBrk="1" fontAlgn="base" hangingPunct="1">
-              <a:spcBef>
-                <a:spcPct val="20000"/>
-              </a:spcBef>
-              <a:spcAft>
-                <a:spcPct val="0"/>
-              </a:spcAft>
-              <a:buClr>
-                <a:schemeClr val="tx2"/>
-              </a:buClr>
-              <a:buChar char="•"/>
-              <a:defRPr>
-                <a:solidFill>
-                  <a:schemeClr val="tx1"/>
-                </a:solidFill>
-                <a:latin typeface="+mn-lt"/>
-              </a:defRPr>
-            </a:lvl7pPr>
-            <a:lvl8pPr marL="3429000" indent="-228600" algn="l" rtl="0" eaLnBrk="1" fontAlgn="base" hangingPunct="1">
-              <a:spcBef>
-                <a:spcPct val="20000"/>
-              </a:spcBef>
-              <a:spcAft>
-                <a:spcPct val="0"/>
-              </a:spcAft>
-              <a:buClr>
-                <a:schemeClr val="tx2"/>
-              </a:buClr>
-              <a:buChar char="•"/>
-              <a:defRPr>
-                <a:solidFill>
-                  <a:schemeClr val="tx1"/>
-                </a:solidFill>
-                <a:latin typeface="+mn-lt"/>
-              </a:defRPr>
-            </a:lvl8pPr>
-            <a:lvl9pPr marL="3886200" indent="-228600" algn="l" rtl="0" eaLnBrk="1" fontAlgn="base" hangingPunct="1">
-              <a:spcBef>
-                <a:spcPct val="20000"/>
-              </a:spcBef>
-              <a:spcAft>
-                <a:spcPct val="0"/>
-              </a:spcAft>
-              <a:buClr>
-                <a:schemeClr val="tx2"/>
-              </a:buClr>
-              <a:buChar char="•"/>
-              <a:defRPr>
-                <a:solidFill>
-                  <a:schemeClr val="tx1"/>
-                </a:solidFill>
-                <a:latin typeface="+mn-lt"/>
-              </a:defRPr>
-            </a:lvl9pPr>
-          </a:lstStyle>
-          <a:p>
-            <a:pPr>
-              <a:buNone/>
-            </a:pPr>
-            <a:r>
-              <a:rPr lang="en-US" sz="1800" b="1" dirty="0" smtClean="0">
-                <a:solidFill>
-                  <a:schemeClr val="accent5">
-                    <a:lumMod val="50000"/>
-                  </a:schemeClr>
-                </a:solidFill>
-                <a:latin typeface="Lucida Console" pitchFamily="49" charset="0"/>
-              </a:rPr>
-              <a:t>//F#</a:t>
-            </a:r>
-          </a:p>
-          <a:p>
-            <a:pPr>
-              <a:buNone/>
-            </a:pPr>
-            <a:r>
-              <a:rPr lang="en-AU" sz="1800" b="1" dirty="0" smtClean="0">
-                <a:solidFill>
-                  <a:schemeClr val="accent5">
-                    <a:lumMod val="50000"/>
-                  </a:schemeClr>
-                </a:solidFill>
-                <a:latin typeface="Lucida Console" pitchFamily="49" charset="0"/>
-              </a:rPr>
-              <a:t>open </a:t>
-            </a:r>
-            <a:r>
-              <a:rPr lang="en-AU" sz="1800" b="1" dirty="0">
-                <a:solidFill>
-                  <a:schemeClr val="accent5">
-                    <a:lumMod val="50000"/>
-                  </a:schemeClr>
-                </a:solidFill>
-                <a:latin typeface="Lucida Console" pitchFamily="49" charset="0"/>
-              </a:rPr>
-              <a:t>System</a:t>
-            </a:r>
-          </a:p>
-          <a:p>
-            <a:pPr>
-              <a:buNone/>
-            </a:pPr>
-            <a:r>
-              <a:rPr lang="en-AU" sz="1800" b="1" dirty="0">
-                <a:solidFill>
-                  <a:schemeClr val="accent5">
-                    <a:lumMod val="50000"/>
-                  </a:schemeClr>
-                </a:solidFill>
-                <a:latin typeface="Lucida Console" pitchFamily="49" charset="0"/>
-              </a:rPr>
-              <a:t>let </a:t>
-            </a:r>
-            <a:r>
-              <a:rPr lang="en-AU" sz="1800" b="1" dirty="0" err="1" smtClean="0">
-                <a:solidFill>
-                  <a:schemeClr val="accent5">
-                    <a:lumMod val="50000"/>
-                  </a:schemeClr>
-                </a:solidFill>
-                <a:latin typeface="Lucida Console" pitchFamily="49" charset="0"/>
-              </a:rPr>
-              <a:t>doSomething</a:t>
-            </a:r>
-            <a:r>
-              <a:rPr lang="en-AU" sz="1800" b="1" dirty="0" smtClean="0">
-                <a:solidFill>
-                  <a:schemeClr val="accent5">
-                    <a:lumMod val="50000"/>
-                  </a:schemeClr>
-                </a:solidFill>
-                <a:latin typeface="Lucida Console" pitchFamily="49" charset="0"/>
-              </a:rPr>
-              <a:t> </a:t>
-            </a:r>
-            <a:r>
-              <a:rPr lang="en-AU" sz="1800" b="1" dirty="0" err="1" smtClean="0">
-                <a:solidFill>
-                  <a:schemeClr val="accent5">
-                    <a:lumMod val="50000"/>
-                  </a:schemeClr>
-                </a:solidFill>
-                <a:latin typeface="Lucida Console" pitchFamily="49" charset="0"/>
-              </a:rPr>
-              <a:t>val</a:t>
-            </a:r>
-            <a:r>
-              <a:rPr lang="en-AU" sz="1800" b="1" dirty="0" smtClean="0">
-                <a:solidFill>
-                  <a:schemeClr val="accent5">
-                    <a:lumMod val="50000"/>
-                  </a:schemeClr>
-                </a:solidFill>
-                <a:latin typeface="Lucida Console" pitchFamily="49" charset="0"/>
-              </a:rPr>
-              <a:t> = </a:t>
-            </a:r>
-          </a:p>
-          <a:p>
-            <a:pPr>
-              <a:buNone/>
-            </a:pPr>
-            <a:r>
-              <a:rPr lang="en-AU" sz="1800" b="1" dirty="0">
-                <a:solidFill>
-                  <a:schemeClr val="accent5">
-                    <a:lumMod val="50000"/>
-                  </a:schemeClr>
-                </a:solidFill>
-                <a:latin typeface="Lucida Console" pitchFamily="49" charset="0"/>
-              </a:rPr>
-              <a:t> </a:t>
-            </a:r>
-            <a:r>
-              <a:rPr lang="en-AU" sz="1800" b="1" dirty="0" smtClean="0">
-                <a:solidFill>
-                  <a:schemeClr val="accent5">
-                    <a:lumMod val="50000"/>
-                  </a:schemeClr>
-                </a:solidFill>
-                <a:latin typeface="Lucida Console" pitchFamily="49" charset="0"/>
-              </a:rPr>
-              <a:t>   </a:t>
-            </a:r>
-            <a:r>
-              <a:rPr lang="en-AU" sz="1800" b="1" dirty="0" err="1" smtClean="0">
-                <a:solidFill>
-                  <a:schemeClr val="accent5">
-                    <a:lumMod val="50000"/>
-                  </a:schemeClr>
-                </a:solidFill>
-                <a:latin typeface="Lucida Console" pitchFamily="49" charset="0"/>
-              </a:rPr>
-              <a:t>val</a:t>
-            </a:r>
-            <a:r>
-              <a:rPr lang="en-AU" sz="1800" b="1" dirty="0" smtClean="0">
-                <a:solidFill>
-                  <a:schemeClr val="accent5">
-                    <a:lumMod val="50000"/>
-                  </a:schemeClr>
-                </a:solidFill>
-                <a:latin typeface="Lucida Console" pitchFamily="49" charset="0"/>
-              </a:rPr>
-              <a:t> + </a:t>
-            </a:r>
-            <a:r>
-              <a:rPr lang="en-AU" sz="1800" b="1" dirty="0" err="1" smtClean="0">
-                <a:solidFill>
-                  <a:schemeClr val="accent5">
-                    <a:lumMod val="50000"/>
-                  </a:schemeClr>
-                </a:solidFill>
-                <a:latin typeface="Lucida Console" pitchFamily="49" charset="0"/>
-              </a:rPr>
-              <a:t>val</a:t>
-            </a:r>
-            <a:endParaRPr lang="en-AU" sz="1800" b="1" dirty="0">
-              <a:solidFill>
-                <a:schemeClr val="accent5">
-                  <a:lumMod val="50000"/>
-                </a:schemeClr>
-              </a:solidFill>
-              <a:latin typeface="Lucida Console" pitchFamily="49" charset="0"/>
-            </a:endParaRPr>
-          </a:p>
-          <a:p>
-            <a:pPr>
-              <a:buNone/>
-            </a:pPr>
-            <a:r>
-              <a:rPr lang="en-AU" sz="1800" b="1" dirty="0" err="1" smtClean="0">
-                <a:solidFill>
-                  <a:schemeClr val="accent5">
-                    <a:lumMod val="50000"/>
-                  </a:schemeClr>
-                </a:solidFill>
-                <a:latin typeface="Lucida Console" pitchFamily="49" charset="0"/>
-              </a:rPr>
-              <a:t>Console.WriteLine</a:t>
-            </a:r>
-            <a:r>
-              <a:rPr lang="en-AU" sz="1800" b="1" dirty="0" smtClean="0">
-                <a:solidFill>
-                  <a:schemeClr val="accent5">
-                    <a:lumMod val="50000"/>
-                  </a:schemeClr>
-                </a:solidFill>
-                <a:latin typeface="Lucida Console" pitchFamily="49" charset="0"/>
-              </a:rPr>
-              <a:t> </a:t>
-            </a:r>
-          </a:p>
-          <a:p>
-            <a:pPr>
-              <a:buNone/>
-            </a:pPr>
-            <a:r>
-              <a:rPr lang="en-AU" sz="1800" b="1" dirty="0">
-                <a:solidFill>
-                  <a:schemeClr val="accent5">
-                    <a:lumMod val="50000"/>
-                  </a:schemeClr>
-                </a:solidFill>
-                <a:latin typeface="Lucida Console" pitchFamily="49" charset="0"/>
-              </a:rPr>
-              <a:t> </a:t>
-            </a:r>
-            <a:r>
-              <a:rPr lang="en-AU" sz="1800" b="1" dirty="0" smtClean="0">
-                <a:solidFill>
-                  <a:schemeClr val="accent5">
-                    <a:lumMod val="50000"/>
-                  </a:schemeClr>
-                </a:solidFill>
-                <a:latin typeface="Lucida Console" pitchFamily="49" charset="0"/>
-              </a:rPr>
-              <a:t>   (</a:t>
-            </a:r>
-            <a:r>
-              <a:rPr lang="en-AU" sz="1800" b="1" dirty="0" err="1" smtClean="0">
-                <a:solidFill>
-                  <a:schemeClr val="accent5">
-                    <a:lumMod val="50000"/>
-                  </a:schemeClr>
-                </a:solidFill>
-                <a:latin typeface="Lucida Console" pitchFamily="49" charset="0"/>
-              </a:rPr>
-              <a:t>doSomething</a:t>
-            </a:r>
-            <a:r>
-              <a:rPr lang="en-AU" sz="1800" b="1" dirty="0" smtClean="0">
-                <a:solidFill>
-                  <a:schemeClr val="accent5">
-                    <a:lumMod val="50000"/>
-                  </a:schemeClr>
-                </a:solidFill>
-                <a:latin typeface="Lucida Console" pitchFamily="49" charset="0"/>
-              </a:rPr>
-              <a:t> 1)</a:t>
-            </a:r>
-            <a:endParaRPr lang="en-US" sz="1800" b="1" dirty="0">
-              <a:solidFill>
-                <a:schemeClr val="accent5">
-                  <a:lumMod val="50000"/>
-                </a:schemeClr>
-              </a:solidFill>
-              <a:latin typeface="Lucida Console" pitchFamily="49" charset="0"/>
-            </a:endParaRPr>
-          </a:p>
-        </p:txBody>
-      </p:sp>
-      <p:sp>
-        <p:nvSpPr>
-          <p:cNvPr id="8" name="Content Placeholder 2"/>
-          <p:cNvSpPr txBox="1">
-            <a:spLocks/>
-          </p:cNvSpPr>
-          <p:nvPr/>
-        </p:nvSpPr>
-        <p:spPr>
-          <a:xfrm>
-            <a:off x="3720834" y="1676400"/>
-            <a:ext cx="5423166" cy="4978565"/>
-          </a:xfrm>
-          <a:prstGeom prst="rect">
-            <a:avLst/>
-          </a:prstGeom>
-        </p:spPr>
-        <p:txBody>
-          <a:bodyPr vert="horz" lIns="91432" tIns="45715" rIns="91432" bIns="45715" rtlCol="0">
-            <a:noAutofit/>
-          </a:bodyPr>
-          <a:lstStyle>
-            <a:defPPr>
-              <a:defRPr lang="en-US"/>
-            </a:defPPr>
-            <a:lvl1pPr algn="l" rtl="0" fontAlgn="base">
-              <a:spcBef>
-                <a:spcPct val="0"/>
-              </a:spcBef>
-              <a:spcAft>
-                <a:spcPct val="0"/>
-              </a:spcAft>
-              <a:defRPr kern="1200">
-                <a:solidFill>
-                  <a:srgbClr val="A2998A"/>
-                </a:solidFill>
-                <a:latin typeface="Segoe"/>
-                <a:ea typeface="+mn-ea"/>
-                <a:cs typeface="+mn-cs"/>
-              </a:defRPr>
-            </a:lvl1pPr>
-            <a:lvl2pPr marL="457200" algn="l" rtl="0" fontAlgn="base">
-              <a:spcBef>
-                <a:spcPct val="0"/>
-              </a:spcBef>
-              <a:spcAft>
-                <a:spcPct val="0"/>
-              </a:spcAft>
-              <a:defRPr kern="1200">
-                <a:solidFill>
-                  <a:srgbClr val="A2998A"/>
-                </a:solidFill>
-                <a:latin typeface="Segoe"/>
-                <a:ea typeface="+mn-ea"/>
-                <a:cs typeface="+mn-cs"/>
-              </a:defRPr>
-            </a:lvl2pPr>
-            <a:lvl3pPr marL="914400" algn="l" rtl="0" fontAlgn="base">
-              <a:spcBef>
-                <a:spcPct val="0"/>
-              </a:spcBef>
-              <a:spcAft>
-                <a:spcPct val="0"/>
-              </a:spcAft>
-              <a:defRPr kern="1200">
-                <a:solidFill>
-                  <a:srgbClr val="A2998A"/>
-                </a:solidFill>
-                <a:latin typeface="Segoe"/>
-                <a:ea typeface="+mn-ea"/>
-                <a:cs typeface="+mn-cs"/>
-              </a:defRPr>
-            </a:lvl3pPr>
-            <a:lvl4pPr marL="1371600" algn="l" rtl="0" fontAlgn="base">
-              <a:spcBef>
-                <a:spcPct val="0"/>
-              </a:spcBef>
-              <a:spcAft>
-                <a:spcPct val="0"/>
-              </a:spcAft>
-              <a:defRPr kern="1200">
-                <a:solidFill>
-                  <a:srgbClr val="A2998A"/>
-                </a:solidFill>
-                <a:latin typeface="Segoe"/>
-                <a:ea typeface="+mn-ea"/>
-                <a:cs typeface="+mn-cs"/>
-              </a:defRPr>
-            </a:lvl4pPr>
-            <a:lvl5pPr marL="1828800" algn="l" rtl="0" fontAlgn="base">
-              <a:spcBef>
-                <a:spcPct val="0"/>
-              </a:spcBef>
-              <a:spcAft>
-                <a:spcPct val="0"/>
-              </a:spcAft>
-              <a:defRPr kern="1200">
-                <a:solidFill>
-                  <a:srgbClr val="A2998A"/>
-                </a:solidFill>
-                <a:latin typeface="Segoe"/>
-                <a:ea typeface="+mn-ea"/>
-                <a:cs typeface="+mn-cs"/>
-              </a:defRPr>
-            </a:lvl5pPr>
-            <a:lvl6pPr marL="2286000" algn="l" defTabSz="914400" rtl="0" eaLnBrk="1" latinLnBrk="0" hangingPunct="1">
-              <a:defRPr kern="1200">
-                <a:solidFill>
-                  <a:srgbClr val="A2998A"/>
-                </a:solidFill>
-                <a:latin typeface="Segoe"/>
-                <a:ea typeface="+mn-ea"/>
-                <a:cs typeface="+mn-cs"/>
-              </a:defRPr>
-            </a:lvl6pPr>
-            <a:lvl7pPr marL="2743200" algn="l" defTabSz="914400" rtl="0" eaLnBrk="1" latinLnBrk="0" hangingPunct="1">
-              <a:defRPr kern="1200">
-                <a:solidFill>
-                  <a:srgbClr val="A2998A"/>
-                </a:solidFill>
-                <a:latin typeface="Segoe"/>
-                <a:ea typeface="+mn-ea"/>
-                <a:cs typeface="+mn-cs"/>
-              </a:defRPr>
-            </a:lvl7pPr>
-            <a:lvl8pPr marL="3200400" algn="l" defTabSz="914400" rtl="0" eaLnBrk="1" latinLnBrk="0" hangingPunct="1">
-              <a:defRPr kern="1200">
-                <a:solidFill>
-                  <a:srgbClr val="A2998A"/>
-                </a:solidFill>
-                <a:latin typeface="Segoe"/>
-                <a:ea typeface="+mn-ea"/>
-                <a:cs typeface="+mn-cs"/>
-              </a:defRPr>
-            </a:lvl8pPr>
-            <a:lvl9pPr marL="3657600" algn="l" defTabSz="914400" rtl="0" eaLnBrk="1" latinLnBrk="0" hangingPunct="1">
-              <a:defRPr kern="1200">
-                <a:solidFill>
-                  <a:srgbClr val="A2998A"/>
-                </a:solidFill>
-                <a:latin typeface="Segoe"/>
-                <a:ea typeface="+mn-ea"/>
-                <a:cs typeface="+mn-cs"/>
-              </a:defRPr>
-            </a:lvl9pPr>
-          </a:lstStyle>
-          <a:p>
-            <a:pPr marL="342871" indent="-342871">
-              <a:spcBef>
-                <a:spcPct val="20000"/>
-              </a:spcBef>
-              <a:defRPr/>
-            </a:pPr>
-            <a:r>
-              <a:rPr lang="en-US" b="1" dirty="0">
-                <a:solidFill>
-                  <a:schemeClr val="tx2">
-                    <a:lumMod val="60000"/>
-                    <a:lumOff val="40000"/>
-                  </a:schemeClr>
-                </a:solidFill>
-                <a:latin typeface="Lucida Console" pitchFamily="49" charset="0"/>
-              </a:rPr>
-              <a:t>//C#</a:t>
-            </a:r>
-          </a:p>
-          <a:p>
-            <a:r>
-              <a:rPr lang="en-AU" b="1" dirty="0">
-                <a:solidFill>
-                  <a:schemeClr val="tx2">
-                    <a:lumMod val="60000"/>
-                    <a:lumOff val="40000"/>
-                  </a:schemeClr>
-                </a:solidFill>
-                <a:latin typeface="Lucida Console" pitchFamily="49" charset="0"/>
-              </a:rPr>
-              <a:t>using System;</a:t>
-            </a:r>
-          </a:p>
-          <a:p>
-            <a:endParaRPr lang="en-AU" b="1" dirty="0">
-              <a:solidFill>
-                <a:schemeClr val="tx2">
-                  <a:lumMod val="60000"/>
-                  <a:lumOff val="40000"/>
-                </a:schemeClr>
-              </a:solidFill>
-              <a:latin typeface="Lucida Console" pitchFamily="49" charset="0"/>
-            </a:endParaRPr>
-          </a:p>
-          <a:p>
-            <a:r>
-              <a:rPr lang="en-AU" b="1" dirty="0">
-                <a:solidFill>
-                  <a:schemeClr val="tx2">
-                    <a:lumMod val="60000"/>
-                    <a:lumOff val="40000"/>
-                  </a:schemeClr>
-                </a:solidFill>
-                <a:latin typeface="Lucida Console" pitchFamily="49" charset="0"/>
-              </a:rPr>
-              <a:t>namespace ConsoleApplication1</a:t>
-            </a:r>
-          </a:p>
-          <a:p>
-            <a:r>
-              <a:rPr lang="en-AU" b="1" dirty="0">
-                <a:solidFill>
-                  <a:schemeClr val="tx2">
-                    <a:lumMod val="60000"/>
-                    <a:lumOff val="40000"/>
-                  </a:schemeClr>
-                </a:solidFill>
-                <a:latin typeface="Lucida Console" pitchFamily="49" charset="0"/>
-              </a:rPr>
-              <a:t>{</a:t>
-            </a:r>
-          </a:p>
-          <a:p>
-            <a:r>
-              <a:rPr lang="en-AU" b="1" dirty="0">
-                <a:solidFill>
-                  <a:schemeClr val="tx2">
-                    <a:lumMod val="60000"/>
-                    <a:lumOff val="40000"/>
-                  </a:schemeClr>
-                </a:solidFill>
-                <a:latin typeface="Lucida Console" pitchFamily="49" charset="0"/>
-              </a:rPr>
-              <a:t>  </a:t>
-            </a:r>
-            <a:r>
-              <a:rPr lang="en-AU" b="1" dirty="0" smtClean="0">
-                <a:solidFill>
-                  <a:schemeClr val="tx2">
-                    <a:lumMod val="60000"/>
-                    <a:lumOff val="40000"/>
-                  </a:schemeClr>
-                </a:solidFill>
-                <a:latin typeface="Lucida Console" pitchFamily="49" charset="0"/>
-              </a:rPr>
-              <a:t>class </a:t>
-            </a:r>
-            <a:r>
-              <a:rPr lang="en-AU" b="1" dirty="0">
-                <a:solidFill>
-                  <a:schemeClr val="tx2">
-                    <a:lumMod val="60000"/>
-                    <a:lumOff val="40000"/>
-                  </a:schemeClr>
-                </a:solidFill>
-                <a:latin typeface="Lucida Console" pitchFamily="49" charset="0"/>
-              </a:rPr>
-              <a:t>Program</a:t>
-            </a:r>
-          </a:p>
-          <a:p>
-            <a:r>
-              <a:rPr lang="en-AU" b="1" dirty="0">
-                <a:solidFill>
-                  <a:schemeClr val="tx2">
-                    <a:lumMod val="60000"/>
-                    <a:lumOff val="40000"/>
-                  </a:schemeClr>
-                </a:solidFill>
-                <a:latin typeface="Lucida Console" pitchFamily="49" charset="0"/>
-              </a:rPr>
-              <a:t>  </a:t>
-            </a:r>
-            <a:r>
-              <a:rPr lang="en-AU" b="1" dirty="0" smtClean="0">
-                <a:solidFill>
-                  <a:schemeClr val="tx2">
-                    <a:lumMod val="60000"/>
-                    <a:lumOff val="40000"/>
-                  </a:schemeClr>
-                </a:solidFill>
-                <a:latin typeface="Lucida Console" pitchFamily="49" charset="0"/>
-              </a:rPr>
-              <a:t>{</a:t>
-            </a:r>
-            <a:endParaRPr lang="en-AU" b="1" dirty="0">
-              <a:solidFill>
-                <a:schemeClr val="tx2">
-                  <a:lumMod val="60000"/>
-                  <a:lumOff val="40000"/>
-                </a:schemeClr>
-              </a:solidFill>
-              <a:latin typeface="Lucida Console" pitchFamily="49" charset="0"/>
-            </a:endParaRPr>
-          </a:p>
-          <a:p>
-            <a:r>
-              <a:rPr lang="en-AU" b="1" dirty="0">
-                <a:solidFill>
-                  <a:schemeClr val="tx2">
-                    <a:lumMod val="60000"/>
-                    <a:lumOff val="40000"/>
-                  </a:schemeClr>
-                </a:solidFill>
-                <a:latin typeface="Lucida Console" pitchFamily="49" charset="0"/>
-              </a:rPr>
-              <a:t>  </a:t>
-            </a:r>
-            <a:r>
-              <a:rPr lang="en-AU" b="1" dirty="0" smtClean="0">
-                <a:solidFill>
-                  <a:schemeClr val="tx2">
-                    <a:lumMod val="60000"/>
-                    <a:lumOff val="40000"/>
-                  </a:schemeClr>
-                </a:solidFill>
-                <a:latin typeface="Lucida Console" pitchFamily="49" charset="0"/>
-              </a:rPr>
-              <a:t>  </a:t>
-            </a:r>
-            <a:r>
-              <a:rPr lang="en-AU" b="1" dirty="0">
-                <a:solidFill>
-                  <a:schemeClr val="tx2">
-                    <a:lumMod val="60000"/>
-                    <a:lumOff val="40000"/>
-                  </a:schemeClr>
-                </a:solidFill>
-                <a:latin typeface="Lucida Console" pitchFamily="49" charset="0"/>
-              </a:rPr>
-              <a:t>static </a:t>
-            </a:r>
-            <a:r>
-              <a:rPr lang="en-AU" b="1" dirty="0" err="1">
-                <a:solidFill>
-                  <a:schemeClr val="tx2">
-                    <a:lumMod val="60000"/>
-                    <a:lumOff val="40000"/>
-                  </a:schemeClr>
-                </a:solidFill>
-                <a:latin typeface="Lucida Console" pitchFamily="49" charset="0"/>
-              </a:rPr>
-              <a:t>int</a:t>
-            </a:r>
-            <a:r>
-              <a:rPr lang="en-AU" b="1" dirty="0">
-                <a:solidFill>
-                  <a:schemeClr val="tx2">
-                    <a:lumMod val="60000"/>
-                    <a:lumOff val="40000"/>
-                  </a:schemeClr>
-                </a:solidFill>
-                <a:latin typeface="Lucida Console" pitchFamily="49" charset="0"/>
-              </a:rPr>
-              <a:t> </a:t>
-            </a:r>
-            <a:r>
-              <a:rPr lang="en-AU" b="1" dirty="0" err="1" smtClean="0">
-                <a:solidFill>
-                  <a:schemeClr val="tx2">
-                    <a:lumMod val="60000"/>
-                    <a:lumOff val="40000"/>
-                  </a:schemeClr>
-                </a:solidFill>
-                <a:latin typeface="Lucida Console" pitchFamily="49" charset="0"/>
-              </a:rPr>
-              <a:t>doSomething</a:t>
-            </a:r>
-            <a:r>
-              <a:rPr lang="en-AU" b="1" dirty="0" smtClean="0">
-                <a:solidFill>
-                  <a:schemeClr val="tx2">
-                    <a:lumMod val="60000"/>
-                    <a:lumOff val="40000"/>
-                  </a:schemeClr>
-                </a:solidFill>
-                <a:latin typeface="Lucida Console" pitchFamily="49" charset="0"/>
-              </a:rPr>
-              <a:t>(</a:t>
-            </a:r>
-            <a:r>
-              <a:rPr lang="en-AU" b="1" dirty="0" err="1" smtClean="0">
-                <a:solidFill>
-                  <a:schemeClr val="tx2">
-                    <a:lumMod val="60000"/>
-                    <a:lumOff val="40000"/>
-                  </a:schemeClr>
-                </a:solidFill>
-                <a:latin typeface="Lucida Console" pitchFamily="49" charset="0"/>
-              </a:rPr>
-              <a:t>int</a:t>
-            </a:r>
-            <a:r>
-              <a:rPr lang="en-AU" b="1" dirty="0" smtClean="0">
-                <a:solidFill>
-                  <a:schemeClr val="tx2">
-                    <a:lumMod val="60000"/>
-                    <a:lumOff val="40000"/>
-                  </a:schemeClr>
-                </a:solidFill>
-                <a:latin typeface="Lucida Console" pitchFamily="49" charset="0"/>
-              </a:rPr>
-              <a:t> </a:t>
-            </a:r>
-            <a:r>
-              <a:rPr lang="en-AU" b="1" dirty="0" err="1" smtClean="0">
-                <a:solidFill>
-                  <a:schemeClr val="tx2">
-                    <a:lumMod val="60000"/>
-                    <a:lumOff val="40000"/>
-                  </a:schemeClr>
-                </a:solidFill>
-                <a:latin typeface="Lucida Console" pitchFamily="49" charset="0"/>
-              </a:rPr>
-              <a:t>val</a:t>
-            </a:r>
-            <a:r>
-              <a:rPr lang="en-AU" b="1" dirty="0" smtClean="0">
-                <a:solidFill>
-                  <a:schemeClr val="tx2">
-                    <a:lumMod val="60000"/>
-                    <a:lumOff val="40000"/>
-                  </a:schemeClr>
-                </a:solidFill>
-                <a:latin typeface="Lucida Console" pitchFamily="49" charset="0"/>
-              </a:rPr>
-              <a:t>)</a:t>
-            </a:r>
-            <a:endParaRPr lang="en-AU" b="1" dirty="0">
-              <a:solidFill>
-                <a:schemeClr val="tx2">
-                  <a:lumMod val="60000"/>
-                  <a:lumOff val="40000"/>
-                </a:schemeClr>
-              </a:solidFill>
-              <a:latin typeface="Lucida Console" pitchFamily="49" charset="0"/>
-            </a:endParaRPr>
-          </a:p>
-          <a:p>
-            <a:r>
-              <a:rPr lang="en-AU" b="1" dirty="0">
-                <a:solidFill>
-                  <a:schemeClr val="tx2">
-                    <a:lumMod val="60000"/>
-                    <a:lumOff val="40000"/>
-                  </a:schemeClr>
-                </a:solidFill>
-                <a:latin typeface="Lucida Console" pitchFamily="49" charset="0"/>
-              </a:rPr>
-              <a:t>  </a:t>
-            </a:r>
-            <a:r>
-              <a:rPr lang="en-AU" b="1" dirty="0" smtClean="0">
-                <a:solidFill>
-                  <a:schemeClr val="tx2">
-                    <a:lumMod val="60000"/>
-                    <a:lumOff val="40000"/>
-                  </a:schemeClr>
-                </a:solidFill>
-                <a:latin typeface="Lucida Console" pitchFamily="49" charset="0"/>
-              </a:rPr>
-              <a:t>  </a:t>
-            </a:r>
-            <a:r>
-              <a:rPr lang="en-AU" b="1" dirty="0">
-                <a:solidFill>
-                  <a:schemeClr val="tx2">
-                    <a:lumMod val="60000"/>
-                    <a:lumOff val="40000"/>
-                  </a:schemeClr>
-                </a:solidFill>
-                <a:latin typeface="Lucida Console" pitchFamily="49" charset="0"/>
-              </a:rPr>
-              <a:t>{</a:t>
-            </a:r>
-          </a:p>
-          <a:p>
-            <a:r>
-              <a:rPr lang="en-AU" b="1" dirty="0">
-                <a:solidFill>
-                  <a:schemeClr val="tx2">
-                    <a:lumMod val="60000"/>
-                    <a:lumOff val="40000"/>
-                  </a:schemeClr>
-                </a:solidFill>
-                <a:latin typeface="Lucida Console" pitchFamily="49" charset="0"/>
-              </a:rPr>
-              <a:t>  </a:t>
-            </a:r>
-            <a:r>
-              <a:rPr lang="en-AU" b="1" dirty="0" smtClean="0">
-                <a:solidFill>
-                  <a:schemeClr val="tx2">
-                    <a:lumMod val="60000"/>
-                    <a:lumOff val="40000"/>
-                  </a:schemeClr>
-                </a:solidFill>
-                <a:latin typeface="Lucida Console" pitchFamily="49" charset="0"/>
-              </a:rPr>
-              <a:t>      </a:t>
-            </a:r>
-            <a:r>
-              <a:rPr lang="en-AU" b="1" dirty="0">
-                <a:solidFill>
-                  <a:schemeClr val="tx2">
-                    <a:lumMod val="60000"/>
-                    <a:lumOff val="40000"/>
-                  </a:schemeClr>
-                </a:solidFill>
-                <a:latin typeface="Lucida Console" pitchFamily="49" charset="0"/>
-              </a:rPr>
-              <a:t>return </a:t>
-            </a:r>
-            <a:r>
-              <a:rPr lang="en-AU" b="1" dirty="0" err="1" smtClean="0">
-                <a:solidFill>
-                  <a:schemeClr val="tx2">
-                    <a:lumMod val="60000"/>
-                    <a:lumOff val="40000"/>
-                  </a:schemeClr>
-                </a:solidFill>
-                <a:latin typeface="Lucida Console" pitchFamily="49" charset="0"/>
-              </a:rPr>
-              <a:t>val</a:t>
-            </a:r>
-            <a:r>
-              <a:rPr lang="en-AU" b="1" dirty="0" smtClean="0">
-                <a:solidFill>
-                  <a:schemeClr val="tx2">
-                    <a:lumMod val="60000"/>
-                    <a:lumOff val="40000"/>
-                  </a:schemeClr>
-                </a:solidFill>
-                <a:latin typeface="Lucida Console" pitchFamily="49" charset="0"/>
-              </a:rPr>
-              <a:t> + </a:t>
-            </a:r>
-            <a:r>
-              <a:rPr lang="en-AU" b="1" dirty="0" err="1" smtClean="0">
-                <a:solidFill>
-                  <a:schemeClr val="tx2">
-                    <a:lumMod val="60000"/>
-                    <a:lumOff val="40000"/>
-                  </a:schemeClr>
-                </a:solidFill>
-                <a:latin typeface="Lucida Console" pitchFamily="49" charset="0"/>
-              </a:rPr>
-              <a:t>val</a:t>
-            </a:r>
-            <a:r>
-              <a:rPr lang="en-AU" b="1" dirty="0" smtClean="0">
-                <a:solidFill>
-                  <a:schemeClr val="tx2">
-                    <a:lumMod val="60000"/>
-                    <a:lumOff val="40000"/>
-                  </a:schemeClr>
-                </a:solidFill>
-                <a:latin typeface="Lucida Console" pitchFamily="49" charset="0"/>
-              </a:rPr>
-              <a:t>;</a:t>
-            </a:r>
-            <a:endParaRPr lang="en-AU" b="1" dirty="0">
-              <a:solidFill>
-                <a:schemeClr val="tx2">
-                  <a:lumMod val="60000"/>
-                  <a:lumOff val="40000"/>
-                </a:schemeClr>
-              </a:solidFill>
-              <a:latin typeface="Lucida Console" pitchFamily="49" charset="0"/>
-            </a:endParaRPr>
-          </a:p>
-          <a:p>
-            <a:r>
-              <a:rPr lang="en-AU" b="1" dirty="0">
-                <a:solidFill>
-                  <a:schemeClr val="tx2">
-                    <a:lumMod val="60000"/>
-                    <a:lumOff val="40000"/>
-                  </a:schemeClr>
-                </a:solidFill>
-                <a:latin typeface="Lucida Console" pitchFamily="49" charset="0"/>
-              </a:rPr>
-              <a:t>  </a:t>
-            </a:r>
-            <a:r>
-              <a:rPr lang="en-AU" b="1" dirty="0" smtClean="0">
-                <a:solidFill>
-                  <a:schemeClr val="tx2">
-                    <a:lumMod val="60000"/>
-                    <a:lumOff val="40000"/>
-                  </a:schemeClr>
-                </a:solidFill>
-                <a:latin typeface="Lucida Console" pitchFamily="49" charset="0"/>
-              </a:rPr>
-              <a:t>  </a:t>
-            </a:r>
-            <a:r>
-              <a:rPr lang="en-AU" b="1" dirty="0">
-                <a:solidFill>
-                  <a:schemeClr val="tx2">
-                    <a:lumMod val="60000"/>
-                    <a:lumOff val="40000"/>
-                  </a:schemeClr>
-                </a:solidFill>
-                <a:latin typeface="Lucida Console" pitchFamily="49" charset="0"/>
-              </a:rPr>
-              <a:t>}</a:t>
-            </a:r>
-          </a:p>
-          <a:p>
-            <a:r>
-              <a:rPr lang="en-AU" b="1" dirty="0" smtClean="0">
-                <a:solidFill>
-                  <a:schemeClr val="tx2">
-                    <a:lumMod val="60000"/>
-                    <a:lumOff val="40000"/>
-                  </a:schemeClr>
-                </a:solidFill>
-                <a:latin typeface="Lucida Console" pitchFamily="49" charset="0"/>
-              </a:rPr>
-              <a:t>    </a:t>
-            </a:r>
-            <a:r>
-              <a:rPr lang="en-AU" b="1" dirty="0">
-                <a:solidFill>
-                  <a:schemeClr val="tx2">
-                    <a:lumMod val="60000"/>
-                    <a:lumOff val="40000"/>
-                  </a:schemeClr>
-                </a:solidFill>
-                <a:latin typeface="Lucida Console" pitchFamily="49" charset="0"/>
-              </a:rPr>
-              <a:t>static void Main(string[] </a:t>
-            </a:r>
-            <a:r>
-              <a:rPr lang="en-AU" b="1" dirty="0" err="1">
-                <a:solidFill>
-                  <a:schemeClr val="tx2">
-                    <a:lumMod val="60000"/>
-                    <a:lumOff val="40000"/>
-                  </a:schemeClr>
-                </a:solidFill>
-                <a:latin typeface="Lucida Console" pitchFamily="49" charset="0"/>
-              </a:rPr>
-              <a:t>args</a:t>
-            </a:r>
-            <a:r>
-              <a:rPr lang="en-AU" b="1" dirty="0">
-                <a:solidFill>
-                  <a:schemeClr val="tx2">
-                    <a:lumMod val="60000"/>
-                    <a:lumOff val="40000"/>
-                  </a:schemeClr>
-                </a:solidFill>
-                <a:latin typeface="Lucida Console" pitchFamily="49" charset="0"/>
-              </a:rPr>
-              <a:t>)</a:t>
-            </a:r>
-          </a:p>
-          <a:p>
-            <a:r>
-              <a:rPr lang="en-AU" b="1" dirty="0" smtClean="0">
-                <a:solidFill>
-                  <a:schemeClr val="tx2">
-                    <a:lumMod val="60000"/>
-                    <a:lumOff val="40000"/>
-                  </a:schemeClr>
-                </a:solidFill>
-                <a:latin typeface="Lucida Console" pitchFamily="49" charset="0"/>
-              </a:rPr>
-              <a:t>    </a:t>
-            </a:r>
-            <a:r>
-              <a:rPr lang="en-AU" b="1" dirty="0">
-                <a:solidFill>
-                  <a:schemeClr val="tx2">
-                    <a:lumMod val="60000"/>
-                    <a:lumOff val="40000"/>
-                  </a:schemeClr>
-                </a:solidFill>
-                <a:latin typeface="Lucida Console" pitchFamily="49" charset="0"/>
-              </a:rPr>
-              <a:t>{</a:t>
-            </a:r>
-          </a:p>
-          <a:p>
-            <a:r>
-              <a:rPr lang="en-AU" b="1" dirty="0" smtClean="0">
-                <a:solidFill>
-                  <a:schemeClr val="tx2">
-                    <a:lumMod val="60000"/>
-                    <a:lumOff val="40000"/>
-                  </a:schemeClr>
-                </a:solidFill>
-                <a:latin typeface="Lucida Console" pitchFamily="49" charset="0"/>
-              </a:rPr>
-              <a:t>        </a:t>
-            </a:r>
-            <a:r>
-              <a:rPr lang="en-AU" b="1" dirty="0" err="1">
-                <a:solidFill>
-                  <a:schemeClr val="tx2">
-                    <a:lumMod val="60000"/>
-                    <a:lumOff val="40000"/>
-                  </a:schemeClr>
-                </a:solidFill>
-                <a:latin typeface="Lucida Console" pitchFamily="49" charset="0"/>
-              </a:rPr>
-              <a:t>Console.WriteLine</a:t>
-            </a:r>
-            <a:r>
-              <a:rPr lang="en-AU" b="1" dirty="0" smtClean="0">
-                <a:solidFill>
-                  <a:schemeClr val="tx2">
-                    <a:lumMod val="60000"/>
-                    <a:lumOff val="40000"/>
-                  </a:schemeClr>
-                </a:solidFill>
-                <a:latin typeface="Lucida Console" pitchFamily="49" charset="0"/>
-              </a:rPr>
-              <a:t>(</a:t>
-            </a:r>
-          </a:p>
-          <a:p>
-            <a:r>
-              <a:rPr lang="en-AU" b="1" dirty="0">
-                <a:solidFill>
-                  <a:schemeClr val="tx2">
-                    <a:lumMod val="60000"/>
-                    <a:lumOff val="40000"/>
-                  </a:schemeClr>
-                </a:solidFill>
-                <a:latin typeface="Lucida Console" pitchFamily="49" charset="0"/>
-              </a:rPr>
-              <a:t> </a:t>
-            </a:r>
-            <a:r>
-              <a:rPr lang="en-AU" b="1" dirty="0" smtClean="0">
-                <a:solidFill>
-                  <a:schemeClr val="tx2">
-                    <a:lumMod val="60000"/>
-                    <a:lumOff val="40000"/>
-                  </a:schemeClr>
-                </a:solidFill>
-                <a:latin typeface="Lucida Console" pitchFamily="49" charset="0"/>
-              </a:rPr>
-              <a:t>           </a:t>
-            </a:r>
-            <a:r>
-              <a:rPr lang="en-AU" b="1" dirty="0" err="1" smtClean="0">
-                <a:solidFill>
-                  <a:schemeClr val="tx2">
-                    <a:lumMod val="60000"/>
-                    <a:lumOff val="40000"/>
-                  </a:schemeClr>
-                </a:solidFill>
-                <a:latin typeface="Lucida Console" pitchFamily="49" charset="0"/>
-              </a:rPr>
-              <a:t>doSomething</a:t>
-            </a:r>
-            <a:r>
-              <a:rPr lang="en-AU" b="1" dirty="0" smtClean="0">
-                <a:solidFill>
-                  <a:schemeClr val="tx2">
-                    <a:lumMod val="60000"/>
-                    <a:lumOff val="40000"/>
-                  </a:schemeClr>
-                </a:solidFill>
-                <a:latin typeface="Lucida Console" pitchFamily="49" charset="0"/>
-              </a:rPr>
-              <a:t>(1));            </a:t>
-            </a:r>
-            <a:endParaRPr lang="en-AU" b="1" dirty="0">
-              <a:solidFill>
-                <a:schemeClr val="tx2">
-                  <a:lumMod val="60000"/>
-                  <a:lumOff val="40000"/>
-                </a:schemeClr>
-              </a:solidFill>
-              <a:latin typeface="Lucida Console" pitchFamily="49" charset="0"/>
-            </a:endParaRPr>
-          </a:p>
-          <a:p>
-            <a:r>
-              <a:rPr lang="en-AU" b="1" dirty="0" smtClean="0">
-                <a:solidFill>
-                  <a:schemeClr val="tx2">
-                    <a:lumMod val="60000"/>
-                    <a:lumOff val="40000"/>
-                  </a:schemeClr>
-                </a:solidFill>
-                <a:latin typeface="Lucida Console" pitchFamily="49" charset="0"/>
-              </a:rPr>
-              <a:t>    </a:t>
-            </a:r>
-            <a:r>
-              <a:rPr lang="en-AU" b="1" dirty="0">
-                <a:solidFill>
-                  <a:schemeClr val="tx2">
-                    <a:lumMod val="60000"/>
-                    <a:lumOff val="40000"/>
-                  </a:schemeClr>
-                </a:solidFill>
-                <a:latin typeface="Lucida Console" pitchFamily="49" charset="0"/>
-              </a:rPr>
-              <a:t>}</a:t>
-            </a:r>
-          </a:p>
-          <a:p>
-            <a:r>
-              <a:rPr lang="en-AU" b="1" dirty="0" smtClean="0">
-                <a:solidFill>
-                  <a:schemeClr val="tx2">
-                    <a:lumMod val="60000"/>
-                    <a:lumOff val="40000"/>
-                  </a:schemeClr>
-                </a:solidFill>
-                <a:latin typeface="Lucida Console" pitchFamily="49" charset="0"/>
-              </a:rPr>
-              <a:t>  </a:t>
-            </a:r>
-            <a:r>
-              <a:rPr lang="en-AU" b="1" dirty="0">
-                <a:solidFill>
-                  <a:schemeClr val="tx2">
-                    <a:lumMod val="60000"/>
-                    <a:lumOff val="40000"/>
-                  </a:schemeClr>
-                </a:solidFill>
-                <a:latin typeface="Lucida Console" pitchFamily="49" charset="0"/>
-              </a:rPr>
-              <a:t>}</a:t>
-            </a:r>
-          </a:p>
-          <a:p>
-            <a:r>
-              <a:rPr lang="en-AU" b="1" dirty="0" smtClean="0">
-                <a:solidFill>
-                  <a:schemeClr val="tx2">
-                    <a:lumMod val="60000"/>
-                    <a:lumOff val="40000"/>
-                  </a:schemeClr>
-                </a:solidFill>
-                <a:latin typeface="Lucida Console" pitchFamily="49" charset="0"/>
-              </a:rPr>
-              <a:t>}</a:t>
-            </a:r>
-            <a:endParaRPr lang="en-AU" b="1" dirty="0">
-              <a:solidFill>
-                <a:schemeClr val="tx2">
-                  <a:lumMod val="60000"/>
-                  <a:lumOff val="40000"/>
-                </a:schemeClr>
-              </a:solidFill>
-              <a:latin typeface="Lucida Console" pitchFamily="49" charset="0"/>
-            </a:endParaRPr>
-          </a:p>
-        </p:txBody>
-      </p:sp>
     </p:spTree>
     <p:extLst>
       <p:ext uri="{BB962C8B-B14F-4D97-AF65-F5344CB8AC3E}">
-        <p14:creationId xmlns:p14="http://schemas.microsoft.com/office/powerpoint/2010/main" val="2668672040"/>
+        <p14:creationId xmlns:p14="http://schemas.microsoft.com/office/powerpoint/2010/main" val="348386992"/>
       </p:ext>
     </p:extLst>
   </p:cSld>
@@ -18773,7 +17713,7 @@
                   </a:schemeClr>
                 </a:solidFill>
               </a:rPr>
-              <a:t>The let Keyword</a:t>
+              <a:t>Whitespace Matters</a:t>
             </a:r>
             <a:endParaRPr lang="en-US" dirty="0"/>
           </a:p>
@@ -18797,7 +17737,7 @@
             <a:fld id="{05A93482-8E69-40F7-BCAD-5662A6CADB27}" type="datetime4">
               <a:rPr lang="en-US" smtClean="0"/>
               <a:pPr/>
-              <a:t>October 14, 2010</a:t>
+              <a:t>October 16, 2010</a:t>
             </a:fld>
             <a:endParaRPr lang="en-US"/>
           </a:p>
@@ -20140,7 +19080,7 @@
     </p:spTree>
     <p:extLst>
       <p:ext uri="{BB962C8B-B14F-4D97-AF65-F5344CB8AC3E}">
-        <p14:creationId xmlns:p14="http://schemas.microsoft.com/office/powerpoint/2010/main" val="2982597783"/>
+        <p14:creationId xmlns:p14="http://schemas.microsoft.com/office/powerpoint/2010/main" val="2668672040"/>
       </p:ext>
     </p:extLst>
   </p:cSld>
@@ -20197,7 +19137,7 @@
                   </a:schemeClr>
                 </a:solidFill>
               </a:rPr>
-              <a:t>First-Class Functions</a:t>
+              <a:t>The let Keyword</a:t>
             </a:r>
             <a:endParaRPr lang="en-US" dirty="0"/>
           </a:p>
@@ -20221,7 +19161,7 @@
             <a:fld id="{05A93482-8E69-40F7-BCAD-5662A6CADB27}" type="datetime4">
               <a:rPr lang="en-US" smtClean="0"/>
               <a:pPr/>
-              <a:t>October 14, 2010</a:t>
+              <a:t>October 16, 2010</a:t>
             </a:fld>
             <a:endParaRPr lang="en-US"/>
           </a:p>
@@ -20261,7 +19201,7 @@
         </p:nvSpPr>
         <p:spPr bwMode="auto">
           <a:xfrm>
-            <a:off x="862017" y="1633550"/>
+            <a:off x="391851" y="1633550"/>
             <a:ext cx="3614735" cy="4978565"/>
           </a:xfrm>
           <a:prstGeom prst="rect">
@@ -20477,7 +19417,56 @@
                 </a:solidFill>
                 <a:latin typeface="Lucida Console" pitchFamily="49" charset="0"/>
               </a:rPr>
-              <a:t>let doubler </a:t>
+              <a:t>open </a:t>
+            </a:r>
+            <a:r>
+              <a:rPr lang="en-AU" sz="1800" b="1" dirty="0">
+                <a:solidFill>
+                  <a:schemeClr val="accent5">
+                    <a:lumMod val="50000"/>
+                  </a:schemeClr>
+                </a:solidFill>
+                <a:latin typeface="Lucida Console" pitchFamily="49" charset="0"/>
+              </a:rPr>
+              <a:t>System</a:t>
+            </a:r>
+          </a:p>
+          <a:p>
+            <a:pPr>
+              <a:buNone/>
+            </a:pPr>
+            <a:r>
+              <a:rPr lang="en-AU" sz="1800" b="1" dirty="0">
+                <a:solidFill>
+                  <a:schemeClr val="accent5">
+                    <a:lumMod val="50000"/>
+                  </a:schemeClr>
+                </a:solidFill>
+                <a:latin typeface="Lucida Console" pitchFamily="49" charset="0"/>
+              </a:rPr>
+              <a:t>let </a:t>
+            </a:r>
+            <a:r>
+              <a:rPr lang="en-AU" sz="1800" b="1" dirty="0" err="1" smtClean="0">
+                <a:solidFill>
+                  <a:schemeClr val="accent5">
+                    <a:lumMod val="50000"/>
+                  </a:schemeClr>
+                </a:solidFill>
+                <a:latin typeface="Lucida Console" pitchFamily="49" charset="0"/>
+              </a:rPr>
+              <a:t>doSomething</a:t>
+            </a:r>
+            <a:r>
+              <a:rPr lang="en-AU" sz="1800" b="1" dirty="0" smtClean="0">
+                <a:solidFill>
+                  <a:schemeClr val="accent5">
+                    <a:lumMod val="50000"/>
+                  </a:schemeClr>
+                </a:solidFill>
+                <a:latin typeface="Lucida Console" pitchFamily="49" charset="0"/>
+              </a:rPr>
+              <a:t> </a:t>
             </a:r>
             <a:r>
               <a:rPr lang="en-AU" sz="1800" b="1" dirty="0" err="1" smtClean="0">
@@ -20575,7 +19564,7 @@
               <a:buNone/>
             </a:pPr>
             <a:r>
-              <a:rPr lang="en-AU" sz="1800" b="1" dirty="0" smtClean="0">
+              <a:rPr lang="en-AU" sz="1800" b="1" dirty="0" err="1" smtClean="0">
                 <a:solidFill>
                   <a:schemeClr val="accent5">
                     <a:lumMod val="50000"/>
@@ -20583,7 +19572,67 @@
                 </a:solidFill>
                 <a:latin typeface="Lucida Console" pitchFamily="49" charset="0"/>
               </a:rPr>
-              <a:t>Doubler 2</a:t>
+              <a:t>Console.WriteLine</a:t>
+            </a:r>
+            <a:r>
+              <a:rPr lang="en-AU" sz="1800" b="1" dirty="0" smtClean="0">
+                <a:solidFill>
+                  <a:schemeClr val="accent5">
+                    <a:lumMod val="50000"/>
+                  </a:schemeClr>
+                </a:solidFill>
+                <a:latin typeface="Lucida Console" pitchFamily="49" charset="0"/>
+              </a:rPr>
+              <a:t> </a:t>
+            </a:r>
+          </a:p>
+          <a:p>
+            <a:pPr>
+              <a:buNone/>
+            </a:pPr>
+            <a:r>
+              <a:rPr lang="en-AU" sz="1800" b="1" dirty="0">
+                <a:solidFill>
+                  <a:schemeClr val="accent5">
+                    <a:lumMod val="50000"/>
+                  </a:schemeClr>
+                </a:solidFill>
+                <a:latin typeface="Lucida Console" pitchFamily="49" charset="0"/>
+              </a:rPr>
+              <a:t> </a:t>
+            </a:r>
+            <a:r>
+              <a:rPr lang="en-AU" sz="1800" b="1" dirty="0" smtClean="0">
+                <a:solidFill>
+                  <a:schemeClr val="accent5">
+                    <a:lumMod val="50000"/>
+                  </a:schemeClr>
+                </a:solidFill>
+                <a:latin typeface="Lucida Console" pitchFamily="49" charset="0"/>
+              </a:rPr>
+              <a:t>   (</a:t>
+            </a:r>
+            <a:r>
+              <a:rPr lang="en-AU" sz="1800" b="1" dirty="0" err="1" smtClean="0">
+                <a:solidFill>
+                  <a:schemeClr val="accent5">
+                    <a:lumMod val="50000"/>
+                  </a:schemeClr>
+                </a:solidFill>
+                <a:latin typeface="Lucida Console" pitchFamily="49" charset="0"/>
+              </a:rPr>
+              <a:t>doSomething</a:t>
+            </a:r>
+            <a:r>
+              <a:rPr lang="en-AU" sz="1800" b="1" dirty="0" smtClean="0">
+                <a:solidFill>
+                  <a:schemeClr val="accent5">
+                    <a:lumMod val="50000"/>
+                  </a:schemeClr>
+                </a:solidFill>
+                <a:latin typeface="Lucida Console" pitchFamily="49" charset="0"/>
+              </a:rPr>
+              <a:t> 1)</a:t>
             </a:r>
             <a:endParaRPr lang="en-US" sz="1800" b="1" dirty="0">
               <a:solidFill>
@@ -20606,7 +19655,7 @@
         </p:nvSpPr>
         <p:spPr>
           <a:xfrm>
-            <a:off x="4191000" y="1676400"/>
+            <a:off x="3720834" y="1676400"/>
             <a:ext cx="5423166" cy="4978565"/>
           </a:xfrm>
           <a:prstGeom prst="rect">
@@ -20764,128 +19813,19 @@
           </a:p>
           <a:p>
             <a:r>
-              <a:rPr lang="en-US" b="1" dirty="0" err="1" smtClean="0">
+              <a:rPr lang="en-AU" b="1" dirty="0">
+                <a:solidFill>
+                  <a:schemeClr val="tx2">
+                    <a:lumMod val="60000"/>
+                    <a:lumOff val="40000"/>
+                  </a:schemeClr>
+                </a:solidFill>
                 <a:latin typeface="Lucida Console" pitchFamily="49" charset="0"/>
               </a:rPr>
-              <a:t>Func</a:t>
-            </a:r>
-            <a:r>
-              <a:rPr lang="en-US" b="1" dirty="0" smtClean="0">
-                <a:latin typeface="Lucida Console" pitchFamily="49" charset="0"/>
-              </a:rPr>
-              <a:t>&lt;</a:t>
-            </a:r>
-            <a:r>
-              <a:rPr lang="en-US" b="1" dirty="0" err="1" smtClean="0">
-                <a:latin typeface="Lucida Console" pitchFamily="49" charset="0"/>
-              </a:rPr>
-              <a:t>int</a:t>
-            </a:r>
-            <a:r>
-              <a:rPr lang="en-US" b="1" dirty="0">
-                <a:latin typeface="Lucida Console" pitchFamily="49" charset="0"/>
-              </a:rPr>
-              <a:t>, </a:t>
-            </a:r>
-            <a:r>
-              <a:rPr lang="en-US" b="1" dirty="0" err="1">
-                <a:latin typeface="Lucida Console" pitchFamily="49" charset="0"/>
-              </a:rPr>
-              <a:t>int</a:t>
-            </a:r>
-            <a:r>
-              <a:rPr lang="en-US" b="1" dirty="0">
-                <a:latin typeface="Lucida Console" pitchFamily="49" charset="0"/>
-              </a:rPr>
-              <a:t>&gt; </a:t>
-            </a:r>
-            <a:r>
-              <a:rPr lang="en-US" b="1" dirty="0" err="1">
-                <a:latin typeface="Lucida Console" pitchFamily="49" charset="0"/>
-              </a:rPr>
-              <a:t>doubler</a:t>
-            </a:r>
-            <a:r>
-              <a:rPr lang="en-US" b="1" dirty="0">
-                <a:latin typeface="Lucida Console" pitchFamily="49" charset="0"/>
-              </a:rPr>
-              <a:t> = </a:t>
-            </a:r>
-            <a:endParaRPr lang="en-US" b="1" dirty="0" smtClean="0">
-              <a:latin typeface="Lucida Console" pitchFamily="49" charset="0"/>
-            </a:endParaRPr>
-          </a:p>
-          <a:p>
-            <a:r>
-              <a:rPr lang="en-US" b="1" dirty="0" smtClean="0">
-                <a:latin typeface="Lucida Console" pitchFamily="49" charset="0"/>
-              </a:rPr>
-              <a:t>    (</a:t>
-            </a:r>
-            <a:r>
-              <a:rPr lang="en-US" b="1" dirty="0" err="1">
-                <a:latin typeface="Lucida Console" pitchFamily="49" charset="0"/>
-              </a:rPr>
-              <a:t>val</a:t>
-            </a:r>
-            <a:r>
-              <a:rPr lang="en-US" b="1" dirty="0">
-                <a:latin typeface="Lucida Console" pitchFamily="49" charset="0"/>
-              </a:rPr>
-              <a:t>) =&gt; </a:t>
-            </a:r>
-            <a:r>
-              <a:rPr lang="en-US" b="1" dirty="0" err="1">
-                <a:latin typeface="Lucida Console" pitchFamily="49" charset="0"/>
-              </a:rPr>
-              <a:t>val</a:t>
-            </a:r>
-            <a:r>
-              <a:rPr lang="en-US" b="1" dirty="0">
-                <a:latin typeface="Lucida Console" pitchFamily="49" charset="0"/>
-              </a:rPr>
-              <a:t> + </a:t>
-            </a:r>
-            <a:r>
-              <a:rPr lang="en-US" b="1" dirty="0" err="1">
-                <a:latin typeface="Lucida Console" pitchFamily="49" charset="0"/>
-              </a:rPr>
-              <a:t>val</a:t>
-            </a:r>
-            <a:r>
-              <a:rPr lang="en-US" b="1" dirty="0">
-                <a:latin typeface="Lucida Console" pitchFamily="49" charset="0"/>
-              </a:rPr>
-              <a:t>;</a:t>
-            </a:r>
-            <a:br>
-              <a:rPr lang="en-US" b="1" dirty="0">
-                <a:latin typeface="Lucida Console" pitchFamily="49" charset="0"/>
-              </a:rPr>
-            </a:br>
-            <a:r>
-              <a:rPr lang="en-US" b="1" dirty="0" err="1" smtClean="0">
-                <a:latin typeface="Lucida Console" pitchFamily="49" charset="0"/>
-              </a:rPr>
-              <a:t>doubler</a:t>
-            </a:r>
-            <a:r>
-              <a:rPr lang="en-US" b="1" dirty="0" smtClean="0">
-                <a:latin typeface="Lucida Console" pitchFamily="49" charset="0"/>
-              </a:rPr>
-              <a:t>(2);</a:t>
-            </a:r>
-            <a:r>
-              <a:rPr lang="en-US" dirty="0">
-                <a:latin typeface="Lucida Bright" pitchFamily="18" charset="0"/>
-              </a:rPr>
-              <a:t/>
-            </a:r>
-            <a:br>
-              <a:rPr lang="en-US" dirty="0">
-                <a:latin typeface="Lucida Bright" pitchFamily="18" charset="0"/>
-              </a:rPr>
-            </a:br>
+              <a:t>using System;</a:t>
+            </a:r>
+          </a:p>
+          <a:p>
             <a:endParaRPr lang="en-AU" b="1" dirty="0">
               <a:solidFill>
                 <a:schemeClr val="tx2">
@@ -20893,7 +19833,670 @@
                   <a:lumOff val="40000"/>
                 </a:schemeClr>
               </a:solidFill>
-              <a:latin typeface="Lucida Bright" pitchFamily="18" charset="0"/>
+              <a:latin typeface="Lucida Console" pitchFamily="49" charset="0"/>
+            </a:endParaRPr>
+          </a:p>
+          <a:p>
+            <a:r>
+              <a:rPr lang="en-AU" b="1" dirty="0">
+                <a:solidFill>
+                  <a:schemeClr val="tx2">
+                    <a:lumMod val="60000"/>
+                    <a:lumOff val="40000"/>
+                  </a:schemeClr>
+                </a:solidFill>
+                <a:latin typeface="Lucida Console" pitchFamily="49" charset="0"/>
+              </a:rPr>
+              <a:t>namespace ConsoleApplication1</a:t>
+            </a:r>
+          </a:p>
+          <a:p>
+            <a:r>
+              <a:rPr lang="en-AU" b="1" dirty="0">
+                <a:solidFill>
+                  <a:schemeClr val="tx2">
+                    <a:lumMod val="60000"/>
+                    <a:lumOff val="40000"/>
+                  </a:schemeClr>
+                </a:solidFill>
+                <a:latin typeface="Lucida Console" pitchFamily="49" charset="0"/>
+              </a:rPr>
+              <a:t>{</a:t>
+            </a:r>
+          </a:p>
+          <a:p>
+            <a:r>
+              <a:rPr lang="en-AU" b="1" dirty="0">
+                <a:solidFill>
+                  <a:schemeClr val="tx2">
+                    <a:lumMod val="60000"/>
+                    <a:lumOff val="40000"/>
+                  </a:schemeClr>
+                </a:solidFill>
+                <a:latin typeface="Lucida Console" pitchFamily="49" charset="0"/>
+              </a:rPr>
+              <a:t>  </a:t>
+            </a:r>
+            <a:r>
+              <a:rPr lang="en-AU" b="1" dirty="0" smtClean="0">
+                <a:solidFill>
+                  <a:schemeClr val="tx2">
+                    <a:lumMod val="60000"/>
+                    <a:lumOff val="40000"/>
+                  </a:schemeClr>
+                </a:solidFill>
+                <a:latin typeface="Lucida Console" pitchFamily="49" charset="0"/>
+              </a:rPr>
+              <a:t>class </a:t>
+            </a:r>
+            <a:r>
+              <a:rPr lang="en-AU" b="1" dirty="0">
+                <a:solidFill>
+                  <a:schemeClr val="tx2">
+                    <a:lumMod val="60000"/>
+                    <a:lumOff val="40000"/>
+                  </a:schemeClr>
+                </a:solidFill>
+                <a:latin typeface="Lucida Console" pitchFamily="49" charset="0"/>
+              </a:rPr>
+              <a:t>Program</a:t>
+            </a:r>
+          </a:p>
+          <a:p>
+            <a:r>
+              <a:rPr lang="en-AU" b="1" dirty="0">
+                <a:solidFill>
+                  <a:schemeClr val="tx2">
+                    <a:lumMod val="60000"/>
+                    <a:lumOff val="40000"/>
+                  </a:schemeClr>
+                </a:solidFill>
+                <a:latin typeface="Lucida Console" pitchFamily="49" charset="0"/>
+              </a:rPr>
+              <a:t>  </a:t>
+            </a:r>
+            <a:r>
+              <a:rPr lang="en-AU" b="1" dirty="0" smtClean="0">
+                <a:solidFill>
+                  <a:schemeClr val="tx2">
+                    <a:lumMod val="60000"/>
+                    <a:lumOff val="40000"/>
+                  </a:schemeClr>
+                </a:solidFill>
+                <a:latin typeface="Lucida Console" pitchFamily="49" charset="0"/>
+              </a:rPr>
+              <a:t>{</a:t>
+            </a:r>
+            <a:endParaRPr lang="en-AU" b="1" dirty="0">
+              <a:solidFill>
+                <a:schemeClr val="tx2">
+                  <a:lumMod val="60000"/>
+                  <a:lumOff val="40000"/>
+                </a:schemeClr>
+              </a:solidFill>
+              <a:latin typeface="Lucida Console" pitchFamily="49" charset="0"/>
+            </a:endParaRPr>
+          </a:p>
+          <a:p>
+            <a:r>
+              <a:rPr lang="en-AU" b="1" dirty="0">
+                <a:solidFill>
+                  <a:schemeClr val="tx2">
+                    <a:lumMod val="60000"/>
+                    <a:lumOff val="40000"/>
+                  </a:schemeClr>
+                </a:solidFill>
+                <a:latin typeface="Lucida Console" pitchFamily="49" charset="0"/>
+              </a:rPr>
+              <a:t>  </a:t>
+            </a:r>
+            <a:r>
+              <a:rPr lang="en-AU" b="1" dirty="0" smtClean="0">
+                <a:solidFill>
+                  <a:schemeClr val="tx2">
+                    <a:lumMod val="60000"/>
+                    <a:lumOff val="40000"/>
+                  </a:schemeClr>
+                </a:solidFill>
+                <a:latin typeface="Lucida Console" pitchFamily="49" charset="0"/>
+              </a:rPr>
+              <a:t>  </a:t>
+            </a:r>
+            <a:r>
+              <a:rPr lang="en-AU" b="1" dirty="0">
+                <a:solidFill>
+                  <a:schemeClr val="tx2">
+                    <a:lumMod val="60000"/>
+                    <a:lumOff val="40000"/>
+                  </a:schemeClr>
+                </a:solidFill>
+                <a:latin typeface="Lucida Console" pitchFamily="49" charset="0"/>
+              </a:rPr>
+              <a:t>static </a:t>
+            </a:r>
+            <a:r>
+              <a:rPr lang="en-AU" b="1" dirty="0" err="1">
+                <a:solidFill>
+                  <a:schemeClr val="tx2">
+                    <a:lumMod val="60000"/>
+                    <a:lumOff val="40000"/>
+                  </a:schemeClr>
+                </a:solidFill>
+                <a:latin typeface="Lucida Console" pitchFamily="49" charset="0"/>
+              </a:rPr>
+              <a:t>int</a:t>
+            </a:r>
+            <a:r>
+              <a:rPr lang="en-AU" b="1" dirty="0">
+                <a:solidFill>
+                  <a:schemeClr val="tx2">
+                    <a:lumMod val="60000"/>
+                    <a:lumOff val="40000"/>
+                  </a:schemeClr>
+                </a:solidFill>
+                <a:latin typeface="Lucida Console" pitchFamily="49" charset="0"/>
+              </a:rPr>
+              <a:t> </a:t>
+            </a:r>
+            <a:r>
+              <a:rPr lang="en-AU" b="1" dirty="0" err="1" smtClean="0">
+                <a:solidFill>
+                  <a:schemeClr val="tx2">
+                    <a:lumMod val="60000"/>
+                    <a:lumOff val="40000"/>
+                  </a:schemeClr>
+                </a:solidFill>
+                <a:latin typeface="Lucida Console" pitchFamily="49" charset="0"/>
+              </a:rPr>
+              <a:t>doSomething</a:t>
+            </a:r>
+            <a:r>
+              <a:rPr lang="en-AU" b="1" dirty="0" smtClean="0">
+                <a:solidFill>
+                  <a:schemeClr val="tx2">
+                    <a:lumMod val="60000"/>
+                    <a:lumOff val="40000"/>
+                  </a:schemeClr>
+                </a:solidFill>
+                <a:latin typeface="Lucida Console" pitchFamily="49" charset="0"/>
+              </a:rPr>
+              <a:t>(</a:t>
+            </a:r>
+            <a:r>
+              <a:rPr lang="en-AU" b="1" dirty="0" err="1" smtClean="0">
+                <a:solidFill>
+                  <a:schemeClr val="tx2">
+                    <a:lumMod val="60000"/>
+                    <a:lumOff val="40000"/>
+                  </a:schemeClr>
+                </a:solidFill>
+                <a:latin typeface="Lucida Console" pitchFamily="49" charset="0"/>
+              </a:rPr>
+              <a:t>int</a:t>
+            </a:r>
+            <a:r>
+              <a:rPr lang="en-AU" b="1" dirty="0" smtClean="0">
+                <a:solidFill>
+                  <a:schemeClr val="tx2">
+                    <a:lumMod val="60000"/>
+                    <a:lumOff val="40000"/>
+                  </a:schemeClr>
+                </a:solidFill>
+                <a:latin typeface="Lucida Console" pitchFamily="49" charset="0"/>
+              </a:rPr>
+              <a:t> </a:t>
+            </a:r>
+            <a:r>
+              <a:rPr lang="en-AU" b="1" dirty="0" err="1" smtClean="0">
+                <a:solidFill>
+                  <a:schemeClr val="tx2">
+                    <a:lumMod val="60000"/>
+                    <a:lumOff val="40000"/>
+                  </a:schemeClr>
+                </a:solidFill>
+                <a:latin typeface="Lucida Console" pitchFamily="49" charset="0"/>
+              </a:rPr>
+              <a:t>val</a:t>
+            </a:r>
+            <a:r>
+              <a:rPr lang="en-AU" b="1" dirty="0" smtClean="0">
+                <a:solidFill>
+                  <a:schemeClr val="tx2">
+                    <a:lumMod val="60000"/>
+                    <a:lumOff val="40000"/>
+                  </a:schemeClr>
+                </a:solidFill>
+                <a:latin typeface="Lucida Console" pitchFamily="49" charset="0"/>
+              </a:rPr>
+              <a:t>)</a:t>
+            </a:r>
+            <a:endParaRPr lang="en-AU" b="1" dirty="0">
+              <a:solidFill>
+                <a:schemeClr val="tx2">
+                  <a:lumMod val="60000"/>
+                  <a:lumOff val="40000"/>
+                </a:schemeClr>
+              </a:solidFill>
+              <a:latin typeface="Lucida Console" pitchFamily="49" charset="0"/>
+            </a:endParaRPr>
+          </a:p>
+          <a:p>
+            <a:r>
+              <a:rPr lang="en-AU" b="1" dirty="0">
+                <a:solidFill>
+                  <a:schemeClr val="tx2">
+                    <a:lumMod val="60000"/>
+                    <a:lumOff val="40000"/>
+                  </a:schemeClr>
+                </a:solidFill>
+                <a:latin typeface="Lucida Console" pitchFamily="49" charset="0"/>
+              </a:rPr>
+              <a:t>  </a:t>
+            </a:r>
+            <a:r>
+              <a:rPr lang="en-AU" b="1" dirty="0" smtClean="0">
+                <a:solidFill>
+                  <a:schemeClr val="tx2">
+                    <a:lumMod val="60000"/>
+                    <a:lumOff val="40000"/>
+                  </a:schemeClr>
+                </a:solidFill>
+                <a:latin typeface="Lucida Console" pitchFamily="49" charset="0"/>
+              </a:rPr>
+              <a:t>  </a:t>
+            </a:r>
+            <a:r>
+              <a:rPr lang="en-AU" b="1" dirty="0">
+                <a:solidFill>
+                  <a:schemeClr val="tx2">
+                    <a:lumMod val="60000"/>
+                    <a:lumOff val="40000"/>
+                  </a:schemeClr>
+                </a:solidFill>
+                <a:latin typeface="Lucida Console" pitchFamily="49" charset="0"/>
+              </a:rPr>
+              <a:t>{</a:t>
+            </a:r>
+          </a:p>
+          <a:p>
+            <a:r>
+              <a:rPr lang="en-AU" b="1" dirty="0">
+                <a:solidFill>
+                  <a:schemeClr val="tx2">
+                    <a:lumMod val="60000"/>
+                    <a:lumOff val="40000"/>
+                  </a:schemeClr>
+                </a:solidFill>
+                <a:latin typeface="Lucida Console" pitchFamily="49" charset="0"/>
+              </a:rPr>
+              <a:t>  </a:t>
+            </a:r>
+            <a:r>
+              <a:rPr lang="en-AU" b="1" dirty="0" smtClean="0">
+                <a:solidFill>
+                  <a:schemeClr val="tx2">
+                    <a:lumMod val="60000"/>
+                    <a:lumOff val="40000"/>
+                  </a:schemeClr>
+                </a:solidFill>
+                <a:latin typeface="Lucida Console" pitchFamily="49" charset="0"/>
+              </a:rPr>
+              <a:t>      </a:t>
+            </a:r>
+            <a:r>
+              <a:rPr lang="en-AU" b="1" dirty="0">
+                <a:solidFill>
+                  <a:schemeClr val="tx2">
+                    <a:lumMod val="60000"/>
+                    <a:lumOff val="40000"/>
+                  </a:schemeClr>
+                </a:solidFill>
+                <a:latin typeface="Lucida Console" pitchFamily="49" charset="0"/>
+              </a:rPr>
+              <a:t>return </a:t>
+            </a:r>
+            <a:r>
+              <a:rPr lang="en-AU" b="1" dirty="0" err="1" smtClean="0">
+                <a:solidFill>
+                  <a:schemeClr val="tx2">
+                    <a:lumMod val="60000"/>
+                    <a:lumOff val="40000"/>
+                  </a:schemeClr>
+                </a:solidFill>
+                <a:latin typeface="Lucida Console" pitchFamily="49" charset="0"/>
+              </a:rPr>
+              <a:t>val</a:t>
+            </a:r>
+            <a:r>
+              <a:rPr lang="en-AU" b="1" dirty="0" smtClean="0">
+                <a:solidFill>
+                  <a:schemeClr val="tx2">
+                    <a:lumMod val="60000"/>
+                    <a:lumOff val="40000"/>
+                  </a:schemeClr>
+                </a:solidFill>
+                <a:latin typeface="Lucida Console" pitchFamily="49" charset="0"/>
+              </a:rPr>
+              <a:t> + </a:t>
+            </a:r>
+            <a:r>
+              <a:rPr lang="en-AU" b="1" dirty="0" err="1" smtClean="0">
+                <a:solidFill>
+                  <a:schemeClr val="tx2">
+                    <a:lumMod val="60000"/>
+                    <a:lumOff val="40000"/>
+                  </a:schemeClr>
+                </a:solidFill>
+                <a:latin typeface="Lucida Console" pitchFamily="49" charset="0"/>
+              </a:rPr>
+              <a:t>val</a:t>
+            </a:r>
+            <a:r>
+              <a:rPr lang="en-AU" b="1" dirty="0" smtClean="0">
+                <a:solidFill>
+                  <a:schemeClr val="tx2">
+                    <a:lumMod val="60000"/>
+                    <a:lumOff val="40000"/>
+                  </a:schemeClr>
+                </a:solidFill>
+                <a:latin typeface="Lucida Console" pitchFamily="49" charset="0"/>
+              </a:rPr>
+              <a:t>;</a:t>
+            </a:r>
+            <a:endParaRPr lang="en-AU" b="1" dirty="0">
+              <a:solidFill>
+                <a:schemeClr val="tx2">
+                  <a:lumMod val="60000"/>
+                  <a:lumOff val="40000"/>
+                </a:schemeClr>
+              </a:solidFill>
+              <a:latin typeface="Lucida Console" pitchFamily="49" charset="0"/>
+            </a:endParaRPr>
+          </a:p>
+          <a:p>
+            <a:r>
+              <a:rPr lang="en-AU" b="1" dirty="0">
+                <a:solidFill>
+                  <a:schemeClr val="tx2">
+                    <a:lumMod val="60000"/>
+                    <a:lumOff val="40000"/>
+                  </a:schemeClr>
+                </a:solidFill>
+                <a:latin typeface="Lucida Console" pitchFamily="49" charset="0"/>
+              </a:rPr>
+              <a:t>  </a:t>
+            </a:r>
+            <a:r>
+              <a:rPr lang="en-AU" b="1" dirty="0" smtClean="0">
+                <a:solidFill>
+                  <a:schemeClr val="tx2">
+                    <a:lumMod val="60000"/>
+                    <a:lumOff val="40000"/>
+                  </a:schemeClr>
+                </a:solidFill>
+                <a:latin typeface="Lucida Console" pitchFamily="49" charset="0"/>
+              </a:rPr>
+              <a:t>  </a:t>
+            </a:r>
+            <a:r>
+              <a:rPr lang="en-AU" b="1" dirty="0">
+                <a:solidFill>
+                  <a:schemeClr val="tx2">
+                    <a:lumMod val="60000"/>
+                    <a:lumOff val="40000"/>
+                  </a:schemeClr>
+                </a:solidFill>
+                <a:latin typeface="Lucida Console" pitchFamily="49" charset="0"/>
+              </a:rPr>
+              <a:t>}</a:t>
+            </a:r>
+          </a:p>
+          <a:p>
+            <a:r>
+              <a:rPr lang="en-AU" b="1" dirty="0" smtClean="0">
+                <a:solidFill>
+                  <a:schemeClr val="tx2">
+                    <a:lumMod val="60000"/>
+                    <a:lumOff val="40000"/>
+                  </a:schemeClr>
+                </a:solidFill>
+                <a:latin typeface="Lucida Console" pitchFamily="49" charset="0"/>
+              </a:rPr>
+              <a:t>    </a:t>
+            </a:r>
+            <a:r>
+              <a:rPr lang="en-AU" b="1" dirty="0">
+                <a:solidFill>
+                  <a:schemeClr val="tx2">
+                    <a:lumMod val="60000"/>
+                    <a:lumOff val="40000"/>
+                  </a:schemeClr>
+                </a:solidFill>
+                <a:latin typeface="Lucida Console" pitchFamily="49" charset="0"/>
+              </a:rPr>
+              <a:t>static void Main(string[] </a:t>
+            </a:r>
+            <a:r>
+              <a:rPr lang="en-AU" b="1" dirty="0" err="1">
+                <a:solidFill>
+                  <a:schemeClr val="tx2">
+                    <a:lumMod val="60000"/>
+                    <a:lumOff val="40000"/>
+                  </a:schemeClr>
+                </a:solidFill>
+                <a:latin typeface="Lucida Console" pitchFamily="49" charset="0"/>
+              </a:rPr>
+              <a:t>args</a:t>
+            </a:r>
+            <a:r>
+              <a:rPr lang="en-AU" b="1" dirty="0">
+                <a:solidFill>
+                  <a:schemeClr val="tx2">
+                    <a:lumMod val="60000"/>
+                    <a:lumOff val="40000"/>
+                  </a:schemeClr>
+                </a:solidFill>
+                <a:latin typeface="Lucida Console" pitchFamily="49" charset="0"/>
+              </a:rPr>
+              <a:t>)</a:t>
+            </a:r>
+          </a:p>
+          <a:p>
+            <a:r>
+              <a:rPr lang="en-AU" b="1" dirty="0" smtClean="0">
+                <a:solidFill>
+                  <a:schemeClr val="tx2">
+                    <a:lumMod val="60000"/>
+                    <a:lumOff val="40000"/>
+                  </a:schemeClr>
+                </a:solidFill>
+                <a:latin typeface="Lucida Console" pitchFamily="49" charset="0"/>
+              </a:rPr>
+              <a:t>    </a:t>
+            </a:r>
+            <a:r>
+              <a:rPr lang="en-AU" b="1" dirty="0">
+                <a:solidFill>
+                  <a:schemeClr val="tx2">
+                    <a:lumMod val="60000"/>
+                    <a:lumOff val="40000"/>
+                  </a:schemeClr>
+                </a:solidFill>
+                <a:latin typeface="Lucida Console" pitchFamily="49" charset="0"/>
+              </a:rPr>
+              <a:t>{</a:t>
+            </a:r>
+          </a:p>
+          <a:p>
+            <a:r>
+              <a:rPr lang="en-AU" b="1" dirty="0" smtClean="0">
+                <a:solidFill>
+                  <a:schemeClr val="tx2">
+                    <a:lumMod val="60000"/>
+                    <a:lumOff val="40000"/>
+                  </a:schemeClr>
+                </a:solidFill>
+                <a:latin typeface="Lucida Console" pitchFamily="49" charset="0"/>
+              </a:rPr>
+              <a:t>        </a:t>
+            </a:r>
+            <a:r>
+              <a:rPr lang="en-AU" b="1" dirty="0" err="1">
+                <a:solidFill>
+                  <a:schemeClr val="tx2">
+                    <a:lumMod val="60000"/>
+                    <a:lumOff val="40000"/>
+                  </a:schemeClr>
+                </a:solidFill>
+                <a:latin typeface="Lucida Console" pitchFamily="49" charset="0"/>
+              </a:rPr>
+              <a:t>Console.WriteLine</a:t>
+            </a:r>
+            <a:r>
+              <a:rPr lang="en-AU" b="1" dirty="0" smtClean="0">
+                <a:solidFill>
+                  <a:schemeClr val="tx2">
+                    <a:lumMod val="60000"/>
+                    <a:lumOff val="40000"/>
+                  </a:schemeClr>
+                </a:solidFill>
+                <a:latin typeface="Lucida Console" pitchFamily="49" charset="0"/>
+              </a:rPr>
+              <a:t>(</a:t>
+            </a:r>
+          </a:p>
+          <a:p>
+            <a:r>
+              <a:rPr lang="en-AU" b="1" dirty="0">
+                <a:solidFill>
+                  <a:schemeClr val="tx2">
+                    <a:lumMod val="60000"/>
+                    <a:lumOff val="40000"/>
+                  </a:schemeClr>
+                </a:solidFill>
+                <a:latin typeface="Lucida Console" pitchFamily="49" charset="0"/>
+              </a:rPr>
+              <a:t> </a:t>
+            </a:r>
+            <a:r>
+              <a:rPr lang="en-AU" b="1" dirty="0" smtClean="0">
+                <a:solidFill>
+                  <a:schemeClr val="tx2">
+                    <a:lumMod val="60000"/>
+                    <a:lumOff val="40000"/>
+                  </a:schemeClr>
+                </a:solidFill>
+                <a:latin typeface="Lucida Console" pitchFamily="49" charset="0"/>
+              </a:rPr>
+              <a:t>           </a:t>
+            </a:r>
+            <a:r>
+              <a:rPr lang="en-AU" b="1" dirty="0" err="1" smtClean="0">
+                <a:solidFill>
+                  <a:schemeClr val="tx2">
+                    <a:lumMod val="60000"/>
+                    <a:lumOff val="40000"/>
+                  </a:schemeClr>
+                </a:solidFill>
+                <a:latin typeface="Lucida Console" pitchFamily="49" charset="0"/>
+              </a:rPr>
+              <a:t>doSomething</a:t>
+            </a:r>
+            <a:r>
+              <a:rPr lang="en-AU" b="1" dirty="0" smtClean="0">
+                <a:solidFill>
+                  <a:schemeClr val="tx2">
+                    <a:lumMod val="60000"/>
+                    <a:lumOff val="40000"/>
+                  </a:schemeClr>
+                </a:solidFill>
+                <a:latin typeface="Lucida Console" pitchFamily="49" charset="0"/>
+              </a:rPr>
+              <a:t>(1));            </a:t>
+            </a:r>
+            <a:endParaRPr lang="en-AU" b="1" dirty="0">
+              <a:solidFill>
+                <a:schemeClr val="tx2">
+                  <a:lumMod val="60000"/>
+                  <a:lumOff val="40000"/>
+                </a:schemeClr>
+              </a:solidFill>
+              <a:latin typeface="Lucida Console" pitchFamily="49" charset="0"/>
+            </a:endParaRPr>
+          </a:p>
+          <a:p>
+            <a:r>
+              <a:rPr lang="en-AU" b="1" dirty="0" smtClean="0">
+                <a:solidFill>
+                  <a:schemeClr val="tx2">
+                    <a:lumMod val="60000"/>
+                    <a:lumOff val="40000"/>
+                  </a:schemeClr>
+                </a:solidFill>
+                <a:latin typeface="Lucida Console" pitchFamily="49" charset="0"/>
+              </a:rPr>
+              <a:t>    </a:t>
+            </a:r>
+            <a:r>
+              <a:rPr lang="en-AU" b="1" dirty="0">
+                <a:solidFill>
+                  <a:schemeClr val="tx2">
+                    <a:lumMod val="60000"/>
+                    <a:lumOff val="40000"/>
+                  </a:schemeClr>
+                </a:solidFill>
+                <a:latin typeface="Lucida Console" pitchFamily="49" charset="0"/>
+              </a:rPr>
+              <a:t>}</a:t>
+            </a:r>
+          </a:p>
+          <a:p>
+            <a:r>
+              <a:rPr lang="en-AU" b="1" dirty="0" smtClean="0">
+                <a:solidFill>
+                  <a:schemeClr val="tx2">
+                    <a:lumMod val="60000"/>
+                    <a:lumOff val="40000"/>
+                  </a:schemeClr>
+                </a:solidFill>
+                <a:latin typeface="Lucida Console" pitchFamily="49" charset="0"/>
+              </a:rPr>
+              <a:t>  </a:t>
+            </a:r>
+            <a:r>
+              <a:rPr lang="en-AU" b="1" dirty="0">
+                <a:solidFill>
+                  <a:schemeClr val="tx2">
+                    <a:lumMod val="60000"/>
+                    <a:lumOff val="40000"/>
+                  </a:schemeClr>
+                </a:solidFill>
+                <a:latin typeface="Lucida Console" pitchFamily="49" charset="0"/>
+              </a:rPr>
+              <a:t>}</a:t>
+            </a:r>
+          </a:p>
+          <a:p>
+            <a:r>
+              <a:rPr lang="en-AU" b="1" dirty="0" smtClean="0">
+                <a:solidFill>
+                  <a:schemeClr val="tx2">
+                    <a:lumMod val="60000"/>
+                    <a:lumOff val="40000"/>
+                  </a:schemeClr>
+                </a:solidFill>
+                <a:latin typeface="Lucida Console" pitchFamily="49" charset="0"/>
+              </a:rPr>
+              <a:t>}</a:t>
+            </a:r>
+            <a:endParaRPr lang="en-AU" b="1" dirty="0">
+              <a:solidFill>
+                <a:schemeClr val="tx2">
+                  <a:lumMod val="60000"/>
+                  <a:lumOff val="40000"/>
+                </a:schemeClr>
+              </a:solidFill>
+              <a:latin typeface="Lucida Console" pitchFamily="49" charset="0"/>
             </a:endParaRPr>
           </a:p>
         </p:txBody>
@@ -20901,7 +20504,7 @@
     </p:spTree>
     <p:extLst>
       <p:ext uri="{BB962C8B-B14F-4D97-AF65-F5344CB8AC3E}">
-        <p14:creationId xmlns:p14="http://schemas.microsoft.com/office/powerpoint/2010/main" val="2674812852"/>
+        <p14:creationId xmlns:p14="http://schemas.microsoft.com/office/powerpoint/2010/main" val="2982597783"/>
       </p:ext>
     </p:extLst>
   </p:cSld>
@@ -20958,7 +20561,7 @@
                   </a:schemeClr>
                 </a:solidFill>
               </a:rPr>
-              <a:t>Pattern Matching</a:t>
+              <a:t>First-Class Functions</a:t>
             </a:r>
             <a:endParaRPr lang="en-US" dirty="0"/>
           </a:p>
@@ -20982,7 +20585,7 @@
             <a:fld id="{05A93482-8E69-40F7-BCAD-5662A6CADB27}" type="datetime4">
               <a:rPr lang="en-US" smtClean="0"/>
               <a:pPr/>
-              <a:t>October 14, 2010</a:t>
+              <a:t>October 16, 2010</a:t>
             </a:fld>
             <a:endParaRPr lang="en-US"/>
           </a:p>
@@ -21014,40 +20617,655 @@
       </p:sp>
       <p:sp>
         <p:nvSpPr>
-          <p:cNvPr id="9" name="Content Placeholder 2"/>
+          <p:cNvPr id="7" name="Content Placeholder 2"/>
           <p:cNvSpPr>
             <a:spLocks noGrp="1"/>
           </p:cNvSpPr>
-          <p:nvPr>
-            <p:ph idx="1"/>
-          </p:nvPr>
+          <p:nvPr/>
+        </p:nvSpPr>
+        <p:spPr bwMode="auto">
+          <a:xfrm>
+            <a:off x="862017" y="1633550"/>
+            <a:ext cx="3614735" cy="4978565"/>
+          </a:xfrm>
+          <a:prstGeom prst="rect">
+            <a:avLst/>
+          </a:prstGeom>
+          <a:noFill/>
+          <a:ln w="9525">
+            <a:noFill/>
+            <a:miter lim="800000"/>
+            <a:headEnd/>
+            <a:tailEnd/>
+          </a:ln>
+        </p:spPr>
+        <p:txBody>
+          <a:bodyPr vert="horz" wrap="square" lIns="91440" tIns="45720" rIns="91440" bIns="45720" numCol="1" anchor="t" anchorCtr="0" compatLnSpc="1">
+            <a:prstTxWarp prst="textNoShape">
+              <a:avLst/>
+            </a:prstTxWarp>
+            <a:normAutofit/>
+          </a:bodyPr>
+          <a:lstStyle>
+            <a:lvl1pPr marL="342900" indent="-342900" algn="l" rtl="0" eaLnBrk="0" fontAlgn="base" hangingPunct="0">
+              <a:spcBef>
+                <a:spcPct val="20000"/>
+              </a:spcBef>
+              <a:spcAft>
+                <a:spcPct val="0"/>
+              </a:spcAft>
+              <a:buClr>
+                <a:schemeClr val="accent1"/>
+              </a:buClr>
+              <a:buChar char="•"/>
+              <a:defRPr sz="2400">
+                <a:solidFill>
+                  <a:schemeClr val="bg1"/>
+                </a:solidFill>
+                <a:latin typeface="+mn-lt"/>
+                <a:ea typeface="+mn-ea"/>
+                <a:cs typeface="+mn-cs"/>
+              </a:defRPr>
+            </a:lvl1pPr>
+            <a:lvl2pPr marL="742950" indent="-285750" algn="l" rtl="0" eaLnBrk="0" fontAlgn="base" hangingPunct="0">
+              <a:spcBef>
+                <a:spcPct val="20000"/>
+              </a:spcBef>
+              <a:spcAft>
+                <a:spcPct val="0"/>
+              </a:spcAft>
+              <a:buClr>
+                <a:schemeClr val="accent1"/>
+              </a:buClr>
+              <a:buChar char="•"/>
+              <a:defRPr sz="2000">
+                <a:solidFill>
+                  <a:schemeClr val="bg1"/>
+                </a:solidFill>
+                <a:latin typeface="+mn-lt"/>
+              </a:defRPr>
+            </a:lvl2pPr>
+            <a:lvl3pPr marL="1143000" indent="-228600" algn="l" rtl="0" eaLnBrk="0" fontAlgn="base" hangingPunct="0">
+              <a:spcBef>
+                <a:spcPct val="20000"/>
+              </a:spcBef>
+              <a:spcAft>
+                <a:spcPct val="0"/>
+              </a:spcAft>
+              <a:buClr>
+                <a:schemeClr val="accent1"/>
+              </a:buClr>
+              <a:buChar char="•"/>
+              <a:defRPr sz="2400">
+                <a:solidFill>
+                  <a:schemeClr val="bg1"/>
+                </a:solidFill>
+                <a:latin typeface="+mn-lt"/>
+              </a:defRPr>
+            </a:lvl3pPr>
+            <a:lvl4pPr marL="1600200" indent="-228600" algn="l" rtl="0" eaLnBrk="0" fontAlgn="base" hangingPunct="0">
+              <a:spcBef>
+                <a:spcPct val="20000"/>
+              </a:spcBef>
+              <a:spcAft>
+                <a:spcPct val="0"/>
+              </a:spcAft>
+              <a:buClr>
+                <a:schemeClr val="accent1"/>
+              </a:buClr>
+              <a:buChar char="•"/>
+              <a:defRPr sz="2000">
+                <a:solidFill>
+                  <a:schemeClr val="bg1"/>
+                </a:solidFill>
+                <a:latin typeface="+mn-lt"/>
+              </a:defRPr>
+            </a:lvl4pPr>
+            <a:lvl5pPr marL="2057400" indent="-228600" algn="l" rtl="0" eaLnBrk="0" fontAlgn="base" hangingPunct="0">
+              <a:spcBef>
+                <a:spcPct val="20000"/>
+              </a:spcBef>
+              <a:spcAft>
+                <a:spcPct val="0"/>
+              </a:spcAft>
+              <a:buClr>
+                <a:schemeClr val="accent1"/>
+              </a:buClr>
+              <a:buChar char="•"/>
+              <a:defRPr sz="2000">
+                <a:solidFill>
+                  <a:schemeClr val="bg1"/>
+                </a:solidFill>
+                <a:latin typeface="+mn-lt"/>
+              </a:defRPr>
+            </a:lvl5pPr>
+            <a:lvl6pPr marL="2514600" indent="-228600" algn="l" rtl="0" eaLnBrk="1" fontAlgn="base" hangingPunct="1">
+              <a:spcBef>
+                <a:spcPct val="20000"/>
+              </a:spcBef>
+              <a:spcAft>
+                <a:spcPct val="0"/>
+              </a:spcAft>
+              <a:buClr>
+                <a:schemeClr val="tx2"/>
+              </a:buClr>
+              <a:buChar char="•"/>
+              <a:defRPr>
+                <a:solidFill>
+                  <a:schemeClr val="tx1"/>
+                </a:solidFill>
+                <a:latin typeface="+mn-lt"/>
+              </a:defRPr>
+            </a:lvl6pPr>
+            <a:lvl7pPr marL="2971800" indent="-228600" algn="l" rtl="0" eaLnBrk="1" fontAlgn="base" hangingPunct="1">
+              <a:spcBef>
+                <a:spcPct val="20000"/>
+              </a:spcBef>
+              <a:spcAft>
+                <a:spcPct val="0"/>
+              </a:spcAft>
+              <a:buClr>
+                <a:schemeClr val="tx2"/>
+              </a:buClr>
+              <a:buChar char="•"/>
+              <a:defRPr>
+                <a:solidFill>
+                  <a:schemeClr val="tx1"/>
+                </a:solidFill>
+                <a:latin typeface="+mn-lt"/>
+              </a:defRPr>
+            </a:lvl7pPr>
+            <a:lvl8pPr marL="3429000" indent="-228600" algn="l" rtl="0" eaLnBrk="1" fontAlgn="base" hangingPunct="1">
+              <a:spcBef>
+                <a:spcPct val="20000"/>
+              </a:spcBef>
+              <a:spcAft>
+                <a:spcPct val="0"/>
+              </a:spcAft>
+              <a:buClr>
+                <a:schemeClr val="tx2"/>
+              </a:buClr>
+              <a:buChar char="•"/>
+              <a:defRPr>
+                <a:solidFill>
+                  <a:schemeClr val="tx1"/>
+                </a:solidFill>
+                <a:latin typeface="+mn-lt"/>
+              </a:defRPr>
+            </a:lvl8pPr>
+            <a:lvl9pPr marL="3886200" indent="-228600" algn="l" rtl="0" eaLnBrk="1" fontAlgn="base" hangingPunct="1">
+              <a:spcBef>
+                <a:spcPct val="20000"/>
+              </a:spcBef>
+              <a:spcAft>
+                <a:spcPct val="0"/>
+              </a:spcAft>
+              <a:buClr>
+                <a:schemeClr val="tx2"/>
+              </a:buClr>
+              <a:buChar char="•"/>
+              <a:defRPr>
+                <a:solidFill>
+                  <a:schemeClr val="tx1"/>
+                </a:solidFill>
+                <a:latin typeface="+mn-lt"/>
+              </a:defRPr>
+            </a:lvl9pPr>
+          </a:lstStyle>
+          <a:p>
+            <a:pPr>
+              <a:buNone/>
+            </a:pPr>
+            <a:r>
+              <a:rPr lang="en-US" sz="1800" b="1" dirty="0" smtClean="0">
+                <a:solidFill>
+                  <a:schemeClr val="accent5">
+                    <a:lumMod val="50000"/>
+                  </a:schemeClr>
+                </a:solidFill>
+                <a:latin typeface="Lucida Console" pitchFamily="49" charset="0"/>
+              </a:rPr>
+              <a:t>//F#</a:t>
+            </a:r>
+          </a:p>
+          <a:p>
+            <a:pPr>
+              <a:buNone/>
+            </a:pPr>
+            <a:r>
+              <a:rPr lang="en-AU" sz="1800" b="1" dirty="0" smtClean="0">
+                <a:solidFill>
+                  <a:schemeClr val="accent5">
+                    <a:lumMod val="50000"/>
+                  </a:schemeClr>
+                </a:solidFill>
+                <a:latin typeface="Lucida Console" pitchFamily="49" charset="0"/>
+              </a:rPr>
+              <a:t>let doubler </a:t>
+            </a:r>
+            <a:r>
+              <a:rPr lang="en-AU" sz="1800" b="1" dirty="0" err="1" smtClean="0">
+                <a:solidFill>
+                  <a:schemeClr val="accent5">
+                    <a:lumMod val="50000"/>
+                  </a:schemeClr>
+                </a:solidFill>
+                <a:latin typeface="Lucida Console" pitchFamily="49" charset="0"/>
+              </a:rPr>
+              <a:t>val</a:t>
+            </a:r>
+            <a:r>
+              <a:rPr lang="en-AU" sz="1800" b="1" dirty="0" smtClean="0">
+                <a:solidFill>
+                  <a:schemeClr val="accent5">
+                    <a:lumMod val="50000"/>
+                  </a:schemeClr>
+                </a:solidFill>
+                <a:latin typeface="Lucida Console" pitchFamily="49" charset="0"/>
+              </a:rPr>
+              <a:t> = </a:t>
+            </a:r>
+          </a:p>
+          <a:p>
+            <a:pPr>
+              <a:buNone/>
+            </a:pPr>
+            <a:r>
+              <a:rPr lang="en-AU" sz="1800" b="1" dirty="0">
+                <a:solidFill>
+                  <a:schemeClr val="accent5">
+                    <a:lumMod val="50000"/>
+                  </a:schemeClr>
+                </a:solidFill>
+                <a:latin typeface="Lucida Console" pitchFamily="49" charset="0"/>
+              </a:rPr>
+              <a:t> </a:t>
+            </a:r>
+            <a:r>
+              <a:rPr lang="en-AU" sz="1800" b="1" dirty="0" smtClean="0">
+                <a:solidFill>
+                  <a:schemeClr val="accent5">
+                    <a:lumMod val="50000"/>
+                  </a:schemeClr>
+                </a:solidFill>
+                <a:latin typeface="Lucida Console" pitchFamily="49" charset="0"/>
+              </a:rPr>
+              <a:t>   </a:t>
+            </a:r>
+            <a:r>
+              <a:rPr lang="en-AU" sz="1800" b="1" dirty="0" err="1" smtClean="0">
+                <a:solidFill>
+                  <a:schemeClr val="accent5">
+                    <a:lumMod val="50000"/>
+                  </a:schemeClr>
+                </a:solidFill>
+                <a:latin typeface="Lucida Console" pitchFamily="49" charset="0"/>
+              </a:rPr>
+              <a:t>val</a:t>
+            </a:r>
+            <a:r>
+              <a:rPr lang="en-AU" sz="1800" b="1" dirty="0" smtClean="0">
+                <a:solidFill>
+                  <a:schemeClr val="accent5">
+                    <a:lumMod val="50000"/>
+                  </a:schemeClr>
+                </a:solidFill>
+                <a:latin typeface="Lucida Console" pitchFamily="49" charset="0"/>
+              </a:rPr>
+              <a:t> + </a:t>
+            </a:r>
+            <a:r>
+              <a:rPr lang="en-AU" sz="1800" b="1" dirty="0" err="1" smtClean="0">
+                <a:solidFill>
+                  <a:schemeClr val="accent5">
+                    <a:lumMod val="50000"/>
+                  </a:schemeClr>
+                </a:solidFill>
+                <a:latin typeface="Lucida Console" pitchFamily="49" charset="0"/>
+              </a:rPr>
+              <a:t>val</a:t>
+            </a:r>
+            <a:endParaRPr lang="en-AU" sz="1800" b="1" dirty="0">
+              <a:solidFill>
+                <a:schemeClr val="accent5">
+                  <a:lumMod val="50000"/>
+                </a:schemeClr>
+              </a:solidFill>
+              <a:latin typeface="Lucida Console" pitchFamily="49" charset="0"/>
+            </a:endParaRPr>
+          </a:p>
+          <a:p>
+            <a:pPr>
+              <a:buNone/>
+            </a:pPr>
+            <a:r>
+              <a:rPr lang="en-AU" sz="1800" b="1" dirty="0" smtClean="0">
+                <a:solidFill>
+                  <a:schemeClr val="accent5">
+                    <a:lumMod val="50000"/>
+                  </a:schemeClr>
+                </a:solidFill>
+                <a:latin typeface="Lucida Console" pitchFamily="49" charset="0"/>
+              </a:rPr>
+              <a:t>Doubler 2</a:t>
+            </a:r>
+            <a:endParaRPr lang="en-US" sz="1800" b="1" dirty="0">
+              <a:solidFill>
+                <a:schemeClr val="accent5">
+                  <a:lumMod val="50000"/>
+                </a:schemeClr>
+              </a:solidFill>
+              <a:latin typeface="Lucida Console" pitchFamily="49" charset="0"/>
+            </a:endParaRPr>
+          </a:p>
+        </p:txBody>
+      </p:sp>
+      <p:sp>
+        <p:nvSpPr>
+          <p:cNvPr id="8" name="Content Placeholder 2"/>
+          <p:cNvSpPr txBox="1">
+            <a:spLocks/>
+          </p:cNvSpPr>
+          <p:nvPr/>
         </p:nvSpPr>
         <p:spPr>
           <a:xfrm>
-            <a:off x="1043492" y="2323652"/>
-            <a:ext cx="6777317" cy="3508977"/>
+            <a:off x="4191000" y="1676400"/>
+            <a:ext cx="5423166" cy="4978565"/>
           </a:xfrm>
+          <a:prstGeom prst="rect">
+            <a:avLst/>
+          </a:prstGeom>
         </p:spPr>
         <p:txBody>
-          <a:bodyPr>
-            <a:normAutofit/>
+          <a:bodyPr vert="horz" lIns="91432" tIns="45715" rIns="91432" bIns="45715" rtlCol="0">
+            <a:noAutofit/>
           </a:bodyPr>
-          <a:lstStyle/>
-          <a:p>
-            <a:pPr marL="68580" indent="0">
-              <a:buNone/>
+          <a:lstStyle>
+            <a:defPPr>
+              <a:defRPr lang="en-US"/>
+            </a:defPPr>
+            <a:lvl1pPr algn="l" rtl="0" fontAlgn="base">
+              <a:spcBef>
+                <a:spcPct val="0"/>
+              </a:spcBef>
+              <a:spcAft>
+                <a:spcPct val="0"/>
+              </a:spcAft>
+              <a:defRPr kern="1200">
+                <a:solidFill>
+                  <a:srgbClr val="A2998A"/>
+                </a:solidFill>
+                <a:latin typeface="Segoe"/>
+                <a:ea typeface="+mn-ea"/>
+                <a:cs typeface="+mn-cs"/>
+              </a:defRPr>
+            </a:lvl1pPr>
+            <a:lvl2pPr marL="457200" algn="l" rtl="0" fontAlgn="base">
+              <a:spcBef>
+                <a:spcPct val="0"/>
+              </a:spcBef>
+              <a:spcAft>
+                <a:spcPct val="0"/>
+              </a:spcAft>
+              <a:defRPr kern="1200">
+                <a:solidFill>
+                  <a:srgbClr val="A2998A"/>
+                </a:solidFill>
+                <a:latin typeface="Segoe"/>
+                <a:ea typeface="+mn-ea"/>
+                <a:cs typeface="+mn-cs"/>
+              </a:defRPr>
+            </a:lvl2pPr>
+            <a:lvl3pPr marL="914400" algn="l" rtl="0" fontAlgn="base">
+              <a:spcBef>
+                <a:spcPct val="0"/>
+              </a:spcBef>
+              <a:spcAft>
+                <a:spcPct val="0"/>
+              </a:spcAft>
+              <a:defRPr kern="1200">
+                <a:solidFill>
+                  <a:srgbClr val="A2998A"/>
+                </a:solidFill>
+                <a:latin typeface="Segoe"/>
+                <a:ea typeface="+mn-ea"/>
+                <a:cs typeface="+mn-cs"/>
+              </a:defRPr>
+            </a:lvl3pPr>
+            <a:lvl4pPr marL="1371600" algn="l" rtl="0" fontAlgn="base">
+              <a:spcBef>
+                <a:spcPct val="0"/>
+              </a:spcBef>
+              <a:spcAft>
+                <a:spcPct val="0"/>
+              </a:spcAft>
+              <a:defRPr kern="1200">
+                <a:solidFill>
+                  <a:srgbClr val="A2998A"/>
+                </a:solidFill>
+                <a:latin typeface="Segoe"/>
+                <a:ea typeface="+mn-ea"/>
+                <a:cs typeface="+mn-cs"/>
+              </a:defRPr>
+            </a:lvl4pPr>
+            <a:lvl5pPr marL="1828800" algn="l" rtl="0" fontAlgn="base">
+              <a:spcBef>
+                <a:spcPct val="0"/>
+              </a:spcBef>
+              <a:spcAft>
+                <a:spcPct val="0"/>
+              </a:spcAft>
+              <a:defRPr kern="1200">
+                <a:solidFill>
+                  <a:srgbClr val="A2998A"/>
+                </a:solidFill>
+                <a:latin typeface="Segoe"/>
+                <a:ea typeface="+mn-ea"/>
+                <a:cs typeface="+mn-cs"/>
+              </a:defRPr>
+            </a:lvl5pPr>
+            <a:lvl6pPr marL="2286000" algn="l" defTabSz="914400" rtl="0" eaLnBrk="1" latinLnBrk="0" hangingPunct="1">
+              <a:defRPr kern="1200">
+                <a:solidFill>
+                  <a:srgbClr val="A2998A"/>
+                </a:solidFill>
+                <a:latin typeface="Segoe"/>
+                <a:ea typeface="+mn-ea"/>
+                <a:cs typeface="+mn-cs"/>
+              </a:defRPr>
+            </a:lvl6pPr>
+            <a:lvl7pPr marL="2743200" algn="l" defTabSz="914400" rtl="0" eaLnBrk="1" latinLnBrk="0" hangingPunct="1">
+              <a:defRPr kern="1200">
+                <a:solidFill>
+                  <a:srgbClr val="A2998A"/>
+                </a:solidFill>
+                <a:latin typeface="Segoe"/>
+                <a:ea typeface="+mn-ea"/>
+                <a:cs typeface="+mn-cs"/>
+              </a:defRPr>
+            </a:lvl7pPr>
+            <a:lvl8pPr marL="3200400" algn="l" defTabSz="914400" rtl="0" eaLnBrk="1" latinLnBrk="0" hangingPunct="1">
+              <a:defRPr kern="1200">
+                <a:solidFill>
+                  <a:srgbClr val="A2998A"/>
+                </a:solidFill>
+                <a:latin typeface="Segoe"/>
+                <a:ea typeface="+mn-ea"/>
+                <a:cs typeface="+mn-cs"/>
+              </a:defRPr>
+            </a:lvl8pPr>
+            <a:lvl9pPr marL="3657600" algn="l" defTabSz="914400" rtl="0" eaLnBrk="1" latinLnBrk="0" hangingPunct="1">
+              <a:defRPr kern="1200">
+                <a:solidFill>
+                  <a:srgbClr val="A2998A"/>
+                </a:solidFill>
+                <a:latin typeface="Segoe"/>
+                <a:ea typeface="+mn-ea"/>
+                <a:cs typeface="+mn-cs"/>
+              </a:defRPr>
+            </a:lvl9pPr>
+          </a:lstStyle>
+          <a:p>
+            <a:pPr marL="342871" indent="-342871">
+              <a:spcBef>
+                <a:spcPct val="20000"/>
+              </a:spcBef>
+              <a:defRPr/>
             </a:pPr>
             <a:r>
-              <a:rPr lang="en-US" dirty="0" smtClean="0"/>
-              <a:t>Kind of like a switch/case statement, but so much more!</a:t>
-            </a:r>
+              <a:rPr lang="en-US" b="1" dirty="0">
+                <a:solidFill>
+                  <a:schemeClr val="tx2">
+                    <a:lumMod val="60000"/>
+                    <a:lumOff val="40000"/>
+                  </a:schemeClr>
+                </a:solidFill>
+                <a:latin typeface="Lucida Console" pitchFamily="49" charset="0"/>
+              </a:rPr>
+              <a:t>//C#</a:t>
+            </a:r>
+          </a:p>
+          <a:p>
+            <a:r>
+              <a:rPr lang="en-US" b="1" dirty="0" err="1" smtClean="0">
+                <a:latin typeface="Lucida Console" pitchFamily="49" charset="0"/>
+              </a:rPr>
+              <a:t>Func</a:t>
+            </a:r>
+            <a:r>
+              <a:rPr lang="en-US" b="1" dirty="0" smtClean="0">
+                <a:latin typeface="Lucida Console" pitchFamily="49" charset="0"/>
+              </a:rPr>
+              <a:t>&lt;</a:t>
+            </a:r>
+            <a:r>
+              <a:rPr lang="en-US" b="1" dirty="0" err="1" smtClean="0">
+                <a:latin typeface="Lucida Console" pitchFamily="49" charset="0"/>
+              </a:rPr>
+              <a:t>int</a:t>
+            </a:r>
+            <a:r>
+              <a:rPr lang="en-US" b="1" dirty="0">
+                <a:latin typeface="Lucida Console" pitchFamily="49" charset="0"/>
+              </a:rPr>
+              <a:t>, </a:t>
+            </a:r>
+            <a:r>
+              <a:rPr lang="en-US" b="1" dirty="0" err="1">
+                <a:latin typeface="Lucida Console" pitchFamily="49" charset="0"/>
+              </a:rPr>
+              <a:t>int</a:t>
+            </a:r>
+            <a:r>
+              <a:rPr lang="en-US" b="1" dirty="0">
+                <a:latin typeface="Lucida Console" pitchFamily="49" charset="0"/>
+              </a:rPr>
+              <a:t>&gt; </a:t>
+            </a:r>
+            <a:r>
+              <a:rPr lang="en-US" b="1" dirty="0" err="1">
+                <a:latin typeface="Lucida Console" pitchFamily="49" charset="0"/>
+              </a:rPr>
+              <a:t>doubler</a:t>
+            </a:r>
+            <a:r>
+              <a:rPr lang="en-US" b="1" dirty="0">
+                <a:latin typeface="Lucida Console" pitchFamily="49" charset="0"/>
+              </a:rPr>
+              <a:t> = </a:t>
+            </a:r>
+            <a:endParaRPr lang="en-US" b="1" dirty="0" smtClean="0">
+              <a:latin typeface="Lucida Console" pitchFamily="49" charset="0"/>
+            </a:endParaRPr>
+          </a:p>
+          <a:p>
+            <a:r>
+              <a:rPr lang="en-US" b="1" dirty="0" smtClean="0">
+                <a:latin typeface="Lucida Console" pitchFamily="49" charset="0"/>
+              </a:rPr>
+              <a:t>    (</a:t>
+            </a:r>
+            <a:r>
+              <a:rPr lang="en-US" b="1" dirty="0" err="1">
+                <a:latin typeface="Lucida Console" pitchFamily="49" charset="0"/>
+              </a:rPr>
+              <a:t>val</a:t>
+            </a:r>
+            <a:r>
+              <a:rPr lang="en-US" b="1" dirty="0">
+                <a:latin typeface="Lucida Console" pitchFamily="49" charset="0"/>
+              </a:rPr>
+              <a:t>) =&gt; </a:t>
+            </a:r>
+            <a:r>
+              <a:rPr lang="en-US" b="1" dirty="0" err="1">
+                <a:latin typeface="Lucida Console" pitchFamily="49" charset="0"/>
+              </a:rPr>
+              <a:t>val</a:t>
+            </a:r>
+            <a:r>
+              <a:rPr lang="en-US" b="1" dirty="0">
+                <a:latin typeface="Lucida Console" pitchFamily="49" charset="0"/>
+              </a:rPr>
+              <a:t> + </a:t>
+            </a:r>
+            <a:r>
+              <a:rPr lang="en-US" b="1" dirty="0" err="1">
+                <a:latin typeface="Lucida Console" pitchFamily="49" charset="0"/>
+              </a:rPr>
+              <a:t>val</a:t>
+            </a:r>
+            <a:r>
+              <a:rPr lang="en-US" b="1" dirty="0">
+                <a:latin typeface="Lucida Console" pitchFamily="49" charset="0"/>
+              </a:rPr>
+              <a:t>;</a:t>
+            </a:r>
+            <a:br>
+              <a:rPr lang="en-US" b="1" dirty="0">
+                <a:latin typeface="Lucida Console" pitchFamily="49" charset="0"/>
+              </a:rPr>
+            </a:br>
+            <a:r>
+              <a:rPr lang="en-US" b="1" dirty="0" err="1" smtClean="0">
+                <a:latin typeface="Lucida Console" pitchFamily="49" charset="0"/>
+              </a:rPr>
+              <a:t>doubler</a:t>
+            </a:r>
+            <a:r>
+              <a:rPr lang="en-US" b="1" dirty="0" smtClean="0">
+                <a:latin typeface="Lucida Console" pitchFamily="49" charset="0"/>
+              </a:rPr>
+              <a:t>(2);</a:t>
+            </a:r>
+            <a:r>
+              <a:rPr lang="en-US" dirty="0">
+                <a:latin typeface="Lucida Bright" pitchFamily="18" charset="0"/>
+              </a:rPr>
+              <a:t/>
+            </a:r>
+            <a:br>
+              <a:rPr lang="en-US" dirty="0">
+                <a:latin typeface="Lucida Bright" pitchFamily="18" charset="0"/>
+              </a:rPr>
+            </a:br>
+            <a:endParaRPr lang="en-AU" b="1" dirty="0">
+              <a:solidFill>
+                <a:schemeClr val="tx2">
+                  <a:lumMod val="60000"/>
+                  <a:lumOff val="40000"/>
+                </a:schemeClr>
+              </a:solidFill>
+              <a:latin typeface="Lucida Bright" pitchFamily="18" charset="0"/>
+            </a:endParaRPr>
           </a:p>
         </p:txBody>
       </p:sp>
     </p:spTree>
     <p:extLst>
       <p:ext uri="{BB962C8B-B14F-4D97-AF65-F5344CB8AC3E}">
-        <p14:creationId xmlns:p14="http://schemas.microsoft.com/office/powerpoint/2010/main" val="3850705532"/>
+        <p14:creationId xmlns:p14="http://schemas.microsoft.com/office/powerpoint/2010/main" val="2674812852"/>
       </p:ext>
     </p:extLst>
   </p:cSld>

</xml_diff>

<commit_message>
Updated for CodeStock 2012
</commit_message>
<xml_diff>
--- a/Getting Started with F# Web Development.pptx
+++ b/Getting Started with F# Web Development.pptx
@@ -15,13 +15,15 @@
     <p:sldId id="273" r:id="rId9"/>
     <p:sldId id="275" r:id="rId10"/>
     <p:sldId id="279" r:id="rId11"/>
-    <p:sldId id="266" r:id="rId12"/>
-    <p:sldId id="267" r:id="rId13"/>
-    <p:sldId id="276" r:id="rId14"/>
-    <p:sldId id="277" r:id="rId15"/>
-    <p:sldId id="270" r:id="rId16"/>
-    <p:sldId id="271" r:id="rId17"/>
-    <p:sldId id="272" r:id="rId18"/>
+    <p:sldId id="267" r:id="rId12"/>
+    <p:sldId id="276" r:id="rId13"/>
+    <p:sldId id="280" r:id="rId14"/>
+    <p:sldId id="281" r:id="rId15"/>
+    <p:sldId id="282" r:id="rId16"/>
+    <p:sldId id="277" r:id="rId17"/>
+    <p:sldId id="270" r:id="rId18"/>
+    <p:sldId id="271" r:id="rId19"/>
+    <p:sldId id="272" r:id="rId20"/>
   </p:sldIdLst>
   <p:sldSz cx="9144000" cy="6858000" type="screen4x3"/>
   <p:notesSz cx="6858000" cy="9144000"/>
@@ -2881,7 +2883,7 @@
             <a:fld id="{0A98AF03-7270-45C2-A683-C5E353EF01A5}" type="datetime4">
               <a:rPr lang="en-US" smtClean="0"/>
               <a:pPr/>
-              <a:t>August 13, 2011</a:t>
+              <a:t>May 31, 2012</a:t>
             </a:fld>
             <a:endParaRPr lang="en-US" dirty="0"/>
           </a:p>
@@ -3168,7 +3170,7 @@
             <a:fld id="{A2FB5AFD-D735-4504-A039-ADEBB6448D55}" type="datetime4">
               <a:rPr lang="en-US" smtClean="0"/>
               <a:pPr/>
-              <a:t>August 13, 2011</a:t>
+              <a:t>May 31, 2012</a:t>
             </a:fld>
             <a:endParaRPr lang="en-US"/>
           </a:p>
@@ -3345,7 +3347,7 @@
             <a:fld id="{AB5C8118-FB93-4E87-B380-0175F2FE2167}" type="datetime4">
               <a:rPr lang="en-US" smtClean="0"/>
               <a:pPr/>
-              <a:t>August 13, 2011</a:t>
+              <a:t>May 31, 2012</a:t>
             </a:fld>
             <a:endParaRPr lang="en-US"/>
           </a:p>
@@ -3512,7 +3514,7 @@
             <a:fld id="{05A93482-8E69-40F7-BCAD-5662A6CADB27}" type="datetime4">
               <a:rPr lang="en-US" smtClean="0"/>
               <a:pPr/>
-              <a:t>August 13, 2011</a:t>
+              <a:t>May 31, 2012</a:t>
             </a:fld>
             <a:endParaRPr lang="en-US"/>
           </a:p>
@@ -3755,7 +3757,7 @@
             <a:fld id="{FBB7EAE1-CAAC-4AEF-919E-158692B1E55E}" type="datetime4">
               <a:rPr lang="en-US" smtClean="0"/>
               <a:pPr/>
-              <a:t>August 13, 2011</a:t>
+              <a:t>May 31, 2012</a:t>
             </a:fld>
             <a:endParaRPr lang="en-US"/>
           </a:p>
@@ -3870,7 +3872,7 @@
             <a:fld id="{9525A706-D8F2-4D1A-855A-CADC92600C26}" type="datetime4">
               <a:rPr lang="en-US" smtClean="0"/>
               <a:pPr/>
-              <a:t>August 13, 2011</a:t>
+              <a:t>May 31, 2012</a:t>
             </a:fld>
             <a:endParaRPr lang="en-US"/>
           </a:p>
@@ -4411,7 +4413,7 @@
             <a:fld id="{99B4F123-1704-49AC-9D15-C4B1462B8014}" type="datetime4">
               <a:rPr lang="en-US" smtClean="0"/>
               <a:pPr/>
-              <a:t>August 13, 2011</a:t>
+              <a:t>May 31, 2012</a:t>
             </a:fld>
             <a:endParaRPr lang="en-US"/>
           </a:p>
@@ -4526,7 +4528,7 @@
             <a:fld id="{E3127EC2-47FB-48A1-8644-C8A81DDAA119}" type="datetime4">
               <a:rPr lang="en-US" smtClean="0"/>
               <a:pPr/>
-              <a:t>August 13, 2011</a:t>
+              <a:t>May 31, 2012</a:t>
             </a:fld>
             <a:endParaRPr lang="en-US"/>
           </a:p>
@@ -4618,7 +4620,7 @@
             <a:fld id="{AE3EC3ED-7435-49F9-84C8-03CCA2F8DEDB}" type="datetime4">
               <a:rPr lang="en-US" smtClean="0"/>
               <a:pPr/>
-              <a:t>August 13, 2011</a:t>
+              <a:t>May 31, 2012</a:t>
             </a:fld>
             <a:endParaRPr lang="en-US"/>
           </a:p>
@@ -7271,7 +7273,7 @@
             <a:fld id="{3FC49BF1-FCD3-4395-8FF6-0047AF66228E}" type="datetime4">
               <a:rPr lang="en-US" smtClean="0"/>
               <a:pPr/>
-              <a:t>August 13, 2011</a:t>
+              <a:t>May 31, 2012</a:t>
             </a:fld>
             <a:endParaRPr lang="en-US"/>
           </a:p>
@@ -10485,7 +10487,7 @@
             <a:fld id="{CA861222-2C8B-4501-BE87-6797EC025925}" type="datetime4">
               <a:rPr lang="en-US" smtClean="0"/>
               <a:pPr/>
-              <a:t>August 13, 2011</a:t>
+              <a:t>May 31, 2012</a:t>
             </a:fld>
             <a:endParaRPr lang="en-US"/>
           </a:p>
@@ -13309,7 +13311,7 @@
             <a:fld id="{16C01193-8287-4834-A286-6B880643E934}" type="datetime4">
               <a:rPr lang="en-US" smtClean="0"/>
               <a:pPr/>
-              <a:t>August 13, 2011</a:t>
+              <a:t>May 31, 2012</a:t>
             </a:fld>
             <a:endParaRPr lang="en-US"/>
           </a:p>
@@ -13968,7 +13970,7 @@
             <a:fld id="{05A93482-8E69-40F7-BCAD-5662A6CADB27}" type="datetime4">
               <a:rPr lang="en-US" smtClean="0"/>
               <a:pPr/>
-              <a:t>August 13, 2011</a:t>
+              <a:t>May 31, 2012</a:t>
             </a:fld>
             <a:endParaRPr lang="en-US"/>
           </a:p>
@@ -14278,9 +14280,7 @@
         </p:nvSpPr>
         <p:spPr/>
         <p:txBody>
-          <a:bodyPr>
-            <a:normAutofit/>
-          </a:bodyPr>
+          <a:bodyPr/>
           <a:lstStyle/>
           <a:p>
             <a:r>
@@ -14291,7 +14291,7 @@
                   </a:schemeClr>
                 </a:solidFill>
               </a:rPr>
-              <a:t>F#/C# Silverlight Example</a:t>
+              <a:t>F# Silverlight Example</a:t>
             </a:r>
             <a:endParaRPr lang="en-US" dirty="0"/>
           </a:p>
@@ -14310,7 +14310,7 @@
         <p:spPr/>
         <p:txBody>
           <a:bodyPr>
-            <a:normAutofit/>
+            <a:normAutofit lnSpcReduction="10000"/>
           </a:bodyPr>
           <a:lstStyle/>
           <a:p>
@@ -14318,11 +14318,73 @@
               <a:buNone/>
             </a:pPr>
             <a:r>
+              <a:rPr lang="en-US" dirty="0"/>
+              <a:t>F# </a:t>
+            </a:r>
+            <a:r>
+              <a:rPr lang="en-US" dirty="0" smtClean="0"/>
+              <a:t>Only:</a:t>
+            </a:r>
+            <a:endParaRPr lang="en-US" dirty="0" smtClean="0">
+              <a:hlinkClick r:id="rId2"/>
+            </a:endParaRPr>
+          </a:p>
+          <a:p>
+            <a:pPr marL="68580" indent="0">
+              <a:buNone/>
+            </a:pPr>
+            <a:r>
+              <a:rPr lang="en-US" dirty="0" smtClean="0">
+                <a:hlinkClick r:id="rId2"/>
+              </a:rPr>
+              <a:t>http</a:t>
+            </a:r>
+            <a:r>
               <a:rPr lang="en-US" dirty="0">
                 <a:hlinkClick r:id="rId2"/>
               </a:rPr>
+              <a:t>://</a:t>
+            </a:r>
+            <a:r>
+              <a:rPr lang="en-US" dirty="0" smtClean="0">
+                <a:hlinkClick r:id="rId2"/>
+              </a:rPr>
+              <a:t>visualstudiogallery.msdn.microsoft.com/en-us/f0e9a557-3fd6-41d9-8518-c1735b382c73</a:t>
+            </a:r>
+            <a:endParaRPr lang="en-US" dirty="0" smtClean="0"/>
+          </a:p>
+          <a:p>
+            <a:pPr marL="68580" indent="0">
+              <a:buNone/>
+            </a:pPr>
+            <a:endParaRPr lang="en-US" dirty="0" smtClean="0"/>
+          </a:p>
+          <a:p>
+            <a:pPr marL="68580" indent="0">
+              <a:buNone/>
+            </a:pPr>
+            <a:r>
+              <a:rPr lang="en-US" dirty="0" smtClean="0"/>
+              <a:t>F# and C#:</a:t>
+            </a:r>
+            <a:endParaRPr lang="en-US" dirty="0"/>
+          </a:p>
+          <a:p>
+            <a:pPr marL="68580" indent="0">
+              <a:buNone/>
+            </a:pPr>
+            <a:r>
+              <a:rPr lang="en-US" dirty="0">
+                <a:hlinkClick r:id="rId3"/>
+              </a:rPr>
               <a:t>http://visualstudiogallery.msdn.microsoft.com/en-us/64f3d710-04c1-42d2-9e5d-4e20a19a7666</a:t>
             </a:r>
+            <a:endParaRPr lang="en-US" dirty="0"/>
+          </a:p>
+          <a:p>
+            <a:pPr marL="68580" indent="0">
+              <a:buNone/>
+            </a:pPr>
             <a:endParaRPr lang="en-US" dirty="0" smtClean="0"/>
           </a:p>
         </p:txBody>
@@ -14345,7 +14407,7 @@
             <a:fld id="{05A93482-8E69-40F7-BCAD-5662A6CADB27}" type="datetime4">
               <a:rPr lang="en-US" smtClean="0"/>
               <a:pPr/>
-              <a:t>August 13, 2011</a:t>
+              <a:t>May 31, 2012</a:t>
             </a:fld>
             <a:endParaRPr lang="en-US"/>
           </a:p>
@@ -14397,7 +14459,7 @@
     </p:spTree>
     <p:extLst>
       <p:ext uri="{BB962C8B-B14F-4D97-AF65-F5344CB8AC3E}">
-        <p14:creationId xmlns:p14="http://schemas.microsoft.com/office/powerpoint/2010/main" val="1898667400"/>
+        <p14:creationId xmlns:p14="http://schemas.microsoft.com/office/powerpoint/2010/main" val="1638638283"/>
       </p:ext>
     </p:extLst>
   </p:cSld>
@@ -14443,7 +14505,9 @@
         </p:nvSpPr>
         <p:spPr/>
         <p:txBody>
-          <a:bodyPr/>
+          <a:bodyPr>
+            <a:normAutofit fontScale="90000"/>
+          </a:bodyPr>
           <a:lstStyle/>
           <a:p>
             <a:r>
@@ -14454,7 +14518,17 @@
                   </a:schemeClr>
                 </a:solidFill>
               </a:rPr>
-              <a:t>F# Silverlight Example</a:t>
+              <a:t>F#/C# ASP.NET </a:t>
+            </a:r>
+            <a:r>
+              <a:rPr lang="en-US" dirty="0" smtClean="0">
+                <a:solidFill>
+                  <a:schemeClr val="accent5">
+                    <a:lumMod val="50000"/>
+                  </a:schemeClr>
+                </a:solidFill>
+              </a:rPr>
+              <a:t>Web API Example</a:t>
             </a:r>
             <a:endParaRPr lang="en-US" dirty="0"/>
           </a:p>
@@ -14484,9 +14558,15 @@
               <a:rPr lang="en-US" dirty="0">
                 <a:hlinkClick r:id="rId2"/>
               </a:rPr>
-              <a:t>http://visualstudiogallery.msdn.microsoft.com/en-us/f0e9a557-3fd6-41d9-8518-c1735b382c73</a:t>
-            </a:r>
-            <a:endParaRPr lang="en-US" dirty="0" smtClean="0"/>
+              <a:t>http://</a:t>
+            </a:r>
+            <a:r>
+              <a:rPr lang="en-US" dirty="0" smtClean="0">
+                <a:hlinkClick r:id="rId2"/>
+              </a:rPr>
+              <a:t>visualstudiogallery.msdn.microsoft.com/3d2bf938-fc9e-403c-90b3-8de27dc23095</a:t>
+            </a:r>
+            <a:endParaRPr lang="en-US" dirty="0"/>
           </a:p>
         </p:txBody>
       </p:sp>
@@ -14508,7 +14588,7 @@
             <a:fld id="{05A93482-8E69-40F7-BCAD-5662A6CADB27}" type="datetime4">
               <a:rPr lang="en-US" smtClean="0"/>
               <a:pPr/>
-              <a:t>August 13, 2011</a:t>
+              <a:t>May 31, 2012</a:t>
             </a:fld>
             <a:endParaRPr lang="en-US"/>
           </a:p>
@@ -14560,7 +14640,7 @@
     </p:spTree>
     <p:extLst>
       <p:ext uri="{BB962C8B-B14F-4D97-AF65-F5344CB8AC3E}">
-        <p14:creationId xmlns:p14="http://schemas.microsoft.com/office/powerpoint/2010/main" val="1638638283"/>
+        <p14:creationId xmlns:p14="http://schemas.microsoft.com/office/powerpoint/2010/main" val="867532369"/>
       </p:ext>
     </p:extLst>
   </p:cSld>
@@ -14607,7 +14687,7 @@
         <p:spPr/>
         <p:txBody>
           <a:bodyPr>
-            <a:normAutofit fontScale="90000"/>
+            <a:normAutofit/>
           </a:bodyPr>
           <a:lstStyle/>
           <a:p>
@@ -14619,27 +14699,17 @@
                   </a:schemeClr>
                 </a:solidFill>
               </a:rPr>
-              <a:t>F#/C# </a:t>
-            </a:r>
-            <a:r>
-              <a:rPr lang="en-US" smtClean="0">
+              <a:t>F#/C# ASP.NET </a:t>
+            </a:r>
+            <a:r>
+              <a:rPr lang="en-US" dirty="0" smtClean="0">
                 <a:solidFill>
                   <a:schemeClr val="accent5">
                     <a:lumMod val="50000"/>
                   </a:schemeClr>
                 </a:solidFill>
               </a:rPr>
-              <a:t>ASP.NET MVC 3 </a:t>
-            </a:r>
-            <a:r>
-              <a:rPr lang="en-US" dirty="0" smtClean="0">
-                <a:solidFill>
-                  <a:schemeClr val="accent5">
-                    <a:lumMod val="50000"/>
-                  </a:schemeClr>
-                </a:solidFill>
-              </a:rPr>
-              <a:t>Example</a:t>
+              <a:t>Web API</a:t>
             </a:r>
             <a:endParaRPr lang="en-US" dirty="0"/>
           </a:p>
@@ -14675,33 +14745,9 @@
               <a:rPr lang="en-US" dirty="0" smtClean="0">
                 <a:hlinkClick r:id="rId2"/>
               </a:rPr>
-              <a:t>visualstudiogallery.msdn.microsoft.com/f57aa816-e96b-4133-ab5d-9b9b99914ead</a:t>
-            </a:r>
-            <a:endParaRPr lang="en-US" dirty="0" smtClean="0"/>
-          </a:p>
-          <a:p>
-            <a:pPr marL="68580" indent="0">
-              <a:buNone/>
-            </a:pPr>
+              <a:t>visualstudiogallery.msdn.microsoft.com/3d2bf938-fc9e-403c-90b3-8de27dc23095</a:t>
+            </a:r>
             <a:endParaRPr lang="en-US" dirty="0"/>
-          </a:p>
-          <a:p>
-            <a:pPr marL="68580" indent="0">
-              <a:buNone/>
-            </a:pPr>
-            <a:r>
-              <a:rPr lang="en-US" dirty="0" smtClean="0"/>
-              <a:t>- F# + ASP.NET MVC (Razor) + </a:t>
-            </a:r>
-            <a:r>
-              <a:rPr lang="en-US" dirty="0" err="1" smtClean="0"/>
-              <a:t>CoffeeScript</a:t>
-            </a:r>
-            <a:r>
-              <a:rPr lang="en-US" smtClean="0"/>
-              <a:t> Example</a:t>
-            </a:r>
-            <a:endParaRPr lang="en-US" dirty="0" smtClean="0"/>
           </a:p>
         </p:txBody>
       </p:sp>
@@ -14723,7 +14769,7 @@
             <a:fld id="{05A93482-8E69-40F7-BCAD-5662A6CADB27}" type="datetime4">
               <a:rPr lang="en-US" smtClean="0"/>
               <a:pPr/>
-              <a:t>August 13, 2011</a:t>
+              <a:t>May 31, 2012</a:t>
             </a:fld>
             <a:endParaRPr lang="en-US"/>
           </a:p>
@@ -14775,7 +14821,7 @@
     </p:spTree>
     <p:extLst>
       <p:ext uri="{BB962C8B-B14F-4D97-AF65-F5344CB8AC3E}">
-        <p14:creationId xmlns:p14="http://schemas.microsoft.com/office/powerpoint/2010/main" val="867532369"/>
+        <p14:creationId xmlns:p14="http://schemas.microsoft.com/office/powerpoint/2010/main" val="4120991718"/>
       </p:ext>
     </p:extLst>
   </p:cSld>
@@ -14827,24 +14873,14 @@
           <a:lstStyle/>
           <a:p>
             <a:r>
-              <a:rPr lang="en-US" dirty="0" err="1" smtClean="0">
+              <a:rPr lang="en-US" dirty="0" smtClean="0">
                 <a:solidFill>
                   <a:schemeClr val="accent5">
                     <a:lumMod val="50000"/>
                   </a:schemeClr>
                 </a:solidFill>
               </a:rPr>
-              <a:t>WebSharper</a:t>
-            </a:r>
-            <a:r>
-              <a:rPr lang="en-US" dirty="0" smtClean="0">
-                <a:solidFill>
-                  <a:schemeClr val="accent5">
-                    <a:lumMod val="50000"/>
-                  </a:schemeClr>
-                </a:solidFill>
-              </a:rPr>
-              <a:t> Example</a:t>
+              <a:t>Other Web Frameworks</a:t>
             </a:r>
             <a:endParaRPr lang="en-US" dirty="0"/>
           </a:p>
@@ -14867,55 +14903,49 @@
           </a:bodyPr>
           <a:lstStyle/>
           <a:p>
-            <a:pPr marL="68580" indent="0">
-              <a:buNone/>
+            <a:pPr>
+              <a:buFontTx/>
+              <a:buChar char="-"/>
             </a:pPr>
             <a:r>
-              <a:rPr lang="en-US" dirty="0">
-                <a:hlinkClick r:id="rId2"/>
-              </a:rPr>
-              <a:t>http://</a:t>
-            </a:r>
-            <a:r>
-              <a:rPr lang="en-US" dirty="0" smtClean="0">
-                <a:hlinkClick r:id="rId2"/>
-              </a:rPr>
-              <a:t>visualstudiogallery.msdn.microsoft.com/en-us/288b94ea-0ea7-4dde-8906-f72eb22fbe1b</a:t>
-            </a:r>
-            <a:endParaRPr lang="en-US" dirty="0" smtClean="0"/>
-          </a:p>
-          <a:p>
-            <a:pPr marL="68580" indent="0">
-              <a:buNone/>
+              <a:rPr lang="en-US" dirty="0" smtClean="0"/>
+              <a:t>Service Stack</a:t>
+            </a:r>
+          </a:p>
+          <a:p>
+            <a:pPr>
+              <a:buFontTx/>
+              <a:buChar char="-"/>
             </a:pPr>
             <a:endParaRPr lang="en-US" dirty="0"/>
           </a:p>
           <a:p>
-            <a:pPr marL="68580" indent="0">
-              <a:buNone/>
+            <a:pPr>
+              <a:buFontTx/>
+              <a:buChar char="-"/>
             </a:pPr>
             <a:r>
               <a:rPr lang="en-US" dirty="0" smtClean="0"/>
-              <a:t>Check out </a:t>
-            </a:r>
-            <a:r>
-              <a:rPr lang="en-US" dirty="0" smtClean="0">
-                <a:hlinkClick r:id="rId3"/>
-              </a:rPr>
-              <a:t>http://fpish.net</a:t>
-            </a:r>
+              <a:t>Nancy</a:t>
+            </a:r>
+          </a:p>
+          <a:p>
+            <a:pPr>
+              <a:buFontTx/>
+              <a:buChar char="-"/>
+            </a:pPr>
+            <a:endParaRPr lang="en-US" dirty="0"/>
+          </a:p>
+          <a:p>
+            <a:pPr>
+              <a:buFontTx/>
+              <a:buChar char="-"/>
+            </a:pPr>
             <a:r>
               <a:rPr lang="en-US" dirty="0" smtClean="0"/>
-              <a:t> for an example of a live site built with </a:t>
-            </a:r>
-            <a:r>
-              <a:rPr lang="en-US" dirty="0" err="1" smtClean="0"/>
-              <a:t>WebSharper</a:t>
-            </a:r>
-            <a:r>
-              <a:rPr lang="en-US" dirty="0" smtClean="0"/>
-              <a:t>.</a:t>
-            </a:r>
+              <a:t>Frank</a:t>
+            </a:r>
+            <a:endParaRPr lang="en-US" dirty="0"/>
           </a:p>
         </p:txBody>
       </p:sp>
@@ -14937,7 +14967,7 @@
             <a:fld id="{05A93482-8E69-40F7-BCAD-5662A6CADB27}" type="datetime4">
               <a:rPr lang="en-US" smtClean="0"/>
               <a:pPr/>
-              <a:t>August 13, 2011</a:t>
+              <a:t>May 31, 2012</a:t>
             </a:fld>
             <a:endParaRPr lang="en-US"/>
           </a:p>
@@ -14989,7 +15019,7 @@
     </p:spTree>
     <p:extLst>
       <p:ext uri="{BB962C8B-B14F-4D97-AF65-F5344CB8AC3E}">
-        <p14:creationId xmlns:p14="http://schemas.microsoft.com/office/powerpoint/2010/main" val="1626836029"/>
+        <p14:creationId xmlns:p14="http://schemas.microsoft.com/office/powerpoint/2010/main" val="679385484"/>
       </p:ext>
     </p:extLst>
   </p:cSld>
@@ -15033,12 +15063,7 @@
             <p:ph type="title"/>
           </p:nvPr>
         </p:nvSpPr>
-        <p:spPr>
-          <a:xfrm>
-            <a:off x="1072178" y="762000"/>
-            <a:ext cx="7024744" cy="780685"/>
-          </a:xfrm>
-        </p:spPr>
+        <p:spPr/>
         <p:txBody>
           <a:bodyPr>
             <a:normAutofit/>
@@ -15053,7 +15078,87 @@
                   </a:schemeClr>
                 </a:solidFill>
               </a:rPr>
-              <a:t>What Wasn’t Covered?</a:t>
+              <a:t>F# and Azure</a:t>
+            </a:r>
+            <a:endParaRPr lang="en-US" dirty="0"/>
+          </a:p>
+        </p:txBody>
+      </p:sp>
+      <p:sp>
+        <p:nvSpPr>
+          <p:cNvPr id="3" name="Content Placeholder 2"/>
+          <p:cNvSpPr>
+            <a:spLocks noGrp="1"/>
+          </p:cNvSpPr>
+          <p:nvPr>
+            <p:ph idx="1"/>
+          </p:nvPr>
+        </p:nvSpPr>
+        <p:spPr/>
+        <p:txBody>
+          <a:bodyPr>
+            <a:normAutofit/>
+          </a:bodyPr>
+          <a:lstStyle/>
+          <a:p>
+            <a:pPr>
+              <a:buFontTx/>
+              <a:buChar char="-"/>
+            </a:pPr>
+            <a:r>
+              <a:rPr lang="en-US" dirty="0"/>
+              <a:t>Fog - </a:t>
+            </a:r>
+            <a:r>
+              <a:rPr lang="en-US" dirty="0">
+                <a:hlinkClick r:id="rId2"/>
+              </a:rPr>
+              <a:t>https://</a:t>
+            </a:r>
+            <a:r>
+              <a:rPr lang="en-US" dirty="0" smtClean="0">
+                <a:hlinkClick r:id="rId2"/>
+              </a:rPr>
+              <a:t>github.com/dmohl/Fog</a:t>
+            </a:r>
+            <a:r>
+              <a:rPr lang="en-US" dirty="0" smtClean="0"/>
+              <a:t> </a:t>
+            </a:r>
+            <a:endParaRPr lang="en-US" dirty="0" smtClean="0"/>
+          </a:p>
+          <a:p>
+            <a:pPr>
+              <a:buFontTx/>
+              <a:buChar char="-"/>
+            </a:pPr>
+            <a:endParaRPr lang="en-US" dirty="0"/>
+          </a:p>
+          <a:p>
+            <a:pPr>
+              <a:buFontTx/>
+              <a:buChar char="-"/>
+            </a:pPr>
+            <a:r>
+              <a:rPr lang="en-US" dirty="0" smtClean="0"/>
+              <a:t>Nancy</a:t>
+            </a:r>
+          </a:p>
+          <a:p>
+            <a:pPr>
+              <a:buFontTx/>
+              <a:buChar char="-"/>
+            </a:pPr>
+            <a:endParaRPr lang="en-US" dirty="0"/>
+          </a:p>
+          <a:p>
+            <a:pPr>
+              <a:buFontTx/>
+              <a:buChar char="-"/>
+            </a:pPr>
+            <a:r>
+              <a:rPr lang="en-US" dirty="0" smtClean="0"/>
+              <a:t>Frank</a:t>
             </a:r>
             <a:endParaRPr lang="en-US" dirty="0"/>
           </a:p>
@@ -15077,8 +15182,27 @@
             <a:fld id="{05A93482-8E69-40F7-BCAD-5662A6CADB27}" type="datetime4">
               <a:rPr lang="en-US" smtClean="0"/>
               <a:pPr/>
-              <a:t>August 18, 2011</a:t>
+              <a:t>May 31, 2012</a:t>
             </a:fld>
+            <a:endParaRPr lang="en-US"/>
+          </a:p>
+        </p:txBody>
+      </p:sp>
+      <p:sp>
+        <p:nvSpPr>
+          <p:cNvPr id="5" name="Footer Placeholder 4"/>
+          <p:cNvSpPr>
+            <a:spLocks noGrp="1"/>
+          </p:cNvSpPr>
+          <p:nvPr>
+            <p:ph type="ftr" sz="quarter" idx="11"/>
+          </p:nvPr>
+        </p:nvSpPr>
+        <p:spPr/>
+        <p:txBody>
+          <a:bodyPr/>
+          <a:lstStyle/>
+          <a:p>
             <a:endParaRPr lang="en-US"/>
           </a:p>
         </p:txBody>
@@ -15107,395 +15231,10 @@
           </a:p>
         </p:txBody>
       </p:sp>
-      <p:sp>
-        <p:nvSpPr>
-          <p:cNvPr id="7" name="Content Placeholder 2"/>
-          <p:cNvSpPr txBox="1">
-            <a:spLocks/>
-          </p:cNvSpPr>
-          <p:nvPr/>
-        </p:nvSpPr>
-        <p:spPr>
-          <a:xfrm>
-            <a:off x="1195892" y="1447800"/>
-            <a:ext cx="6777317" cy="4419600"/>
-          </a:xfrm>
-          <a:prstGeom prst="rect">
-            <a:avLst/>
-          </a:prstGeom>
-        </p:spPr>
-        <p:txBody>
-          <a:bodyPr vert="horz" lIns="91440" tIns="45720" rIns="91440" bIns="45720" rtlCol="0">
-            <a:normAutofit fontScale="92500" lnSpcReduction="20000"/>
-          </a:bodyPr>
-          <a:lstStyle>
-            <a:lvl1pPr marL="342900" indent="-274320" algn="l" defTabSz="914400" rtl="0" eaLnBrk="1" latinLnBrk="0" hangingPunct="1">
-              <a:spcBef>
-                <a:spcPct val="20000"/>
-              </a:spcBef>
-              <a:buClr>
-                <a:schemeClr val="accent1"/>
-              </a:buClr>
-              <a:buSzPct val="76000"/>
-              <a:buFont typeface="Wingdings 2" pitchFamily="18" charset="2"/>
-              <a:buChar char=""/>
-              <a:defRPr sz="2400" kern="1200">
-                <a:solidFill>
-                  <a:schemeClr val="tx2"/>
-                </a:solidFill>
-                <a:latin typeface="+mn-lt"/>
-                <a:ea typeface="+mn-ea"/>
-                <a:cs typeface="+mn-cs"/>
-              </a:defRPr>
-            </a:lvl1pPr>
-            <a:lvl2pPr marL="640080" indent="-274320" algn="l" defTabSz="914400" rtl="0" eaLnBrk="1" latinLnBrk="0" hangingPunct="1">
-              <a:spcBef>
-                <a:spcPct val="20000"/>
-              </a:spcBef>
-              <a:buClr>
-                <a:schemeClr val="accent1"/>
-              </a:buClr>
-              <a:buSzPct val="76000"/>
-              <a:buFont typeface="Wingdings 2" pitchFamily="18" charset="2"/>
-              <a:buChar char=""/>
-              <a:defRPr sz="2200" kern="1200">
-                <a:solidFill>
-                  <a:schemeClr val="tx2"/>
-                </a:solidFill>
-                <a:latin typeface="+mn-lt"/>
-                <a:ea typeface="+mn-ea"/>
-                <a:cs typeface="+mn-cs"/>
-              </a:defRPr>
-            </a:lvl2pPr>
-            <a:lvl3pPr marL="914400" indent="-228600" algn="l" defTabSz="914400" rtl="0" eaLnBrk="1" latinLnBrk="0" hangingPunct="1">
-              <a:spcBef>
-                <a:spcPct val="20000"/>
-              </a:spcBef>
-              <a:buClr>
-                <a:schemeClr val="accent1"/>
-              </a:buClr>
-              <a:buSzPct val="76000"/>
-              <a:buFont typeface="Wingdings 2" pitchFamily="18" charset="2"/>
-              <a:buChar char=""/>
-              <a:defRPr sz="2000" kern="1200">
-                <a:solidFill>
-                  <a:schemeClr val="tx2"/>
-                </a:solidFill>
-                <a:latin typeface="+mn-lt"/>
-                <a:ea typeface="+mn-ea"/>
-                <a:cs typeface="+mn-cs"/>
-              </a:defRPr>
-            </a:lvl3pPr>
-            <a:lvl4pPr marL="1124712" indent="-228600" algn="l" defTabSz="914400" rtl="0" eaLnBrk="1" latinLnBrk="0" hangingPunct="1">
-              <a:spcBef>
-                <a:spcPct val="20000"/>
-              </a:spcBef>
-              <a:buClr>
-                <a:schemeClr val="accent1"/>
-              </a:buClr>
-              <a:buSzPct val="76000"/>
-              <a:buFont typeface="Wingdings 2" pitchFamily="18" charset="2"/>
-              <a:buChar char=""/>
-              <a:defRPr sz="1800" kern="1200">
-                <a:solidFill>
-                  <a:schemeClr val="tx2"/>
-                </a:solidFill>
-                <a:latin typeface="+mn-lt"/>
-                <a:ea typeface="+mn-ea"/>
-                <a:cs typeface="+mn-cs"/>
-              </a:defRPr>
-            </a:lvl4pPr>
-            <a:lvl5pPr marL="1325880" indent="-228600" algn="l" defTabSz="914400" rtl="0" eaLnBrk="1" latinLnBrk="0" hangingPunct="1">
-              <a:spcBef>
-                <a:spcPct val="20000"/>
-              </a:spcBef>
-              <a:buClr>
-                <a:schemeClr val="accent1"/>
-              </a:buClr>
-              <a:buSzPct val="76000"/>
-              <a:buFont typeface="Wingdings 2" pitchFamily="18" charset="2"/>
-              <a:buChar char=""/>
-              <a:defRPr sz="1600" kern="1200" baseline="0">
-                <a:solidFill>
-                  <a:schemeClr val="tx2"/>
-                </a:solidFill>
-                <a:latin typeface="+mn-lt"/>
-                <a:ea typeface="+mn-ea"/>
-                <a:cs typeface="+mn-cs"/>
-              </a:defRPr>
-            </a:lvl5pPr>
-            <a:lvl6pPr marL="1517904" indent="-228600" algn="l" defTabSz="914400" rtl="0" eaLnBrk="1" latinLnBrk="0" hangingPunct="1">
-              <a:spcBef>
-                <a:spcPct val="20000"/>
-              </a:spcBef>
-              <a:buClr>
-                <a:schemeClr val="accent1"/>
-              </a:buClr>
-              <a:buSzPct val="76000"/>
-              <a:buFont typeface="Wingdings 2" pitchFamily="18" charset="2"/>
-              <a:buChar char=""/>
-              <a:defRPr sz="1400" kern="1200">
-                <a:solidFill>
-                  <a:schemeClr val="tx2"/>
-                </a:solidFill>
-                <a:latin typeface="+mn-lt"/>
-                <a:ea typeface="+mn-ea"/>
-                <a:cs typeface="+mn-cs"/>
-              </a:defRPr>
-            </a:lvl6pPr>
-            <a:lvl7pPr marL="1719072" indent="-228600" algn="l" defTabSz="914400" rtl="0" eaLnBrk="1" latinLnBrk="0" hangingPunct="1">
-              <a:spcBef>
-                <a:spcPct val="20000"/>
-              </a:spcBef>
-              <a:buClr>
-                <a:schemeClr val="accent1"/>
-              </a:buClr>
-              <a:buSzPct val="76000"/>
-              <a:buFont typeface="Wingdings 2" pitchFamily="18" charset="2"/>
-              <a:buChar char=""/>
-              <a:defRPr sz="1400" kern="1200">
-                <a:solidFill>
-                  <a:schemeClr val="tx2"/>
-                </a:solidFill>
-                <a:latin typeface="+mn-lt"/>
-                <a:ea typeface="+mn-ea"/>
-                <a:cs typeface="+mn-cs"/>
-              </a:defRPr>
-            </a:lvl7pPr>
-            <a:lvl8pPr marL="1920240" indent="-228600" algn="l" defTabSz="914400" rtl="0" eaLnBrk="1" latinLnBrk="0" hangingPunct="1">
-              <a:spcBef>
-                <a:spcPct val="20000"/>
-              </a:spcBef>
-              <a:buClr>
-                <a:schemeClr val="accent1"/>
-              </a:buClr>
-              <a:buSzPct val="76000"/>
-              <a:buFont typeface="Wingdings 2" pitchFamily="18" charset="2"/>
-              <a:buChar char=""/>
-              <a:defRPr sz="1400" kern="1200">
-                <a:solidFill>
-                  <a:schemeClr val="tx2"/>
-                </a:solidFill>
-                <a:latin typeface="+mn-lt"/>
-                <a:ea typeface="+mn-ea"/>
-                <a:cs typeface="+mn-cs"/>
-              </a:defRPr>
-            </a:lvl8pPr>
-            <a:lvl9pPr marL="2121408" indent="-228600" algn="l" defTabSz="914400" rtl="0" eaLnBrk="1" latinLnBrk="0" hangingPunct="1">
-              <a:spcBef>
-                <a:spcPct val="20000"/>
-              </a:spcBef>
-              <a:buClr>
-                <a:schemeClr val="accent1"/>
-              </a:buClr>
-              <a:buSzPct val="76000"/>
-              <a:buFont typeface="Wingdings 2" pitchFamily="18" charset="2"/>
-              <a:buChar char=""/>
-              <a:defRPr sz="1400" kern="1200">
-                <a:solidFill>
-                  <a:schemeClr val="tx2"/>
-                </a:solidFill>
-                <a:latin typeface="+mn-lt"/>
-                <a:ea typeface="+mn-ea"/>
-                <a:cs typeface="+mn-cs"/>
-              </a:defRPr>
-            </a:lvl9pPr>
-          </a:lstStyle>
-          <a:p>
-            <a:endParaRPr lang="en-US" dirty="0" smtClean="0"/>
-          </a:p>
-          <a:p>
-            <a:r>
-              <a:rPr lang="en-US" dirty="0" smtClean="0"/>
-              <a:t>Lots of F# </a:t>
-            </a:r>
-            <a:r>
-              <a:rPr lang="en-US" dirty="0" smtClean="0"/>
-              <a:t>Features</a:t>
-            </a:r>
-          </a:p>
-          <a:p>
-            <a:pPr marL="68580" indent="0">
-              <a:buNone/>
-            </a:pPr>
-            <a:endParaRPr lang="en-US" dirty="0" smtClean="0"/>
-          </a:p>
-          <a:p>
-            <a:pPr marL="68580" indent="0">
-              <a:buNone/>
-            </a:pPr>
-            <a:endParaRPr lang="en-US" dirty="0" smtClean="0"/>
-          </a:p>
-          <a:p>
-            <a:pPr marL="68580" indent="0">
-              <a:buNone/>
-            </a:pPr>
-            <a:endParaRPr lang="en-US" dirty="0" smtClean="0">
-              <a:hlinkClick r:id="rId2"/>
-            </a:endParaRPr>
-          </a:p>
-          <a:p>
-            <a:pPr marL="68580" indent="0">
-              <a:buNone/>
-            </a:pPr>
-            <a:endParaRPr lang="en-US" dirty="0">
-              <a:hlinkClick r:id="rId2"/>
-            </a:endParaRPr>
-          </a:p>
-          <a:p>
-            <a:pPr marL="68580" indent="0">
-              <a:buNone/>
-            </a:pPr>
-            <a:endParaRPr lang="en-US" dirty="0" smtClean="0">
-              <a:hlinkClick r:id="rId2"/>
-            </a:endParaRPr>
-          </a:p>
-          <a:p>
-            <a:pPr marL="68580" indent="0">
-              <a:buNone/>
-            </a:pPr>
-            <a:r>
-              <a:rPr lang="en-US" sz="1700" dirty="0" smtClean="0">
-                <a:hlinkClick r:id="rId2"/>
-              </a:rPr>
-              <a:t>http</a:t>
-            </a:r>
-            <a:r>
-              <a:rPr lang="en-US" sz="1700" dirty="0">
-                <a:hlinkClick r:id="rId2"/>
-              </a:rPr>
-              <a:t>://www.cl.cam.ac.uk/~</a:t>
-            </a:r>
-            <a:r>
-              <a:rPr lang="en-US" sz="1700" dirty="0" smtClean="0">
-                <a:hlinkClick r:id="rId2"/>
-              </a:rPr>
-              <a:t>tp322/papers/async.pdf</a:t>
-            </a:r>
-            <a:endParaRPr lang="en-US" sz="1700" dirty="0"/>
-          </a:p>
-          <a:p>
-            <a:endParaRPr lang="en-US" dirty="0" smtClean="0"/>
-          </a:p>
-          <a:p>
-            <a:r>
-              <a:rPr lang="en-US" dirty="0" smtClean="0"/>
-              <a:t>Other </a:t>
-            </a:r>
-            <a:r>
-              <a:rPr lang="en-US" dirty="0" smtClean="0"/>
-              <a:t>F# Web Frameworks</a:t>
-            </a:r>
-          </a:p>
-          <a:p>
-            <a:pPr lvl="1"/>
-            <a:r>
-              <a:rPr lang="en-US" dirty="0" smtClean="0"/>
-              <a:t>Bistro</a:t>
-            </a:r>
-          </a:p>
-          <a:p>
-            <a:pPr lvl="1"/>
-            <a:r>
-              <a:rPr lang="en-US" dirty="0" smtClean="0"/>
-              <a:t>Suave</a:t>
-            </a:r>
-          </a:p>
-          <a:p>
-            <a:pPr lvl="1"/>
-            <a:r>
-              <a:rPr lang="en-US" dirty="0" smtClean="0"/>
-              <a:t>Frank and </a:t>
-            </a:r>
-            <a:r>
-              <a:rPr lang="en-US" dirty="0" err="1" smtClean="0"/>
-              <a:t>Frack</a:t>
-            </a:r>
-            <a:endParaRPr lang="en-US" dirty="0" smtClean="0"/>
-          </a:p>
-          <a:p>
-            <a:pPr marL="365760" lvl="1" indent="0">
-              <a:buNone/>
-            </a:pPr>
-            <a:endParaRPr lang="en-US" dirty="0" smtClean="0"/>
-          </a:p>
-          <a:p>
-            <a:pPr marL="68580" indent="0">
-              <a:buFont typeface="Wingdings 2" pitchFamily="18" charset="2"/>
-              <a:buNone/>
-            </a:pPr>
-            <a:endParaRPr lang="en-US" dirty="0" smtClean="0"/>
-          </a:p>
-        </p:txBody>
-      </p:sp>
-      <p:pic>
-        <p:nvPicPr>
-          <p:cNvPr id="1026" name="Picture 2"/>
-          <p:cNvPicPr>
-            <a:picLocks noChangeAspect="1" noChangeArrowheads="1"/>
-          </p:cNvPicPr>
-          <p:nvPr/>
-        </p:nvPicPr>
-        <p:blipFill>
-          <a:blip r:embed="rId3">
-            <a:extLst>
-              <a:ext uri="{28A0092B-C50C-407E-A947-70E740481C1C}">
-                <a14:useLocalDpi xmlns:a14="http://schemas.microsoft.com/office/drawing/2010/main" val="0"/>
-              </a:ext>
-            </a:extLst>
-          </a:blip>
-          <a:srcRect/>
-          <a:stretch>
-            <a:fillRect/>
-          </a:stretch>
-        </p:blipFill>
-        <p:spPr bwMode="auto">
-          <a:xfrm>
-            <a:off x="1371599" y="2590800"/>
-            <a:ext cx="6058091" cy="1236345"/>
-          </a:xfrm>
-          <a:prstGeom prst="rect">
-            <a:avLst/>
-          </a:prstGeom>
-          <a:noFill/>
-          <a:ln>
-            <a:noFill/>
-          </a:ln>
-          <a:effectLst/>
-          <a:extLst>
-            <a:ext uri="{909E8E84-426E-40DD-AFC4-6F175D3DCCD1}">
-              <a14:hiddenFill xmlns:a14="http://schemas.microsoft.com/office/drawing/2010/main">
-                <a:solidFill>
-                  <a:schemeClr val="accent1"/>
-                </a:solidFill>
-              </a14:hiddenFill>
-            </a:ext>
-            <a:ext uri="{91240B29-F687-4F45-9708-019B960494DF}">
-              <a14:hiddenLine xmlns:a14="http://schemas.microsoft.com/office/drawing/2010/main" w="9525">
-                <a:solidFill>
-                  <a:schemeClr val="tx1"/>
-                </a:solidFill>
-                <a:miter lim="800000"/>
-                <a:headEnd/>
-                <a:tailEnd/>
-              </a14:hiddenLine>
-            </a:ext>
-            <a:ext uri="{AF507438-7753-43E0-B8FC-AC1667EBCBE1}">
-              <a14:hiddenEffects xmlns:a14="http://schemas.microsoft.com/office/drawing/2010/main">
-                <a:effectLst>
-                  <a:outerShdw dist="35921" dir="2700000" algn="ctr" rotWithShape="0">
-                    <a:schemeClr val="bg2"/>
-                  </a:outerShdw>
-                </a:effectLst>
-              </a14:hiddenEffects>
-            </a:ext>
-          </a:extLst>
-        </p:spPr>
-      </p:pic>
     </p:spTree>
     <p:extLst>
       <p:ext uri="{BB962C8B-B14F-4D97-AF65-F5344CB8AC3E}">
-        <p14:creationId xmlns:p14="http://schemas.microsoft.com/office/powerpoint/2010/main" val="4105916061"/>
+        <p14:creationId xmlns:p14="http://schemas.microsoft.com/office/powerpoint/2010/main" val="2275200892"/>
       </p:ext>
     </p:extLst>
   </p:cSld>
@@ -15547,16 +15286,95 @@
           <a:lstStyle/>
           <a:p>
             <a:r>
-              <a:rPr lang="en-US" dirty="0" smtClean="0">
+              <a:rPr lang="en-US" dirty="0" err="1" smtClean="0">
                 <a:solidFill>
                   <a:schemeClr val="accent5">
                     <a:lumMod val="50000"/>
                   </a:schemeClr>
                 </a:solidFill>
               </a:rPr>
-              <a:t>More Information</a:t>
+              <a:t>WebSharper</a:t>
+            </a:r>
+            <a:r>
+              <a:rPr lang="en-US" dirty="0" smtClean="0">
+                <a:solidFill>
+                  <a:schemeClr val="accent5">
+                    <a:lumMod val="50000"/>
+                  </a:schemeClr>
+                </a:solidFill>
+              </a:rPr>
+              <a:t> Example</a:t>
             </a:r>
             <a:endParaRPr lang="en-US" dirty="0"/>
+          </a:p>
+        </p:txBody>
+      </p:sp>
+      <p:sp>
+        <p:nvSpPr>
+          <p:cNvPr id="3" name="Content Placeholder 2"/>
+          <p:cNvSpPr>
+            <a:spLocks noGrp="1"/>
+          </p:cNvSpPr>
+          <p:nvPr>
+            <p:ph idx="1"/>
+          </p:nvPr>
+        </p:nvSpPr>
+        <p:spPr/>
+        <p:txBody>
+          <a:bodyPr>
+            <a:normAutofit/>
+          </a:bodyPr>
+          <a:lstStyle/>
+          <a:p>
+            <a:pPr marL="68580" indent="0">
+              <a:buNone/>
+            </a:pPr>
+            <a:r>
+              <a:rPr lang="en-US" dirty="0">
+                <a:hlinkClick r:id="rId2"/>
+              </a:rPr>
+              <a:t>http://</a:t>
+            </a:r>
+            <a:r>
+              <a:rPr lang="en-US" dirty="0" smtClean="0">
+                <a:hlinkClick r:id="rId2"/>
+              </a:rPr>
+              <a:t>visualstudiogallery.msdn.microsoft.com/en-us/288b94ea-0ea7-4dde-8906-f72eb22fbe1b</a:t>
+            </a:r>
+            <a:endParaRPr lang="en-US" dirty="0" smtClean="0"/>
+          </a:p>
+          <a:p>
+            <a:pPr marL="68580" indent="0">
+              <a:buNone/>
+            </a:pPr>
+            <a:endParaRPr lang="en-US" dirty="0"/>
+          </a:p>
+          <a:p>
+            <a:pPr marL="68580" indent="0">
+              <a:buNone/>
+            </a:pPr>
+            <a:r>
+              <a:rPr lang="en-US" dirty="0" smtClean="0"/>
+              <a:t>Check out </a:t>
+            </a:r>
+            <a:r>
+              <a:rPr lang="en-US" dirty="0" smtClean="0">
+                <a:hlinkClick r:id="rId3"/>
+              </a:rPr>
+              <a:t>http://fpish.net</a:t>
+            </a:r>
+            <a:r>
+              <a:rPr lang="en-US" dirty="0" smtClean="0"/>
+              <a:t> for an example of a live site built with </a:t>
+            </a:r>
+            <a:r>
+              <a:rPr lang="en-US" dirty="0" err="1" smtClean="0"/>
+              <a:t>WebSharper</a:t>
+            </a:r>
+            <a:r>
+              <a:rPr lang="en-US" dirty="0" smtClean="0"/>
+              <a:t>.</a:t>
+            </a:r>
           </a:p>
         </p:txBody>
       </p:sp>
@@ -15578,7 +15396,7 @@
             <a:fld id="{05A93482-8E69-40F7-BCAD-5662A6CADB27}" type="datetime4">
               <a:rPr lang="en-US" smtClean="0"/>
               <a:pPr/>
-              <a:t>August 13, 2011</a:t>
+              <a:t>May 31, 2012</a:t>
             </a:fld>
             <a:endParaRPr lang="en-US"/>
           </a:p>
@@ -15627,282 +15445,10 @@
           </a:p>
         </p:txBody>
       </p:sp>
-      <p:sp>
-        <p:nvSpPr>
-          <p:cNvPr id="8" name="Content Placeholder 2"/>
-          <p:cNvSpPr txBox="1">
-            <a:spLocks/>
-          </p:cNvSpPr>
-          <p:nvPr/>
-        </p:nvSpPr>
-        <p:spPr>
-          <a:xfrm>
-            <a:off x="1195892" y="2286000"/>
-            <a:ext cx="6777317" cy="2708429"/>
-          </a:xfrm>
-          <a:prstGeom prst="rect">
-            <a:avLst/>
-          </a:prstGeom>
-        </p:spPr>
-        <p:txBody>
-          <a:bodyPr vert="horz" lIns="91440" tIns="45720" rIns="91440" bIns="45720" rtlCol="0">
-            <a:normAutofit fontScale="92500" lnSpcReduction="20000"/>
-          </a:bodyPr>
-          <a:lstStyle>
-            <a:lvl1pPr marL="342900" indent="-274320" algn="l" defTabSz="914400" rtl="0" eaLnBrk="1" latinLnBrk="0" hangingPunct="1">
-              <a:spcBef>
-                <a:spcPct val="20000"/>
-              </a:spcBef>
-              <a:buClr>
-                <a:schemeClr val="accent1"/>
-              </a:buClr>
-              <a:buSzPct val="76000"/>
-              <a:buFont typeface="Wingdings 2" pitchFamily="18" charset="2"/>
-              <a:buChar char=""/>
-              <a:defRPr sz="2400" kern="1200">
-                <a:solidFill>
-                  <a:schemeClr val="tx2"/>
-                </a:solidFill>
-                <a:latin typeface="+mn-lt"/>
-                <a:ea typeface="+mn-ea"/>
-                <a:cs typeface="+mn-cs"/>
-              </a:defRPr>
-            </a:lvl1pPr>
-            <a:lvl2pPr marL="640080" indent="-274320" algn="l" defTabSz="914400" rtl="0" eaLnBrk="1" latinLnBrk="0" hangingPunct="1">
-              <a:spcBef>
-                <a:spcPct val="20000"/>
-              </a:spcBef>
-              <a:buClr>
-                <a:schemeClr val="accent1"/>
-              </a:buClr>
-              <a:buSzPct val="76000"/>
-              <a:buFont typeface="Wingdings 2" pitchFamily="18" charset="2"/>
-              <a:buChar char=""/>
-              <a:defRPr sz="2200" kern="1200">
-                <a:solidFill>
-                  <a:schemeClr val="tx2"/>
-                </a:solidFill>
-                <a:latin typeface="+mn-lt"/>
-                <a:ea typeface="+mn-ea"/>
-                <a:cs typeface="+mn-cs"/>
-              </a:defRPr>
-            </a:lvl2pPr>
-            <a:lvl3pPr marL="914400" indent="-228600" algn="l" defTabSz="914400" rtl="0" eaLnBrk="1" latinLnBrk="0" hangingPunct="1">
-              <a:spcBef>
-                <a:spcPct val="20000"/>
-              </a:spcBef>
-              <a:buClr>
-                <a:schemeClr val="accent1"/>
-              </a:buClr>
-              <a:buSzPct val="76000"/>
-              <a:buFont typeface="Wingdings 2" pitchFamily="18" charset="2"/>
-              <a:buChar char=""/>
-              <a:defRPr sz="2000" kern="1200">
-                <a:solidFill>
-                  <a:schemeClr val="tx2"/>
-                </a:solidFill>
-                <a:latin typeface="+mn-lt"/>
-                <a:ea typeface="+mn-ea"/>
-                <a:cs typeface="+mn-cs"/>
-              </a:defRPr>
-            </a:lvl3pPr>
-            <a:lvl4pPr marL="1124712" indent="-228600" algn="l" defTabSz="914400" rtl="0" eaLnBrk="1" latinLnBrk="0" hangingPunct="1">
-              <a:spcBef>
-                <a:spcPct val="20000"/>
-              </a:spcBef>
-              <a:buClr>
-                <a:schemeClr val="accent1"/>
-              </a:buClr>
-              <a:buSzPct val="76000"/>
-              <a:buFont typeface="Wingdings 2" pitchFamily="18" charset="2"/>
-              <a:buChar char=""/>
-              <a:defRPr sz="1800" kern="1200">
-                <a:solidFill>
-                  <a:schemeClr val="tx2"/>
-                </a:solidFill>
-                <a:latin typeface="+mn-lt"/>
-                <a:ea typeface="+mn-ea"/>
-                <a:cs typeface="+mn-cs"/>
-              </a:defRPr>
-            </a:lvl4pPr>
-            <a:lvl5pPr marL="1325880" indent="-228600" algn="l" defTabSz="914400" rtl="0" eaLnBrk="1" latinLnBrk="0" hangingPunct="1">
-              <a:spcBef>
-                <a:spcPct val="20000"/>
-              </a:spcBef>
-              <a:buClr>
-                <a:schemeClr val="accent1"/>
-              </a:buClr>
-              <a:buSzPct val="76000"/>
-              <a:buFont typeface="Wingdings 2" pitchFamily="18" charset="2"/>
-              <a:buChar char=""/>
-              <a:defRPr sz="1600" kern="1200" baseline="0">
-                <a:solidFill>
-                  <a:schemeClr val="tx2"/>
-                </a:solidFill>
-                <a:latin typeface="+mn-lt"/>
-                <a:ea typeface="+mn-ea"/>
-                <a:cs typeface="+mn-cs"/>
-              </a:defRPr>
-            </a:lvl5pPr>
-            <a:lvl6pPr marL="1517904" indent="-228600" algn="l" defTabSz="914400" rtl="0" eaLnBrk="1" latinLnBrk="0" hangingPunct="1">
-              <a:spcBef>
-                <a:spcPct val="20000"/>
-              </a:spcBef>
-              <a:buClr>
-                <a:schemeClr val="accent1"/>
-              </a:buClr>
-              <a:buSzPct val="76000"/>
-              <a:buFont typeface="Wingdings 2" pitchFamily="18" charset="2"/>
-              <a:buChar char=""/>
-              <a:defRPr sz="1400" kern="1200">
-                <a:solidFill>
-                  <a:schemeClr val="tx2"/>
-                </a:solidFill>
-                <a:latin typeface="+mn-lt"/>
-                <a:ea typeface="+mn-ea"/>
-                <a:cs typeface="+mn-cs"/>
-              </a:defRPr>
-            </a:lvl6pPr>
-            <a:lvl7pPr marL="1719072" indent="-228600" algn="l" defTabSz="914400" rtl="0" eaLnBrk="1" latinLnBrk="0" hangingPunct="1">
-              <a:spcBef>
-                <a:spcPct val="20000"/>
-              </a:spcBef>
-              <a:buClr>
-                <a:schemeClr val="accent1"/>
-              </a:buClr>
-              <a:buSzPct val="76000"/>
-              <a:buFont typeface="Wingdings 2" pitchFamily="18" charset="2"/>
-              <a:buChar char=""/>
-              <a:defRPr sz="1400" kern="1200">
-                <a:solidFill>
-                  <a:schemeClr val="tx2"/>
-                </a:solidFill>
-                <a:latin typeface="+mn-lt"/>
-                <a:ea typeface="+mn-ea"/>
-                <a:cs typeface="+mn-cs"/>
-              </a:defRPr>
-            </a:lvl7pPr>
-            <a:lvl8pPr marL="1920240" indent="-228600" algn="l" defTabSz="914400" rtl="0" eaLnBrk="1" latinLnBrk="0" hangingPunct="1">
-              <a:spcBef>
-                <a:spcPct val="20000"/>
-              </a:spcBef>
-              <a:buClr>
-                <a:schemeClr val="accent1"/>
-              </a:buClr>
-              <a:buSzPct val="76000"/>
-              <a:buFont typeface="Wingdings 2" pitchFamily="18" charset="2"/>
-              <a:buChar char=""/>
-              <a:defRPr sz="1400" kern="1200">
-                <a:solidFill>
-                  <a:schemeClr val="tx2"/>
-                </a:solidFill>
-                <a:latin typeface="+mn-lt"/>
-                <a:ea typeface="+mn-ea"/>
-                <a:cs typeface="+mn-cs"/>
-              </a:defRPr>
-            </a:lvl8pPr>
-            <a:lvl9pPr marL="2121408" indent="-228600" algn="l" defTabSz="914400" rtl="0" eaLnBrk="1" latinLnBrk="0" hangingPunct="1">
-              <a:spcBef>
-                <a:spcPct val="20000"/>
-              </a:spcBef>
-              <a:buClr>
-                <a:schemeClr val="accent1"/>
-              </a:buClr>
-              <a:buSzPct val="76000"/>
-              <a:buFont typeface="Wingdings 2" pitchFamily="18" charset="2"/>
-              <a:buChar char=""/>
-              <a:defRPr sz="1400" kern="1200">
-                <a:solidFill>
-                  <a:schemeClr val="tx2"/>
-                </a:solidFill>
-                <a:latin typeface="+mn-lt"/>
-                <a:ea typeface="+mn-ea"/>
-                <a:cs typeface="+mn-cs"/>
-              </a:defRPr>
-            </a:lvl9pPr>
-          </a:lstStyle>
-          <a:p>
-            <a:endParaRPr lang="en-US" dirty="0" smtClean="0"/>
-          </a:p>
-          <a:p>
-            <a:r>
-              <a:rPr lang="en-US" dirty="0" smtClean="0"/>
-              <a:t>Books </a:t>
-            </a:r>
-            <a:r>
-              <a:rPr lang="en-US" dirty="0"/>
-              <a:t>- </a:t>
-            </a:r>
-            <a:r>
-              <a:rPr lang="en-US" dirty="0">
-                <a:hlinkClick r:id="rId2"/>
-              </a:rPr>
-              <a:t>http://</a:t>
-            </a:r>
-            <a:r>
-              <a:rPr lang="en-US" dirty="0" smtClean="0">
-                <a:hlinkClick r:id="rId2"/>
-              </a:rPr>
-              <a:t>msdn.microsoft.com/en-us/fsharp/gg262865.aspx</a:t>
-            </a:r>
-            <a:endParaRPr lang="en-US" dirty="0" smtClean="0"/>
-          </a:p>
-          <a:p>
-            <a:r>
-              <a:rPr lang="en-US" dirty="0"/>
-              <a:t>F# MSDN - </a:t>
-            </a:r>
-            <a:r>
-              <a:rPr lang="en-US" dirty="0">
-                <a:hlinkClick r:id="rId2"/>
-              </a:rPr>
-              <a:t>http://</a:t>
-            </a:r>
-            <a:r>
-              <a:rPr lang="en-US" dirty="0" smtClean="0">
-                <a:hlinkClick r:id="rId2"/>
-              </a:rPr>
-              <a:t>msdn.microsoft.com/en-us/fsharp/gg262865.aspx</a:t>
-            </a:r>
-            <a:endParaRPr lang="en-US" dirty="0" smtClean="0"/>
-          </a:p>
-          <a:p>
-            <a:r>
-              <a:rPr lang="en-US" dirty="0" smtClean="0"/>
-              <a:t>Blogs</a:t>
-            </a:r>
-          </a:p>
-          <a:p>
-            <a:r>
-              <a:rPr lang="en-US" dirty="0" smtClean="0"/>
-              <a:t>Twitter</a:t>
-            </a:r>
-          </a:p>
-          <a:p>
-            <a:r>
-              <a:rPr lang="en-US" dirty="0" smtClean="0"/>
-              <a:t>Ask – F# has the greatest community around</a:t>
-            </a:r>
-          </a:p>
-          <a:p>
-            <a:pPr marL="365760" lvl="1" indent="0">
-              <a:buNone/>
-            </a:pPr>
-            <a:endParaRPr lang="en-US" dirty="0" smtClean="0"/>
-          </a:p>
-          <a:p>
-            <a:pPr marL="68580" indent="0">
-              <a:buFont typeface="Wingdings 2" pitchFamily="18" charset="2"/>
-              <a:buNone/>
-            </a:pPr>
-            <a:endParaRPr lang="en-US" dirty="0" smtClean="0"/>
-          </a:p>
-        </p:txBody>
-      </p:sp>
     </p:spTree>
     <p:extLst>
       <p:ext uri="{BB962C8B-B14F-4D97-AF65-F5344CB8AC3E}">
-        <p14:creationId xmlns:p14="http://schemas.microsoft.com/office/powerpoint/2010/main" val="1179791007"/>
+        <p14:creationId xmlns:p14="http://schemas.microsoft.com/office/powerpoint/2010/main" val="1626836029"/>
       </p:ext>
     </p:extLst>
   </p:cSld>
@@ -15946,10 +15492,15 @@
             <p:ph type="title"/>
           </p:nvPr>
         </p:nvSpPr>
-        <p:spPr/>
+        <p:spPr>
+          <a:xfrm>
+            <a:off x="1072178" y="762000"/>
+            <a:ext cx="7024744" cy="780685"/>
+          </a:xfrm>
+        </p:spPr>
         <p:txBody>
           <a:bodyPr>
-            <a:normAutofit fontScale="90000"/>
+            <a:normAutofit/>
           </a:bodyPr>
           <a:lstStyle/>
           <a:p>
@@ -15961,54 +15512,9 @@
                   </a:schemeClr>
                 </a:solidFill>
               </a:rPr>
-              <a:t>Daniel </a:t>
-            </a:r>
-            <a:r>
-              <a:rPr lang="en-US" dirty="0" err="1" smtClean="0">
-                <a:solidFill>
-                  <a:schemeClr val="accent5">
-                    <a:lumMod val="50000"/>
-                  </a:schemeClr>
-                </a:solidFill>
-              </a:rPr>
-              <a:t>Mohl</a:t>
-            </a:r>
-            <a:r>
-              <a:rPr lang="en-US" dirty="0" smtClean="0">
-                <a:solidFill>
-                  <a:schemeClr val="accent5">
-                    <a:lumMod val="50000"/>
-                  </a:schemeClr>
-                </a:solidFill>
-              </a:rPr>
-              <a:t/>
-            </a:r>
-            <a:br>
-              <a:rPr lang="en-US" dirty="0" smtClean="0">
-                <a:solidFill>
-                  <a:schemeClr val="accent5">
-                    <a:lumMod val="50000"/>
-                  </a:schemeClr>
-                </a:solidFill>
-              </a:rPr>
-            </a:br>
-            <a:r>
-              <a:rPr lang="en-US" dirty="0" smtClean="0">
-                <a:solidFill>
-                  <a:schemeClr val="accent5">
-                    <a:lumMod val="50000"/>
-                  </a:schemeClr>
-                </a:solidFill>
-              </a:rPr>
-              <a:t>C# MVP and F# Insider</a:t>
-            </a:r>
-            <a:endParaRPr lang="en-US" dirty="0">
-              <a:solidFill>
-                <a:schemeClr val="accent5">
-                  <a:lumMod val="50000"/>
-                </a:schemeClr>
-              </a:solidFill>
-            </a:endParaRPr>
+              <a:t>What Wasn’t Covered?</a:t>
+            </a:r>
+            <a:endParaRPr lang="en-US" dirty="0"/>
           </a:p>
         </p:txBody>
       </p:sp>
@@ -16030,7 +15536,468 @@
             <a:fld id="{05A93482-8E69-40F7-BCAD-5662A6CADB27}" type="datetime4">
               <a:rPr lang="en-US" smtClean="0"/>
               <a:pPr/>
-              <a:t>August 13, 2011</a:t>
+              <a:t>May 31, 2012</a:t>
+            </a:fld>
+            <a:endParaRPr lang="en-US"/>
+          </a:p>
+        </p:txBody>
+      </p:sp>
+      <p:sp>
+        <p:nvSpPr>
+          <p:cNvPr id="6" name="Slide Number Placeholder 5"/>
+          <p:cNvSpPr>
+            <a:spLocks noGrp="1"/>
+          </p:cNvSpPr>
+          <p:nvPr>
+            <p:ph type="sldNum" sz="quarter" idx="12"/>
+          </p:nvPr>
+        </p:nvSpPr>
+        <p:spPr/>
+        <p:txBody>
+          <a:bodyPr/>
+          <a:lstStyle/>
+          <a:p>
+            <a:fld id="{8B37D5FE-740C-46F5-801A-FA5477D9711F}" type="slidenum">
+              <a:rPr lang="en-US" smtClean="0"/>
+              <a:pPr/>
+              <a:t>17</a:t>
+            </a:fld>
+            <a:endParaRPr lang="en-US"/>
+          </a:p>
+        </p:txBody>
+      </p:sp>
+      <p:sp>
+        <p:nvSpPr>
+          <p:cNvPr id="7" name="Content Placeholder 2"/>
+          <p:cNvSpPr txBox="1">
+            <a:spLocks/>
+          </p:cNvSpPr>
+          <p:nvPr/>
+        </p:nvSpPr>
+        <p:spPr>
+          <a:xfrm>
+            <a:off x="1195892" y="1447800"/>
+            <a:ext cx="6777317" cy="4419600"/>
+          </a:xfrm>
+          <a:prstGeom prst="rect">
+            <a:avLst/>
+          </a:prstGeom>
+        </p:spPr>
+        <p:txBody>
+          <a:bodyPr vert="horz" lIns="91440" tIns="45720" rIns="91440" bIns="45720" rtlCol="0">
+            <a:normAutofit/>
+          </a:bodyPr>
+          <a:lstStyle>
+            <a:lvl1pPr marL="342900" indent="-274320" algn="l" defTabSz="914400" rtl="0" eaLnBrk="1" latinLnBrk="0" hangingPunct="1">
+              <a:spcBef>
+                <a:spcPct val="20000"/>
+              </a:spcBef>
+              <a:buClr>
+                <a:schemeClr val="accent1"/>
+              </a:buClr>
+              <a:buSzPct val="76000"/>
+              <a:buFont typeface="Wingdings 2" pitchFamily="18" charset="2"/>
+              <a:buChar char=""/>
+              <a:defRPr sz="2400" kern="1200">
+                <a:solidFill>
+                  <a:schemeClr val="tx2"/>
+                </a:solidFill>
+                <a:latin typeface="+mn-lt"/>
+                <a:ea typeface="+mn-ea"/>
+                <a:cs typeface="+mn-cs"/>
+              </a:defRPr>
+            </a:lvl1pPr>
+            <a:lvl2pPr marL="640080" indent="-274320" algn="l" defTabSz="914400" rtl="0" eaLnBrk="1" latinLnBrk="0" hangingPunct="1">
+              <a:spcBef>
+                <a:spcPct val="20000"/>
+              </a:spcBef>
+              <a:buClr>
+                <a:schemeClr val="accent1"/>
+              </a:buClr>
+              <a:buSzPct val="76000"/>
+              <a:buFont typeface="Wingdings 2" pitchFamily="18" charset="2"/>
+              <a:buChar char=""/>
+              <a:defRPr sz="2200" kern="1200">
+                <a:solidFill>
+                  <a:schemeClr val="tx2"/>
+                </a:solidFill>
+                <a:latin typeface="+mn-lt"/>
+                <a:ea typeface="+mn-ea"/>
+                <a:cs typeface="+mn-cs"/>
+              </a:defRPr>
+            </a:lvl2pPr>
+            <a:lvl3pPr marL="914400" indent="-228600" algn="l" defTabSz="914400" rtl="0" eaLnBrk="1" latinLnBrk="0" hangingPunct="1">
+              <a:spcBef>
+                <a:spcPct val="20000"/>
+              </a:spcBef>
+              <a:buClr>
+                <a:schemeClr val="accent1"/>
+              </a:buClr>
+              <a:buSzPct val="76000"/>
+              <a:buFont typeface="Wingdings 2" pitchFamily="18" charset="2"/>
+              <a:buChar char=""/>
+              <a:defRPr sz="2000" kern="1200">
+                <a:solidFill>
+                  <a:schemeClr val="tx2"/>
+                </a:solidFill>
+                <a:latin typeface="+mn-lt"/>
+                <a:ea typeface="+mn-ea"/>
+                <a:cs typeface="+mn-cs"/>
+              </a:defRPr>
+            </a:lvl3pPr>
+            <a:lvl4pPr marL="1124712" indent="-228600" algn="l" defTabSz="914400" rtl="0" eaLnBrk="1" latinLnBrk="0" hangingPunct="1">
+              <a:spcBef>
+                <a:spcPct val="20000"/>
+              </a:spcBef>
+              <a:buClr>
+                <a:schemeClr val="accent1"/>
+              </a:buClr>
+              <a:buSzPct val="76000"/>
+              <a:buFont typeface="Wingdings 2" pitchFamily="18" charset="2"/>
+              <a:buChar char=""/>
+              <a:defRPr sz="1800" kern="1200">
+                <a:solidFill>
+                  <a:schemeClr val="tx2"/>
+                </a:solidFill>
+                <a:latin typeface="+mn-lt"/>
+                <a:ea typeface="+mn-ea"/>
+                <a:cs typeface="+mn-cs"/>
+              </a:defRPr>
+            </a:lvl4pPr>
+            <a:lvl5pPr marL="1325880" indent="-228600" algn="l" defTabSz="914400" rtl="0" eaLnBrk="1" latinLnBrk="0" hangingPunct="1">
+              <a:spcBef>
+                <a:spcPct val="20000"/>
+              </a:spcBef>
+              <a:buClr>
+                <a:schemeClr val="accent1"/>
+              </a:buClr>
+              <a:buSzPct val="76000"/>
+              <a:buFont typeface="Wingdings 2" pitchFamily="18" charset="2"/>
+              <a:buChar char=""/>
+              <a:defRPr sz="1600" kern="1200" baseline="0">
+                <a:solidFill>
+                  <a:schemeClr val="tx2"/>
+                </a:solidFill>
+                <a:latin typeface="+mn-lt"/>
+                <a:ea typeface="+mn-ea"/>
+                <a:cs typeface="+mn-cs"/>
+              </a:defRPr>
+            </a:lvl5pPr>
+            <a:lvl6pPr marL="1517904" indent="-228600" algn="l" defTabSz="914400" rtl="0" eaLnBrk="1" latinLnBrk="0" hangingPunct="1">
+              <a:spcBef>
+                <a:spcPct val="20000"/>
+              </a:spcBef>
+              <a:buClr>
+                <a:schemeClr val="accent1"/>
+              </a:buClr>
+              <a:buSzPct val="76000"/>
+              <a:buFont typeface="Wingdings 2" pitchFamily="18" charset="2"/>
+              <a:buChar char=""/>
+              <a:defRPr sz="1400" kern="1200">
+                <a:solidFill>
+                  <a:schemeClr val="tx2"/>
+                </a:solidFill>
+                <a:latin typeface="+mn-lt"/>
+                <a:ea typeface="+mn-ea"/>
+                <a:cs typeface="+mn-cs"/>
+              </a:defRPr>
+            </a:lvl6pPr>
+            <a:lvl7pPr marL="1719072" indent="-228600" algn="l" defTabSz="914400" rtl="0" eaLnBrk="1" latinLnBrk="0" hangingPunct="1">
+              <a:spcBef>
+                <a:spcPct val="20000"/>
+              </a:spcBef>
+              <a:buClr>
+                <a:schemeClr val="accent1"/>
+              </a:buClr>
+              <a:buSzPct val="76000"/>
+              <a:buFont typeface="Wingdings 2" pitchFamily="18" charset="2"/>
+              <a:buChar char=""/>
+              <a:defRPr sz="1400" kern="1200">
+                <a:solidFill>
+                  <a:schemeClr val="tx2"/>
+                </a:solidFill>
+                <a:latin typeface="+mn-lt"/>
+                <a:ea typeface="+mn-ea"/>
+                <a:cs typeface="+mn-cs"/>
+              </a:defRPr>
+            </a:lvl7pPr>
+            <a:lvl8pPr marL="1920240" indent="-228600" algn="l" defTabSz="914400" rtl="0" eaLnBrk="1" latinLnBrk="0" hangingPunct="1">
+              <a:spcBef>
+                <a:spcPct val="20000"/>
+              </a:spcBef>
+              <a:buClr>
+                <a:schemeClr val="accent1"/>
+              </a:buClr>
+              <a:buSzPct val="76000"/>
+              <a:buFont typeface="Wingdings 2" pitchFamily="18" charset="2"/>
+              <a:buChar char=""/>
+              <a:defRPr sz="1400" kern="1200">
+                <a:solidFill>
+                  <a:schemeClr val="tx2"/>
+                </a:solidFill>
+                <a:latin typeface="+mn-lt"/>
+                <a:ea typeface="+mn-ea"/>
+                <a:cs typeface="+mn-cs"/>
+              </a:defRPr>
+            </a:lvl8pPr>
+            <a:lvl9pPr marL="2121408" indent="-228600" algn="l" defTabSz="914400" rtl="0" eaLnBrk="1" latinLnBrk="0" hangingPunct="1">
+              <a:spcBef>
+                <a:spcPct val="20000"/>
+              </a:spcBef>
+              <a:buClr>
+                <a:schemeClr val="accent1"/>
+              </a:buClr>
+              <a:buSzPct val="76000"/>
+              <a:buFont typeface="Wingdings 2" pitchFamily="18" charset="2"/>
+              <a:buChar char=""/>
+              <a:defRPr sz="1400" kern="1200">
+                <a:solidFill>
+                  <a:schemeClr val="tx2"/>
+                </a:solidFill>
+                <a:latin typeface="+mn-lt"/>
+                <a:ea typeface="+mn-ea"/>
+                <a:cs typeface="+mn-cs"/>
+              </a:defRPr>
+            </a:lvl9pPr>
+          </a:lstStyle>
+          <a:p>
+            <a:endParaRPr lang="en-US" dirty="0" smtClean="0"/>
+          </a:p>
+          <a:p>
+            <a:r>
+              <a:rPr lang="en-US" dirty="0" smtClean="0"/>
+              <a:t>Lots of F# Features</a:t>
+            </a:r>
+          </a:p>
+          <a:p>
+            <a:pPr marL="68580" indent="0">
+              <a:buNone/>
+            </a:pPr>
+            <a:endParaRPr lang="en-US" dirty="0" smtClean="0"/>
+          </a:p>
+          <a:p>
+            <a:pPr marL="68580" indent="0">
+              <a:buNone/>
+            </a:pPr>
+            <a:endParaRPr lang="en-US" dirty="0" smtClean="0"/>
+          </a:p>
+          <a:p>
+            <a:pPr marL="68580" indent="0">
+              <a:buNone/>
+            </a:pPr>
+            <a:endParaRPr lang="en-US" dirty="0" smtClean="0">
+              <a:hlinkClick r:id="rId2"/>
+            </a:endParaRPr>
+          </a:p>
+          <a:p>
+            <a:pPr marL="68580" indent="0">
+              <a:buNone/>
+            </a:pPr>
+            <a:endParaRPr lang="en-US" dirty="0">
+              <a:hlinkClick r:id="rId2"/>
+            </a:endParaRPr>
+          </a:p>
+          <a:p>
+            <a:pPr marL="68580" indent="0">
+              <a:buNone/>
+            </a:pPr>
+            <a:endParaRPr lang="en-US" dirty="0" smtClean="0">
+              <a:hlinkClick r:id="rId2"/>
+            </a:endParaRPr>
+          </a:p>
+          <a:p>
+            <a:pPr marL="68580" indent="0">
+              <a:buNone/>
+            </a:pPr>
+            <a:r>
+              <a:rPr lang="en-US" sz="1700" dirty="0" smtClean="0">
+                <a:hlinkClick r:id="rId2"/>
+              </a:rPr>
+              <a:t>http</a:t>
+            </a:r>
+            <a:r>
+              <a:rPr lang="en-US" sz="1700" dirty="0">
+                <a:hlinkClick r:id="rId2"/>
+              </a:rPr>
+              <a:t>://www.cl.cam.ac.uk/~</a:t>
+            </a:r>
+            <a:r>
+              <a:rPr lang="en-US" sz="1700" dirty="0" smtClean="0">
+                <a:hlinkClick r:id="rId2"/>
+              </a:rPr>
+              <a:t>tp322/papers/async.pdf</a:t>
+            </a:r>
+            <a:endParaRPr lang="en-US" sz="1700" dirty="0"/>
+          </a:p>
+          <a:p>
+            <a:endParaRPr lang="en-US" dirty="0" smtClean="0"/>
+          </a:p>
+          <a:p>
+            <a:pPr marL="365760" lvl="1" indent="0">
+              <a:buNone/>
+            </a:pPr>
+            <a:endParaRPr lang="en-US" dirty="0" smtClean="0"/>
+          </a:p>
+          <a:p>
+            <a:pPr marL="68580" indent="0">
+              <a:buFont typeface="Wingdings 2" pitchFamily="18" charset="2"/>
+              <a:buNone/>
+            </a:pPr>
+            <a:endParaRPr lang="en-US" dirty="0" smtClean="0"/>
+          </a:p>
+        </p:txBody>
+      </p:sp>
+      <p:pic>
+        <p:nvPicPr>
+          <p:cNvPr id="1026" name="Picture 2"/>
+          <p:cNvPicPr>
+            <a:picLocks noChangeAspect="1" noChangeArrowheads="1"/>
+          </p:cNvPicPr>
+          <p:nvPr/>
+        </p:nvPicPr>
+        <p:blipFill>
+          <a:blip r:embed="rId3">
+            <a:extLst>
+              <a:ext uri="{28A0092B-C50C-407E-A947-70E740481C1C}">
+                <a14:useLocalDpi xmlns:a14="http://schemas.microsoft.com/office/drawing/2010/main" val="0"/>
+              </a:ext>
+            </a:extLst>
+          </a:blip>
+          <a:srcRect/>
+          <a:stretch>
+            <a:fillRect/>
+          </a:stretch>
+        </p:blipFill>
+        <p:spPr bwMode="auto">
+          <a:xfrm>
+            <a:off x="1371599" y="2590800"/>
+            <a:ext cx="6058091" cy="1236345"/>
+          </a:xfrm>
+          <a:prstGeom prst="rect">
+            <a:avLst/>
+          </a:prstGeom>
+          <a:noFill/>
+          <a:ln>
+            <a:noFill/>
+          </a:ln>
+          <a:effectLst/>
+          <a:extLst>
+            <a:ext uri="{909E8E84-426E-40DD-AFC4-6F175D3DCCD1}">
+              <a14:hiddenFill xmlns:a14="http://schemas.microsoft.com/office/drawing/2010/main">
+                <a:solidFill>
+                  <a:schemeClr val="accent1"/>
+                </a:solidFill>
+              </a14:hiddenFill>
+            </a:ext>
+            <a:ext uri="{91240B29-F687-4F45-9708-019B960494DF}">
+              <a14:hiddenLine xmlns:a14="http://schemas.microsoft.com/office/drawing/2010/main" w="9525">
+                <a:solidFill>
+                  <a:schemeClr val="tx1"/>
+                </a:solidFill>
+                <a:miter lim="800000"/>
+                <a:headEnd/>
+                <a:tailEnd/>
+              </a14:hiddenLine>
+            </a:ext>
+            <a:ext uri="{AF507438-7753-43E0-B8FC-AC1667EBCBE1}">
+              <a14:hiddenEffects xmlns:a14="http://schemas.microsoft.com/office/drawing/2010/main">
+                <a:effectLst>
+                  <a:outerShdw dist="35921" dir="2700000" algn="ctr" rotWithShape="0">
+                    <a:schemeClr val="bg2"/>
+                  </a:outerShdw>
+                </a:effectLst>
+              </a14:hiddenEffects>
+            </a:ext>
+          </a:extLst>
+        </p:spPr>
+      </p:pic>
+    </p:spTree>
+    <p:extLst>
+      <p:ext uri="{BB962C8B-B14F-4D97-AF65-F5344CB8AC3E}">
+        <p14:creationId xmlns:p14="http://schemas.microsoft.com/office/powerpoint/2010/main" val="4105916061"/>
+      </p:ext>
+    </p:extLst>
+  </p:cSld>
+  <p:clrMapOvr>
+    <a:masterClrMapping/>
+  </p:clrMapOvr>
+  <p:timing>
+    <p:tnLst>
+      <p:par>
+        <p:cTn id="1" dur="indefinite" restart="never" nodeType="tmRoot"/>
+      </p:par>
+    </p:tnLst>
+  </p:timing>
+</p:sld>
+</file>
+
+<file path=ppt/slides/slide18.xml><?xml version="1.0" encoding="utf-8"?>
+<p:sld xmlns:a="http://schemas.openxmlformats.org/drawingml/2006/main" xmlns:r="http://schemas.openxmlformats.org/officeDocument/2006/relationships" xmlns:p="http://schemas.openxmlformats.org/presentationml/2006/main">
+  <p:cSld>
+    <p:spTree>
+      <p:nvGrpSpPr>
+        <p:cNvPr id="1" name=""/>
+        <p:cNvGrpSpPr/>
+        <p:nvPr/>
+      </p:nvGrpSpPr>
+      <p:grpSpPr>
+        <a:xfrm>
+          <a:off x="0" y="0"/>
+          <a:ext cx="0" cy="0"/>
+          <a:chOff x="0" y="0"/>
+          <a:chExt cx="0" cy="0"/>
+        </a:xfrm>
+      </p:grpSpPr>
+      <p:sp>
+        <p:nvSpPr>
+          <p:cNvPr id="2" name="Title 1"/>
+          <p:cNvSpPr>
+            <a:spLocks noGrp="1"/>
+          </p:cNvSpPr>
+          <p:nvPr>
+            <p:ph type="title"/>
+          </p:nvPr>
+        </p:nvSpPr>
+        <p:spPr/>
+        <p:txBody>
+          <a:bodyPr>
+            <a:normAutofit/>
+          </a:bodyPr>
+          <a:lstStyle/>
+          <a:p>
+            <a:r>
+              <a:rPr lang="en-US" dirty="0" smtClean="0">
+                <a:solidFill>
+                  <a:schemeClr val="accent5">
+                    <a:lumMod val="50000"/>
+                  </a:schemeClr>
+                </a:solidFill>
+              </a:rPr>
+              <a:t>More Information</a:t>
+            </a:r>
+            <a:endParaRPr lang="en-US" dirty="0"/>
+          </a:p>
+        </p:txBody>
+      </p:sp>
+      <p:sp>
+        <p:nvSpPr>
+          <p:cNvPr id="4" name="Date Placeholder 3"/>
+          <p:cNvSpPr>
+            <a:spLocks noGrp="1"/>
+          </p:cNvSpPr>
+          <p:nvPr>
+            <p:ph type="dt" sz="half" idx="10"/>
+          </p:nvPr>
+        </p:nvSpPr>
+        <p:spPr/>
+        <p:txBody>
+          <a:bodyPr/>
+          <a:lstStyle/>
+          <a:p>
+            <a:fld id="{05A93482-8E69-40F7-BCAD-5662A6CADB27}" type="datetime4">
+              <a:rPr lang="en-US" smtClean="0"/>
+              <a:pPr/>
+              <a:t>May 31, 2012</a:t>
             </a:fld>
             <a:endParaRPr lang="en-US"/>
           </a:p>
@@ -16073,7 +16040,489 @@
             <a:fld id="{8B37D5FE-740C-46F5-801A-FA5477D9711F}" type="slidenum">
               <a:rPr lang="en-US" smtClean="0"/>
               <a:pPr/>
-              <a:t>17</a:t>
+              <a:t>18</a:t>
+            </a:fld>
+            <a:endParaRPr lang="en-US"/>
+          </a:p>
+        </p:txBody>
+      </p:sp>
+      <p:sp>
+        <p:nvSpPr>
+          <p:cNvPr id="8" name="Content Placeholder 2"/>
+          <p:cNvSpPr txBox="1">
+            <a:spLocks/>
+          </p:cNvSpPr>
+          <p:nvPr/>
+        </p:nvSpPr>
+        <p:spPr>
+          <a:xfrm>
+            <a:off x="1195892" y="2286000"/>
+            <a:ext cx="6777317" cy="2708429"/>
+          </a:xfrm>
+          <a:prstGeom prst="rect">
+            <a:avLst/>
+          </a:prstGeom>
+        </p:spPr>
+        <p:txBody>
+          <a:bodyPr vert="horz" lIns="91440" tIns="45720" rIns="91440" bIns="45720" rtlCol="0">
+            <a:normAutofit fontScale="92500" lnSpcReduction="20000"/>
+          </a:bodyPr>
+          <a:lstStyle>
+            <a:lvl1pPr marL="342900" indent="-274320" algn="l" defTabSz="914400" rtl="0" eaLnBrk="1" latinLnBrk="0" hangingPunct="1">
+              <a:spcBef>
+                <a:spcPct val="20000"/>
+              </a:spcBef>
+              <a:buClr>
+                <a:schemeClr val="accent1"/>
+              </a:buClr>
+              <a:buSzPct val="76000"/>
+              <a:buFont typeface="Wingdings 2" pitchFamily="18" charset="2"/>
+              <a:buChar char=""/>
+              <a:defRPr sz="2400" kern="1200">
+                <a:solidFill>
+                  <a:schemeClr val="tx2"/>
+                </a:solidFill>
+                <a:latin typeface="+mn-lt"/>
+                <a:ea typeface="+mn-ea"/>
+                <a:cs typeface="+mn-cs"/>
+              </a:defRPr>
+            </a:lvl1pPr>
+            <a:lvl2pPr marL="640080" indent="-274320" algn="l" defTabSz="914400" rtl="0" eaLnBrk="1" latinLnBrk="0" hangingPunct="1">
+              <a:spcBef>
+                <a:spcPct val="20000"/>
+              </a:spcBef>
+              <a:buClr>
+                <a:schemeClr val="accent1"/>
+              </a:buClr>
+              <a:buSzPct val="76000"/>
+              <a:buFont typeface="Wingdings 2" pitchFamily="18" charset="2"/>
+              <a:buChar char=""/>
+              <a:defRPr sz="2200" kern="1200">
+                <a:solidFill>
+                  <a:schemeClr val="tx2"/>
+                </a:solidFill>
+                <a:latin typeface="+mn-lt"/>
+                <a:ea typeface="+mn-ea"/>
+                <a:cs typeface="+mn-cs"/>
+              </a:defRPr>
+            </a:lvl2pPr>
+            <a:lvl3pPr marL="914400" indent="-228600" algn="l" defTabSz="914400" rtl="0" eaLnBrk="1" latinLnBrk="0" hangingPunct="1">
+              <a:spcBef>
+                <a:spcPct val="20000"/>
+              </a:spcBef>
+              <a:buClr>
+                <a:schemeClr val="accent1"/>
+              </a:buClr>
+              <a:buSzPct val="76000"/>
+              <a:buFont typeface="Wingdings 2" pitchFamily="18" charset="2"/>
+              <a:buChar char=""/>
+              <a:defRPr sz="2000" kern="1200">
+                <a:solidFill>
+                  <a:schemeClr val="tx2"/>
+                </a:solidFill>
+                <a:latin typeface="+mn-lt"/>
+                <a:ea typeface="+mn-ea"/>
+                <a:cs typeface="+mn-cs"/>
+              </a:defRPr>
+            </a:lvl3pPr>
+            <a:lvl4pPr marL="1124712" indent="-228600" algn="l" defTabSz="914400" rtl="0" eaLnBrk="1" latinLnBrk="0" hangingPunct="1">
+              <a:spcBef>
+                <a:spcPct val="20000"/>
+              </a:spcBef>
+              <a:buClr>
+                <a:schemeClr val="accent1"/>
+              </a:buClr>
+              <a:buSzPct val="76000"/>
+              <a:buFont typeface="Wingdings 2" pitchFamily="18" charset="2"/>
+              <a:buChar char=""/>
+              <a:defRPr sz="1800" kern="1200">
+                <a:solidFill>
+                  <a:schemeClr val="tx2"/>
+                </a:solidFill>
+                <a:latin typeface="+mn-lt"/>
+                <a:ea typeface="+mn-ea"/>
+                <a:cs typeface="+mn-cs"/>
+              </a:defRPr>
+            </a:lvl4pPr>
+            <a:lvl5pPr marL="1325880" indent="-228600" algn="l" defTabSz="914400" rtl="0" eaLnBrk="1" latinLnBrk="0" hangingPunct="1">
+              <a:spcBef>
+                <a:spcPct val="20000"/>
+              </a:spcBef>
+              <a:buClr>
+                <a:schemeClr val="accent1"/>
+              </a:buClr>
+              <a:buSzPct val="76000"/>
+              <a:buFont typeface="Wingdings 2" pitchFamily="18" charset="2"/>
+              <a:buChar char=""/>
+              <a:defRPr sz="1600" kern="1200" baseline="0">
+                <a:solidFill>
+                  <a:schemeClr val="tx2"/>
+                </a:solidFill>
+                <a:latin typeface="+mn-lt"/>
+                <a:ea typeface="+mn-ea"/>
+                <a:cs typeface="+mn-cs"/>
+              </a:defRPr>
+            </a:lvl5pPr>
+            <a:lvl6pPr marL="1517904" indent="-228600" algn="l" defTabSz="914400" rtl="0" eaLnBrk="1" latinLnBrk="0" hangingPunct="1">
+              <a:spcBef>
+                <a:spcPct val="20000"/>
+              </a:spcBef>
+              <a:buClr>
+                <a:schemeClr val="accent1"/>
+              </a:buClr>
+              <a:buSzPct val="76000"/>
+              <a:buFont typeface="Wingdings 2" pitchFamily="18" charset="2"/>
+              <a:buChar char=""/>
+              <a:defRPr sz="1400" kern="1200">
+                <a:solidFill>
+                  <a:schemeClr val="tx2"/>
+                </a:solidFill>
+                <a:latin typeface="+mn-lt"/>
+                <a:ea typeface="+mn-ea"/>
+                <a:cs typeface="+mn-cs"/>
+              </a:defRPr>
+            </a:lvl6pPr>
+            <a:lvl7pPr marL="1719072" indent="-228600" algn="l" defTabSz="914400" rtl="0" eaLnBrk="1" latinLnBrk="0" hangingPunct="1">
+              <a:spcBef>
+                <a:spcPct val="20000"/>
+              </a:spcBef>
+              <a:buClr>
+                <a:schemeClr val="accent1"/>
+              </a:buClr>
+              <a:buSzPct val="76000"/>
+              <a:buFont typeface="Wingdings 2" pitchFamily="18" charset="2"/>
+              <a:buChar char=""/>
+              <a:defRPr sz="1400" kern="1200">
+                <a:solidFill>
+                  <a:schemeClr val="tx2"/>
+                </a:solidFill>
+                <a:latin typeface="+mn-lt"/>
+                <a:ea typeface="+mn-ea"/>
+                <a:cs typeface="+mn-cs"/>
+              </a:defRPr>
+            </a:lvl7pPr>
+            <a:lvl8pPr marL="1920240" indent="-228600" algn="l" defTabSz="914400" rtl="0" eaLnBrk="1" latinLnBrk="0" hangingPunct="1">
+              <a:spcBef>
+                <a:spcPct val="20000"/>
+              </a:spcBef>
+              <a:buClr>
+                <a:schemeClr val="accent1"/>
+              </a:buClr>
+              <a:buSzPct val="76000"/>
+              <a:buFont typeface="Wingdings 2" pitchFamily="18" charset="2"/>
+              <a:buChar char=""/>
+              <a:defRPr sz="1400" kern="1200">
+                <a:solidFill>
+                  <a:schemeClr val="tx2"/>
+                </a:solidFill>
+                <a:latin typeface="+mn-lt"/>
+                <a:ea typeface="+mn-ea"/>
+                <a:cs typeface="+mn-cs"/>
+              </a:defRPr>
+            </a:lvl8pPr>
+            <a:lvl9pPr marL="2121408" indent="-228600" algn="l" defTabSz="914400" rtl="0" eaLnBrk="1" latinLnBrk="0" hangingPunct="1">
+              <a:spcBef>
+                <a:spcPct val="20000"/>
+              </a:spcBef>
+              <a:buClr>
+                <a:schemeClr val="accent1"/>
+              </a:buClr>
+              <a:buSzPct val="76000"/>
+              <a:buFont typeface="Wingdings 2" pitchFamily="18" charset="2"/>
+              <a:buChar char=""/>
+              <a:defRPr sz="1400" kern="1200">
+                <a:solidFill>
+                  <a:schemeClr val="tx2"/>
+                </a:solidFill>
+                <a:latin typeface="+mn-lt"/>
+                <a:ea typeface="+mn-ea"/>
+                <a:cs typeface="+mn-cs"/>
+              </a:defRPr>
+            </a:lvl9pPr>
+          </a:lstStyle>
+          <a:p>
+            <a:endParaRPr lang="en-US" dirty="0" smtClean="0"/>
+          </a:p>
+          <a:p>
+            <a:r>
+              <a:rPr lang="en-US" dirty="0" smtClean="0"/>
+              <a:t>Books </a:t>
+            </a:r>
+            <a:r>
+              <a:rPr lang="en-US" dirty="0"/>
+              <a:t>- </a:t>
+            </a:r>
+            <a:r>
+              <a:rPr lang="en-US" dirty="0">
+                <a:hlinkClick r:id="rId2"/>
+              </a:rPr>
+              <a:t>http://</a:t>
+            </a:r>
+            <a:r>
+              <a:rPr lang="en-US" dirty="0" smtClean="0">
+                <a:hlinkClick r:id="rId2"/>
+              </a:rPr>
+              <a:t>msdn.microsoft.com/en-us/fsharp/gg262865.aspx</a:t>
+            </a:r>
+            <a:endParaRPr lang="en-US" dirty="0" smtClean="0"/>
+          </a:p>
+          <a:p>
+            <a:r>
+              <a:rPr lang="en-US" dirty="0"/>
+              <a:t>F# MSDN - </a:t>
+            </a:r>
+            <a:r>
+              <a:rPr lang="en-US" dirty="0">
+                <a:hlinkClick r:id="rId2"/>
+              </a:rPr>
+              <a:t>http://</a:t>
+            </a:r>
+            <a:r>
+              <a:rPr lang="en-US" dirty="0" smtClean="0">
+                <a:hlinkClick r:id="rId2"/>
+              </a:rPr>
+              <a:t>msdn.microsoft.com/en-us/fsharp/gg262865.aspx</a:t>
+            </a:r>
+            <a:endParaRPr lang="en-US" dirty="0" smtClean="0"/>
+          </a:p>
+          <a:p>
+            <a:r>
+              <a:rPr lang="en-US" dirty="0" smtClean="0"/>
+              <a:t>Blogs</a:t>
+            </a:r>
+          </a:p>
+          <a:p>
+            <a:r>
+              <a:rPr lang="en-US" dirty="0" smtClean="0"/>
+              <a:t>Twitter</a:t>
+            </a:r>
+          </a:p>
+          <a:p>
+            <a:r>
+              <a:rPr lang="en-US" dirty="0" smtClean="0"/>
+              <a:t>Ask – F# has the greatest community around</a:t>
+            </a:r>
+          </a:p>
+          <a:p>
+            <a:pPr marL="365760" lvl="1" indent="0">
+              <a:buNone/>
+            </a:pPr>
+            <a:endParaRPr lang="en-US" dirty="0" smtClean="0"/>
+          </a:p>
+          <a:p>
+            <a:pPr marL="68580" indent="0">
+              <a:buFont typeface="Wingdings 2" pitchFamily="18" charset="2"/>
+              <a:buNone/>
+            </a:pPr>
+            <a:endParaRPr lang="en-US" dirty="0" smtClean="0"/>
+          </a:p>
+        </p:txBody>
+      </p:sp>
+    </p:spTree>
+    <p:extLst>
+      <p:ext uri="{BB962C8B-B14F-4D97-AF65-F5344CB8AC3E}">
+        <p14:creationId xmlns:p14="http://schemas.microsoft.com/office/powerpoint/2010/main" val="1179791007"/>
+      </p:ext>
+    </p:extLst>
+  </p:cSld>
+  <p:clrMapOvr>
+    <a:masterClrMapping/>
+  </p:clrMapOvr>
+  <p:timing>
+    <p:tnLst>
+      <p:par>
+        <p:cTn id="1" dur="indefinite" restart="never" nodeType="tmRoot"/>
+      </p:par>
+    </p:tnLst>
+  </p:timing>
+</p:sld>
+</file>
+
+<file path=ppt/slides/slide19.xml><?xml version="1.0" encoding="utf-8"?>
+<p:sld xmlns:a="http://schemas.openxmlformats.org/drawingml/2006/main" xmlns:r="http://schemas.openxmlformats.org/officeDocument/2006/relationships" xmlns:p="http://schemas.openxmlformats.org/presentationml/2006/main">
+  <p:cSld>
+    <p:spTree>
+      <p:nvGrpSpPr>
+        <p:cNvPr id="1" name=""/>
+        <p:cNvGrpSpPr/>
+        <p:nvPr/>
+      </p:nvGrpSpPr>
+      <p:grpSpPr>
+        <a:xfrm>
+          <a:off x="0" y="0"/>
+          <a:ext cx="0" cy="0"/>
+          <a:chOff x="0" y="0"/>
+          <a:chExt cx="0" cy="0"/>
+        </a:xfrm>
+      </p:grpSpPr>
+      <p:sp>
+        <p:nvSpPr>
+          <p:cNvPr id="2" name="Title 1"/>
+          <p:cNvSpPr>
+            <a:spLocks noGrp="1"/>
+          </p:cNvSpPr>
+          <p:nvPr>
+            <p:ph type="title"/>
+          </p:nvPr>
+        </p:nvSpPr>
+        <p:spPr/>
+        <p:txBody>
+          <a:bodyPr>
+            <a:normAutofit fontScale="90000"/>
+          </a:bodyPr>
+          <a:lstStyle/>
+          <a:p>
+            <a:r>
+              <a:rPr lang="en-US" dirty="0" smtClean="0">
+                <a:solidFill>
+                  <a:schemeClr val="accent5">
+                    <a:lumMod val="50000"/>
+                  </a:schemeClr>
+                </a:solidFill>
+              </a:rPr>
+              <a:t>Daniel </a:t>
+            </a:r>
+            <a:r>
+              <a:rPr lang="en-US" dirty="0" err="1" smtClean="0">
+                <a:solidFill>
+                  <a:schemeClr val="accent5">
+                    <a:lumMod val="50000"/>
+                  </a:schemeClr>
+                </a:solidFill>
+              </a:rPr>
+              <a:t>Mohl</a:t>
+            </a:r>
+            <a:r>
+              <a:rPr lang="en-US" dirty="0" smtClean="0">
+                <a:solidFill>
+                  <a:schemeClr val="accent5">
+                    <a:lumMod val="50000"/>
+                  </a:schemeClr>
+                </a:solidFill>
+              </a:rPr>
+              <a:t/>
+            </a:r>
+            <a:br>
+              <a:rPr lang="en-US" dirty="0" smtClean="0">
+                <a:solidFill>
+                  <a:schemeClr val="accent5">
+                    <a:lumMod val="50000"/>
+                  </a:schemeClr>
+                </a:solidFill>
+              </a:rPr>
+            </a:br>
+            <a:r>
+              <a:rPr lang="en-US" dirty="0" smtClean="0">
+                <a:solidFill>
+                  <a:schemeClr val="accent5">
+                    <a:lumMod val="50000"/>
+                  </a:schemeClr>
+                </a:solidFill>
+              </a:rPr>
+              <a:t>F# </a:t>
+            </a:r>
+            <a:r>
+              <a:rPr lang="en-US" dirty="0" smtClean="0">
+                <a:solidFill>
+                  <a:schemeClr val="accent5">
+                    <a:lumMod val="50000"/>
+                  </a:schemeClr>
+                </a:solidFill>
+              </a:rPr>
+              <a:t>MVP and </a:t>
+            </a:r>
+            <a:r>
+              <a:rPr lang="en-US" dirty="0" smtClean="0">
+                <a:solidFill>
+                  <a:schemeClr val="accent5">
+                    <a:lumMod val="50000"/>
+                  </a:schemeClr>
+                </a:solidFill>
+              </a:rPr>
+              <a:t>C# </a:t>
+            </a:r>
+            <a:r>
+              <a:rPr lang="en-US" dirty="0" smtClean="0">
+                <a:solidFill>
+                  <a:schemeClr val="accent5">
+                    <a:lumMod val="50000"/>
+                  </a:schemeClr>
+                </a:solidFill>
+              </a:rPr>
+              <a:t>Insider</a:t>
+            </a:r>
+            <a:endParaRPr lang="en-US" dirty="0">
+              <a:solidFill>
+                <a:schemeClr val="accent5">
+                  <a:lumMod val="50000"/>
+                </a:schemeClr>
+              </a:solidFill>
+            </a:endParaRPr>
+          </a:p>
+        </p:txBody>
+      </p:sp>
+      <p:sp>
+        <p:nvSpPr>
+          <p:cNvPr id="4" name="Date Placeholder 3"/>
+          <p:cNvSpPr>
+            <a:spLocks noGrp="1"/>
+          </p:cNvSpPr>
+          <p:nvPr>
+            <p:ph type="dt" sz="half" idx="10"/>
+          </p:nvPr>
+        </p:nvSpPr>
+        <p:spPr/>
+        <p:txBody>
+          <a:bodyPr/>
+          <a:lstStyle/>
+          <a:p>
+            <a:fld id="{05A93482-8E69-40F7-BCAD-5662A6CADB27}" type="datetime4">
+              <a:rPr lang="en-US" smtClean="0"/>
+              <a:pPr/>
+              <a:t>May 31, 2012</a:t>
+            </a:fld>
+            <a:endParaRPr lang="en-US"/>
+          </a:p>
+        </p:txBody>
+      </p:sp>
+      <p:sp>
+        <p:nvSpPr>
+          <p:cNvPr id="5" name="Footer Placeholder 4"/>
+          <p:cNvSpPr>
+            <a:spLocks noGrp="1"/>
+          </p:cNvSpPr>
+          <p:nvPr>
+            <p:ph type="ftr" sz="quarter" idx="11"/>
+          </p:nvPr>
+        </p:nvSpPr>
+        <p:spPr/>
+        <p:txBody>
+          <a:bodyPr/>
+          <a:lstStyle/>
+          <a:p>
+            <a:endParaRPr lang="en-US"/>
+          </a:p>
+        </p:txBody>
+      </p:sp>
+      <p:sp>
+        <p:nvSpPr>
+          <p:cNvPr id="6" name="Slide Number Placeholder 5"/>
+          <p:cNvSpPr>
+            <a:spLocks noGrp="1"/>
+          </p:cNvSpPr>
+          <p:nvPr>
+            <p:ph type="sldNum" sz="quarter" idx="12"/>
+          </p:nvPr>
+        </p:nvSpPr>
+        <p:spPr/>
+        <p:txBody>
+          <a:bodyPr/>
+          <a:lstStyle/>
+          <a:p>
+            <a:fld id="{8B37D5FE-740C-46F5-801A-FA5477D9711F}" type="slidenum">
+              <a:rPr lang="en-US" smtClean="0"/>
+              <a:pPr/>
+              <a:t>19</a:t>
             </a:fld>
             <a:endParaRPr lang="en-US"/>
           </a:p>
@@ -16728,7 +17177,37 @@
                   </a:schemeClr>
                 </a:solidFill>
               </a:rPr>
-              <a:t>C# MVP and F# Insider</a:t>
+              <a:t>F# </a:t>
+            </a:r>
+            <a:r>
+              <a:rPr lang="en-US" dirty="0" smtClean="0">
+                <a:solidFill>
+                  <a:schemeClr val="accent5">
+                    <a:lumMod val="50000"/>
+                  </a:schemeClr>
+                </a:solidFill>
+              </a:rPr>
+              <a:t>MVP and </a:t>
+            </a:r>
+            <a:r>
+              <a:rPr lang="en-US" dirty="0" smtClean="0">
+                <a:solidFill>
+                  <a:schemeClr val="accent5">
+                    <a:lumMod val="50000"/>
+                  </a:schemeClr>
+                </a:solidFill>
+              </a:rPr>
+              <a:t>C# </a:t>
+            </a:r>
+            <a:r>
+              <a:rPr lang="en-US" dirty="0" smtClean="0">
+                <a:solidFill>
+                  <a:schemeClr val="accent5">
+                    <a:lumMod val="50000"/>
+                  </a:schemeClr>
+                </a:solidFill>
+              </a:rPr>
+              <a:t>Insider</a:t>
             </a:r>
             <a:endParaRPr lang="en-US" dirty="0">
               <a:solidFill>
@@ -16758,7 +17237,7 @@
             <a:fld id="{05A93482-8E69-40F7-BCAD-5662A6CADB27}" type="datetime4">
               <a:rPr lang="en-US" smtClean="0"/>
               <a:pPr/>
-              <a:t>August 13, 2011</a:t>
+              <a:t>May 31, 2012</a:t>
             </a:fld>
             <a:endParaRPr lang="en-US"/>
           </a:p>
@@ -17434,7 +17913,7 @@
         <p:spPr/>
         <p:txBody>
           <a:bodyPr>
-            <a:normAutofit lnSpcReduction="10000"/>
+            <a:normAutofit fontScale="92500" lnSpcReduction="10000"/>
           </a:bodyPr>
           <a:lstStyle/>
           <a:p>
@@ -17452,28 +17931,35 @@
           <a:p>
             <a:r>
               <a:rPr lang="en-US" dirty="0" smtClean="0"/>
-              <a:t>F#/C# Silverlight Example</a:t>
-            </a:r>
-          </a:p>
-          <a:p>
+              <a:t>F</a:t>
+            </a:r>
             <a:r>
               <a:rPr lang="en-US" dirty="0" smtClean="0"/>
-              <a:t>F# Silverlight Example</a:t>
+              <a:t># Silverlight Example</a:t>
             </a:r>
           </a:p>
           <a:p>
             <a:r>
               <a:rPr lang="en-US" dirty="0" smtClean="0"/>
-              <a:t>F#/C# ASP.NET </a:t>
-            </a:r>
-            <a:r>
-              <a:rPr lang="en-US" smtClean="0"/>
-              <a:t>MVC 3 </a:t>
+              <a:t>F#/C# ASP.NET MVC </a:t>
             </a:r>
             <a:r>
               <a:rPr lang="en-US" dirty="0" smtClean="0"/>
-              <a:t>Example</a:t>
-            </a:r>
+              <a:t>4 Example</a:t>
+            </a:r>
+          </a:p>
+          <a:p>
+            <a:r>
+              <a:rPr lang="en-US" dirty="0" smtClean="0"/>
+              <a:t>ASP.NET Web API, Service Stack, Nancy, Frank</a:t>
+            </a:r>
+          </a:p>
+          <a:p>
+            <a:r>
+              <a:rPr lang="en-US" dirty="0" smtClean="0"/>
+              <a:t>Windows Azure</a:t>
+            </a:r>
+            <a:endParaRPr lang="en-US" dirty="0" smtClean="0"/>
           </a:p>
           <a:p>
             <a:r>
@@ -17518,7 +18004,7 @@
             <a:fld id="{05A93482-8E69-40F7-BCAD-5662A6CADB27}" type="datetime4">
               <a:rPr lang="en-US" smtClean="0"/>
               <a:pPr/>
-              <a:t>August 13, 2011</a:t>
+              <a:t>May 31, 2012</a:t>
             </a:fld>
             <a:endParaRPr lang="en-US"/>
           </a:p>
@@ -17769,7 +18255,7 @@
             <a:fld id="{05A93482-8E69-40F7-BCAD-5662A6CADB27}" type="datetime4">
               <a:rPr lang="en-US" smtClean="0"/>
               <a:pPr/>
-              <a:t>August 13, 2011</a:t>
+              <a:t>May 31, 2012</a:t>
             </a:fld>
             <a:endParaRPr lang="en-US"/>
           </a:p>
@@ -18030,7 +18516,7 @@
             <a:fld id="{05A93482-8E69-40F7-BCAD-5662A6CADB27}" type="datetime4">
               <a:rPr lang="en-US" smtClean="0"/>
               <a:pPr/>
-              <a:t>August 13, 2011</a:t>
+              <a:t>May 31, 2012</a:t>
             </a:fld>
             <a:endParaRPr lang="en-US"/>
           </a:p>
@@ -18214,7 +18700,7 @@
             <a:fld id="{05A93482-8E69-40F7-BCAD-5662A6CADB27}" type="datetime4">
               <a:rPr lang="en-US" smtClean="0"/>
               <a:pPr/>
-              <a:t>August 13, 2011</a:t>
+              <a:t>May 31, 2012</a:t>
             </a:fld>
             <a:endParaRPr lang="en-US"/>
           </a:p>
@@ -18354,7 +18840,7 @@
             <a:fld id="{05A93482-8E69-40F7-BCAD-5662A6CADB27}" type="datetime4">
               <a:rPr lang="en-US" smtClean="0"/>
               <a:pPr/>
-              <a:t>August 13, 2011</a:t>
+              <a:t>May 31, 2012</a:t>
             </a:fld>
             <a:endParaRPr lang="en-US"/>
           </a:p>
@@ -19785,7 +20271,7 @@
             <a:fld id="{05A93482-8E69-40F7-BCAD-5662A6CADB27}" type="datetime4">
               <a:rPr lang="en-US" smtClean="0"/>
               <a:pPr/>
-              <a:t>August 13, 2011</a:t>
+              <a:t>May 31, 2012</a:t>
             </a:fld>
             <a:endParaRPr lang="en-US"/>
           </a:p>
@@ -21276,7 +21762,7 @@
             <a:fld id="{05A93482-8E69-40F7-BCAD-5662A6CADB27}" type="datetime4">
               <a:rPr lang="en-US" smtClean="0"/>
               <a:pPr/>
-              <a:t>August 13, 2011</a:t>
+              <a:t>May 31, 2012</a:t>
             </a:fld>
             <a:endParaRPr lang="en-US"/>
           </a:p>

</xml_diff>